<commit_message>
atualizando a aula 9 de Banco de Dados
</commit_message>
<xml_diff>
--- a/Euripedes Simões de Paula/Banco de Dados/Aula 9/Projeto de Banco de Dados.pptx
+++ b/Euripedes Simões de Paula/Banco de Dados/Aula 9/Projeto de Banco de Dados.pptx
@@ -23,6 +23,14 @@
     <p:sldId id="272" r:id="rId17"/>
     <p:sldId id="273" r:id="rId18"/>
     <p:sldId id="274" r:id="rId19"/>
+    <p:sldId id="275" r:id="rId20"/>
+    <p:sldId id="276" r:id="rId21"/>
+    <p:sldId id="277" r:id="rId22"/>
+    <p:sldId id="278" r:id="rId23"/>
+    <p:sldId id="279" r:id="rId24"/>
+    <p:sldId id="280" r:id="rId25"/>
+    <p:sldId id="281" r:id="rId26"/>
+    <p:sldId id="282" r:id="rId27"/>
   </p:sldIdLst>
   <p:sldSz cx="12192000" cy="6858000"/>
   <p:notesSz cx="6858000" cy="9144000"/>
@@ -121,6 +129,11 @@
       </a:defRPr>
     </a:lvl9pPr>
   </p:defaultTextStyle>
+  <p:extLst>
+    <p:ext uri="{EFAFB233-063F-42B5-8137-9DF3F51BA10A}">
+      <p15:sldGuideLst xmlns:p15="http://schemas.microsoft.com/office/powerpoint/2012/main"/>
+    </p:ext>
+  </p:extLst>
 </p:presentation>
 </file>
 
@@ -350,7 +363,7 @@
           <a:p>
             <a:fld id="{6F04A0FC-C05E-430A-88B6-D7A9784C8B2C}" type="datetimeFigureOut">
               <a:rPr lang="pt-BR" smtClean="0"/>
-              <a:t>13/04/2024</a:t>
+              <a:t>14/04/2024</a:t>
             </a:fld>
             <a:endParaRPr lang="pt-BR"/>
           </a:p>
@@ -558,7 +571,7 @@
           <a:p>
             <a:fld id="{6F04A0FC-C05E-430A-88B6-D7A9784C8B2C}" type="datetimeFigureOut">
               <a:rPr lang="pt-BR" smtClean="0"/>
-              <a:t>13/04/2024</a:t>
+              <a:t>14/04/2024</a:t>
             </a:fld>
             <a:endParaRPr lang="pt-BR"/>
           </a:p>
@@ -814,7 +827,7 @@
           <a:p>
             <a:fld id="{6F04A0FC-C05E-430A-88B6-D7A9784C8B2C}" type="datetimeFigureOut">
               <a:rPr lang="pt-BR" smtClean="0"/>
-              <a:t>13/04/2024</a:t>
+              <a:t>14/04/2024</a:t>
             </a:fld>
             <a:endParaRPr lang="pt-BR"/>
           </a:p>
@@ -988,7 +1001,7 @@
           <a:p>
             <a:fld id="{6F04A0FC-C05E-430A-88B6-D7A9784C8B2C}" type="datetimeFigureOut">
               <a:rPr lang="pt-BR" smtClean="0"/>
-              <a:t>13/04/2024</a:t>
+              <a:t>14/04/2024</a:t>
             </a:fld>
             <a:endParaRPr lang="pt-BR"/>
           </a:p>
@@ -1331,7 +1344,7 @@
           <a:p>
             <a:fld id="{6F04A0FC-C05E-430A-88B6-D7A9784C8B2C}" type="datetimeFigureOut">
               <a:rPr lang="pt-BR" smtClean="0"/>
-              <a:t>13/04/2024</a:t>
+              <a:t>14/04/2024</a:t>
             </a:fld>
             <a:endParaRPr lang="pt-BR"/>
           </a:p>
@@ -1606,7 +1619,7 @@
           <a:p>
             <a:fld id="{6F04A0FC-C05E-430A-88B6-D7A9784C8B2C}" type="datetimeFigureOut">
               <a:rPr lang="pt-BR" smtClean="0"/>
-              <a:t>13/04/2024</a:t>
+              <a:t>14/04/2024</a:t>
             </a:fld>
             <a:endParaRPr lang="pt-BR"/>
           </a:p>
@@ -1985,7 +1998,7 @@
           <a:p>
             <a:fld id="{6F04A0FC-C05E-430A-88B6-D7A9784C8B2C}" type="datetimeFigureOut">
               <a:rPr lang="pt-BR" smtClean="0"/>
-              <a:t>13/04/2024</a:t>
+              <a:t>14/04/2024</a:t>
             </a:fld>
             <a:endParaRPr lang="pt-BR"/>
           </a:p>
@@ -2103,7 +2116,7 @@
           <a:p>
             <a:fld id="{6F04A0FC-C05E-430A-88B6-D7A9784C8B2C}" type="datetimeFigureOut">
               <a:rPr lang="pt-BR" smtClean="0"/>
-              <a:t>13/04/2024</a:t>
+              <a:t>14/04/2024</a:t>
             </a:fld>
             <a:endParaRPr lang="pt-BR"/>
           </a:p>
@@ -2274,7 +2287,7 @@
           <a:p>
             <a:fld id="{6F04A0FC-C05E-430A-88B6-D7A9784C8B2C}" type="datetimeFigureOut">
               <a:rPr lang="pt-BR" smtClean="0"/>
-              <a:t>13/04/2024</a:t>
+              <a:t>14/04/2024</a:t>
             </a:fld>
             <a:endParaRPr lang="pt-BR"/>
           </a:p>
@@ -2628,7 +2641,7 @@
           <a:p>
             <a:fld id="{6F04A0FC-C05E-430A-88B6-D7A9784C8B2C}" type="datetimeFigureOut">
               <a:rPr lang="pt-BR" smtClean="0"/>
-              <a:t>13/04/2024</a:t>
+              <a:t>14/04/2024</a:t>
             </a:fld>
             <a:endParaRPr lang="pt-BR"/>
           </a:p>
@@ -3010,7 +3023,7 @@
           <a:p>
             <a:fld id="{6F04A0FC-C05E-430A-88B6-D7A9784C8B2C}" type="datetimeFigureOut">
               <a:rPr lang="pt-BR" smtClean="0"/>
-              <a:t>13/04/2024</a:t>
+              <a:t>14/04/2024</a:t>
             </a:fld>
             <a:endParaRPr lang="pt-BR"/>
           </a:p>
@@ -3297,7 +3310,7 @@
           <a:p>
             <a:fld id="{6F04A0FC-C05E-430A-88B6-D7A9784C8B2C}" type="datetimeFigureOut">
               <a:rPr lang="pt-BR" smtClean="0"/>
-              <a:t>13/04/2024</a:t>
+              <a:t>14/04/2024</a:t>
             </a:fld>
             <a:endParaRPr lang="pt-BR"/>
           </a:p>
@@ -11702,6 +11715,151 @@
 </p:sld>
 </file>
 
+<file path=ppt/slides/slide19.xml><?xml version="1.0" encoding="utf-8"?>
+<p:sld xmlns:a="http://schemas.openxmlformats.org/drawingml/2006/main" xmlns:r="http://schemas.openxmlformats.org/officeDocument/2006/relationships" xmlns:p="http://schemas.openxmlformats.org/presentationml/2006/main">
+  <p:cSld>
+    <p:spTree>
+      <p:nvGrpSpPr>
+        <p:cNvPr id="1" name=""/>
+        <p:cNvGrpSpPr/>
+        <p:nvPr/>
+      </p:nvGrpSpPr>
+      <p:grpSpPr>
+        <a:xfrm>
+          <a:off x="0" y="0"/>
+          <a:ext cx="0" cy="0"/>
+          <a:chOff x="0" y="0"/>
+          <a:chExt cx="0" cy="0"/>
+        </a:xfrm>
+      </p:grpSpPr>
+      <p:sp>
+        <p:nvSpPr>
+          <p:cNvPr id="2" name="Título 1">
+            <a:extLst>
+              <a:ext uri="{FF2B5EF4-FFF2-40B4-BE49-F238E27FC236}">
+                <a16:creationId xmlns:a16="http://schemas.microsoft.com/office/drawing/2014/main" id="{9EA6D259-A816-8FE6-B466-CB883C28DDDA}"/>
+              </a:ext>
+            </a:extLst>
+          </p:cNvPr>
+          <p:cNvSpPr>
+            <a:spLocks noGrp="1"/>
+          </p:cNvSpPr>
+          <p:nvPr>
+            <p:ph type="title"/>
+          </p:nvPr>
+        </p:nvSpPr>
+        <p:spPr/>
+        <p:txBody>
+          <a:bodyPr/>
+          <a:lstStyle/>
+          <a:p>
+            <a:r>
+              <a:rPr lang="pt-BR" dirty="0"/>
+              <a:t>Projeto de banco de dados com Workbench</a:t>
+            </a:r>
+          </a:p>
+        </p:txBody>
+      </p:sp>
+      <p:sp>
+        <p:nvSpPr>
+          <p:cNvPr id="3" name="Espaço Reservado para Conteúdo 2">
+            <a:extLst>
+              <a:ext uri="{FF2B5EF4-FFF2-40B4-BE49-F238E27FC236}">
+                <a16:creationId xmlns:a16="http://schemas.microsoft.com/office/drawing/2014/main" id="{7739F476-096D-8072-2941-079CBDE41218}"/>
+              </a:ext>
+            </a:extLst>
+          </p:cNvPr>
+          <p:cNvSpPr>
+            <a:spLocks noGrp="1"/>
+          </p:cNvSpPr>
+          <p:nvPr>
+            <p:ph idx="1"/>
+          </p:nvPr>
+        </p:nvSpPr>
+        <p:spPr>
+          <a:xfrm>
+            <a:off x="1097280" y="1845734"/>
+            <a:ext cx="10058400" cy="4023360"/>
+          </a:xfrm>
+        </p:spPr>
+        <p:txBody>
+          <a:bodyPr>
+            <a:normAutofit lnSpcReduction="10000"/>
+          </a:bodyPr>
+          <a:lstStyle/>
+          <a:p>
+            <a:r>
+              <a:rPr lang="pt-BR" sz="2400" dirty="0"/>
+              <a:t>O projeto lógico é a etapa do projeto de Banco de Dados onde é criado um esquema lógico de acordo com o SGBD que for selecionado, para representar os esquemas da modelagem conceitual.</a:t>
+            </a:r>
+          </a:p>
+          <a:p>
+            <a:r>
+              <a:rPr lang="pt-BR" sz="2400" dirty="0"/>
+              <a:t>Essa fase pode ser descrita em duas partes:</a:t>
+            </a:r>
+          </a:p>
+          <a:p>
+            <a:pPr lvl="1">
+              <a:buFont typeface="Wingdings" panose="05000000000000000000" pitchFamily="2" charset="2"/>
+              <a:buChar char="Ø"/>
+            </a:pPr>
+            <a:r>
+              <a:rPr lang="pt-BR" sz="2400" dirty="0"/>
+              <a:t> mapeamento do modelo de dados independente do sistema, ainda não considerando as especificações do SGBD;</a:t>
+            </a:r>
+          </a:p>
+          <a:p>
+            <a:pPr lvl="1">
+              <a:buFont typeface="Wingdings" panose="05000000000000000000" pitchFamily="2" charset="2"/>
+              <a:buChar char="Ø"/>
+            </a:pPr>
+            <a:r>
+              <a:rPr lang="pt-BR" sz="2400" dirty="0"/>
+              <a:t> ajuste para um SGBD especifico, se preocupando com os recursos de modelagem e restrições próprias.</a:t>
+            </a:r>
+          </a:p>
+          <a:p>
+            <a:r>
+              <a:rPr lang="pt-BR" sz="2400" dirty="0"/>
+              <a:t>O resultado da segunda parte são os comandos Linguagem de Definição de Dados (DDL - </a:t>
+            </a:r>
+            <a:r>
+              <a:rPr lang="pt-BR" sz="2400" i="1" dirty="0"/>
+              <a:t>Data </a:t>
+            </a:r>
+            <a:r>
+              <a:rPr lang="pt-BR" sz="2400" i="1" dirty="0" err="1"/>
+              <a:t>Definition</a:t>
+            </a:r>
+            <a:r>
+              <a:rPr lang="pt-BR" sz="2400" i="1" dirty="0"/>
+              <a:t> </a:t>
+            </a:r>
+            <a:r>
+              <a:rPr lang="pt-BR" sz="2400" i="1" dirty="0" err="1"/>
+              <a:t>Language</a:t>
+            </a:r>
+            <a:r>
+              <a:rPr lang="pt-BR" sz="2400" dirty="0"/>
+              <a:t>) na linguagem utilizada no SGBD escolhido para o modelo físico.</a:t>
+            </a:r>
+          </a:p>
+        </p:txBody>
+      </p:sp>
+    </p:spTree>
+    <p:extLst>
+      <p:ext uri="{BB962C8B-B14F-4D97-AF65-F5344CB8AC3E}">
+        <p14:creationId xmlns:p14="http://schemas.microsoft.com/office/powerpoint/2010/main" val="2498526056"/>
+      </p:ext>
+    </p:extLst>
+  </p:cSld>
+  <p:clrMapOvr>
+    <a:masterClrMapping/>
+  </p:clrMapOvr>
+</p:sld>
+</file>
+
 <file path=ppt/slides/slide2.xml><?xml version="1.0" encoding="utf-8"?>
 <p:sld xmlns:a="http://schemas.openxmlformats.org/drawingml/2006/main" xmlns:r="http://schemas.openxmlformats.org/officeDocument/2006/relationships" xmlns:p="http://schemas.openxmlformats.org/presentationml/2006/main">
   <p:cSld>
@@ -11799,6 +11957,2158 @@
     <p:extLst>
       <p:ext uri="{BB962C8B-B14F-4D97-AF65-F5344CB8AC3E}">
         <p14:creationId xmlns:p14="http://schemas.microsoft.com/office/powerpoint/2010/main" val="1046202340"/>
+      </p:ext>
+    </p:extLst>
+  </p:cSld>
+  <p:clrMapOvr>
+    <a:masterClrMapping/>
+  </p:clrMapOvr>
+</p:sld>
+</file>
+
+<file path=ppt/slides/slide20.xml><?xml version="1.0" encoding="utf-8"?>
+<p:sld xmlns:a="http://schemas.openxmlformats.org/drawingml/2006/main" xmlns:r="http://schemas.openxmlformats.org/officeDocument/2006/relationships" xmlns:p="http://schemas.openxmlformats.org/presentationml/2006/main">
+  <p:cSld>
+    <p:spTree>
+      <p:nvGrpSpPr>
+        <p:cNvPr id="1" name=""/>
+        <p:cNvGrpSpPr/>
+        <p:nvPr/>
+      </p:nvGrpSpPr>
+      <p:grpSpPr>
+        <a:xfrm>
+          <a:off x="0" y="0"/>
+          <a:ext cx="0" cy="0"/>
+          <a:chOff x="0" y="0"/>
+          <a:chExt cx="0" cy="0"/>
+        </a:xfrm>
+      </p:grpSpPr>
+      <p:sp>
+        <p:nvSpPr>
+          <p:cNvPr id="2" name="Título 1">
+            <a:extLst>
+              <a:ext uri="{FF2B5EF4-FFF2-40B4-BE49-F238E27FC236}">
+                <a16:creationId xmlns:a16="http://schemas.microsoft.com/office/drawing/2014/main" id="{9EA6D259-A816-8FE6-B466-CB883C28DDDA}"/>
+              </a:ext>
+            </a:extLst>
+          </p:cNvPr>
+          <p:cNvSpPr>
+            <a:spLocks noGrp="1"/>
+          </p:cNvSpPr>
+          <p:nvPr>
+            <p:ph type="title"/>
+          </p:nvPr>
+        </p:nvSpPr>
+        <p:spPr/>
+        <p:txBody>
+          <a:bodyPr/>
+          <a:lstStyle/>
+          <a:p>
+            <a:r>
+              <a:rPr lang="pt-BR" dirty="0"/>
+              <a:t>Projeto de banco de dados com Workbench</a:t>
+            </a:r>
+          </a:p>
+        </p:txBody>
+      </p:sp>
+      <p:sp>
+        <p:nvSpPr>
+          <p:cNvPr id="3" name="Espaço Reservado para Conteúdo 2">
+            <a:extLst>
+              <a:ext uri="{FF2B5EF4-FFF2-40B4-BE49-F238E27FC236}">
+                <a16:creationId xmlns:a16="http://schemas.microsoft.com/office/drawing/2014/main" id="{7739F476-096D-8072-2941-079CBDE41218}"/>
+              </a:ext>
+            </a:extLst>
+          </p:cNvPr>
+          <p:cNvSpPr>
+            <a:spLocks noGrp="1"/>
+          </p:cNvSpPr>
+          <p:nvPr>
+            <p:ph idx="1"/>
+          </p:nvPr>
+        </p:nvSpPr>
+        <p:spPr>
+          <a:xfrm>
+            <a:off x="1097280" y="1845734"/>
+            <a:ext cx="10058400" cy="4023360"/>
+          </a:xfrm>
+        </p:spPr>
+        <p:txBody>
+          <a:bodyPr>
+            <a:normAutofit lnSpcReduction="10000"/>
+          </a:bodyPr>
+          <a:lstStyle/>
+          <a:p>
+            <a:r>
+              <a:rPr lang="pt-BR" sz="2400" dirty="0"/>
+              <a:t>Para exemplificar, vamos ilustrar a construção de um projeto de Banco de Dados, onde vamos chamar “Escola”. Este banco será utilizado para registro de professores, alunos, turmas e disciplinas (este é o minimundo) do ensino fundamental.</a:t>
+            </a:r>
+          </a:p>
+          <a:p>
+            <a:r>
+              <a:rPr lang="pt-BR" sz="2400" dirty="0"/>
+              <a:t>A descrição dos dados são:</a:t>
+            </a:r>
+          </a:p>
+          <a:p>
+            <a:pPr lvl="1">
+              <a:buFont typeface="Wingdings" panose="05000000000000000000" pitchFamily="2" charset="2"/>
+              <a:buChar char="Ø"/>
+            </a:pPr>
+            <a:r>
+              <a:rPr lang="pt-BR" sz="2200" dirty="0"/>
+              <a:t> A escola tem diferentes professores que lecionam diferentes disciplinas.</a:t>
+            </a:r>
+          </a:p>
+          <a:p>
+            <a:pPr marL="201168" lvl="1" indent="0">
+              <a:buNone/>
+            </a:pPr>
+            <a:r>
+              <a:rPr lang="pt-BR" sz="2200" dirty="0"/>
+              <a:t>	Possuem: Nome, CPF, Código do Professor e um ID.</a:t>
+            </a:r>
+          </a:p>
+          <a:p>
+            <a:pPr marL="201168" lvl="1" indent="0">
+              <a:buNone/>
+            </a:pPr>
+            <a:r>
+              <a:rPr lang="pt-BR" sz="2200" dirty="0"/>
+              <a:t>	Um professor pode atender várias disciplinas.</a:t>
+            </a:r>
+          </a:p>
+          <a:p>
+            <a:pPr lvl="1">
+              <a:buFont typeface="Wingdings" panose="05000000000000000000" pitchFamily="2" charset="2"/>
+              <a:buChar char="Ø"/>
+            </a:pPr>
+            <a:r>
+              <a:rPr lang="pt-BR" sz="2200" dirty="0"/>
+              <a:t> as turmas alocam os alunos e divide os alunos de acordo com o ano em que estão matriculados.</a:t>
+            </a:r>
+          </a:p>
+          <a:p>
+            <a:pPr marL="201168" lvl="1" indent="0">
+              <a:buNone/>
+            </a:pPr>
+            <a:r>
+              <a:rPr lang="pt-BR" sz="2200" dirty="0"/>
+              <a:t>	Possuem: Nome, Endereço, Data de Nascimento, contato e ID.</a:t>
+            </a:r>
+          </a:p>
+        </p:txBody>
+      </p:sp>
+    </p:spTree>
+    <p:extLst>
+      <p:ext uri="{BB962C8B-B14F-4D97-AF65-F5344CB8AC3E}">
+        <p14:creationId xmlns:p14="http://schemas.microsoft.com/office/powerpoint/2010/main" val="1388901578"/>
+      </p:ext>
+    </p:extLst>
+  </p:cSld>
+  <p:clrMapOvr>
+    <a:masterClrMapping/>
+  </p:clrMapOvr>
+</p:sld>
+</file>
+
+<file path=ppt/slides/slide21.xml><?xml version="1.0" encoding="utf-8"?>
+<p:sld xmlns:a="http://schemas.openxmlformats.org/drawingml/2006/main" xmlns:r="http://schemas.openxmlformats.org/officeDocument/2006/relationships" xmlns:p="http://schemas.openxmlformats.org/presentationml/2006/main">
+  <p:cSld>
+    <p:spTree>
+      <p:nvGrpSpPr>
+        <p:cNvPr id="1" name=""/>
+        <p:cNvGrpSpPr/>
+        <p:nvPr/>
+      </p:nvGrpSpPr>
+      <p:grpSpPr>
+        <a:xfrm>
+          <a:off x="0" y="0"/>
+          <a:ext cx="0" cy="0"/>
+          <a:chOff x="0" y="0"/>
+          <a:chExt cx="0" cy="0"/>
+        </a:xfrm>
+      </p:grpSpPr>
+      <p:sp>
+        <p:nvSpPr>
+          <p:cNvPr id="2" name="Título 1">
+            <a:extLst>
+              <a:ext uri="{FF2B5EF4-FFF2-40B4-BE49-F238E27FC236}">
+                <a16:creationId xmlns:a16="http://schemas.microsoft.com/office/drawing/2014/main" id="{9EA6D259-A816-8FE6-B466-CB883C28DDDA}"/>
+              </a:ext>
+            </a:extLst>
+          </p:cNvPr>
+          <p:cNvSpPr>
+            <a:spLocks noGrp="1"/>
+          </p:cNvSpPr>
+          <p:nvPr>
+            <p:ph type="title"/>
+          </p:nvPr>
+        </p:nvSpPr>
+        <p:spPr/>
+        <p:txBody>
+          <a:bodyPr/>
+          <a:lstStyle/>
+          <a:p>
+            <a:r>
+              <a:rPr lang="pt-BR" dirty="0"/>
+              <a:t>Projeto de banco de dados com Workbench</a:t>
+            </a:r>
+          </a:p>
+        </p:txBody>
+      </p:sp>
+      <p:sp>
+        <p:nvSpPr>
+          <p:cNvPr id="3" name="Espaço Reservado para Conteúdo 2">
+            <a:extLst>
+              <a:ext uri="{FF2B5EF4-FFF2-40B4-BE49-F238E27FC236}">
+                <a16:creationId xmlns:a16="http://schemas.microsoft.com/office/drawing/2014/main" id="{7739F476-096D-8072-2941-079CBDE41218}"/>
+              </a:ext>
+            </a:extLst>
+          </p:cNvPr>
+          <p:cNvSpPr>
+            <a:spLocks noGrp="1"/>
+          </p:cNvSpPr>
+          <p:nvPr>
+            <p:ph idx="1"/>
+          </p:nvPr>
+        </p:nvSpPr>
+        <p:spPr>
+          <a:xfrm>
+            <a:off x="1097280" y="1845734"/>
+            <a:ext cx="10058400" cy="4023360"/>
+          </a:xfrm>
+        </p:spPr>
+        <p:txBody>
+          <a:bodyPr>
+            <a:normAutofit/>
+          </a:bodyPr>
+          <a:lstStyle/>
+          <a:p>
+            <a:r>
+              <a:rPr lang="pt-BR" sz="2400" dirty="0"/>
+              <a:t>Para a modelagem lógica, utilizaremos o </a:t>
+            </a:r>
+            <a:r>
+              <a:rPr lang="pt-BR" sz="2400" b="1" dirty="0"/>
+              <a:t>MySQL Workbench</a:t>
+            </a:r>
+            <a:r>
+              <a:rPr lang="pt-BR" sz="2400" dirty="0"/>
+              <a:t>; para a transformação física, utilizaremos o SGBD </a:t>
+            </a:r>
+            <a:r>
+              <a:rPr lang="pt-BR" sz="2400" b="1" dirty="0"/>
+              <a:t>MySQL Community</a:t>
+            </a:r>
+            <a:r>
+              <a:rPr lang="pt-BR" sz="2400" dirty="0"/>
+              <a:t>. </a:t>
+            </a:r>
+          </a:p>
+          <a:p>
+            <a:r>
+              <a:rPr lang="pt-BR" sz="2400" dirty="0"/>
+              <a:t>Essas duas ferramentas são ferramentas gratuitas (open </a:t>
+            </a:r>
+            <a:r>
+              <a:rPr lang="pt-BR" sz="2400" dirty="0" err="1"/>
+              <a:t>source</a:t>
+            </a:r>
+            <a:r>
+              <a:rPr lang="pt-BR" sz="2400" dirty="0"/>
+              <a:t>), se não utilizadas para uso comercial.</a:t>
+            </a:r>
+          </a:p>
+          <a:p>
+            <a:r>
+              <a:rPr lang="pt-BR" sz="2400" dirty="0"/>
+              <a:t>O MySQL Workbench é uma ferramenta que possibilita a modelagem de dados com modelos relacionais, voltados à linguagem SQL e outras funções.</a:t>
+            </a:r>
+            <a:endParaRPr lang="pt-BR" sz="2200" dirty="0"/>
+          </a:p>
+        </p:txBody>
+      </p:sp>
+    </p:spTree>
+    <p:extLst>
+      <p:ext uri="{BB962C8B-B14F-4D97-AF65-F5344CB8AC3E}">
+        <p14:creationId xmlns:p14="http://schemas.microsoft.com/office/powerpoint/2010/main" val="3702786114"/>
+      </p:ext>
+    </p:extLst>
+  </p:cSld>
+  <p:clrMapOvr>
+    <a:masterClrMapping/>
+  </p:clrMapOvr>
+</p:sld>
+</file>
+
+<file path=ppt/slides/slide22.xml><?xml version="1.0" encoding="utf-8"?>
+<p:sld xmlns:a="http://schemas.openxmlformats.org/drawingml/2006/main" xmlns:r="http://schemas.openxmlformats.org/officeDocument/2006/relationships" xmlns:p="http://schemas.openxmlformats.org/presentationml/2006/main">
+  <p:cSld>
+    <p:spTree>
+      <p:nvGrpSpPr>
+        <p:cNvPr id="1" name=""/>
+        <p:cNvGrpSpPr/>
+        <p:nvPr/>
+      </p:nvGrpSpPr>
+      <p:grpSpPr>
+        <a:xfrm>
+          <a:off x="0" y="0"/>
+          <a:ext cx="0" cy="0"/>
+          <a:chOff x="0" y="0"/>
+          <a:chExt cx="0" cy="0"/>
+        </a:xfrm>
+      </p:grpSpPr>
+      <p:sp>
+        <p:nvSpPr>
+          <p:cNvPr id="2" name="Título 1">
+            <a:extLst>
+              <a:ext uri="{FF2B5EF4-FFF2-40B4-BE49-F238E27FC236}">
+                <a16:creationId xmlns:a16="http://schemas.microsoft.com/office/drawing/2014/main" id="{9EA6D259-A816-8FE6-B466-CB883C28DDDA}"/>
+              </a:ext>
+            </a:extLst>
+          </p:cNvPr>
+          <p:cNvSpPr>
+            <a:spLocks noGrp="1"/>
+          </p:cNvSpPr>
+          <p:nvPr>
+            <p:ph type="title"/>
+          </p:nvPr>
+        </p:nvSpPr>
+        <p:spPr/>
+        <p:txBody>
+          <a:bodyPr/>
+          <a:lstStyle/>
+          <a:p>
+            <a:r>
+              <a:rPr lang="pt-BR" dirty="0"/>
+              <a:t>Projeto de banco de dados com Workbench</a:t>
+            </a:r>
+          </a:p>
+        </p:txBody>
+      </p:sp>
+      <p:sp>
+        <p:nvSpPr>
+          <p:cNvPr id="3" name="Espaço Reservado para Conteúdo 2">
+            <a:extLst>
+              <a:ext uri="{FF2B5EF4-FFF2-40B4-BE49-F238E27FC236}">
+                <a16:creationId xmlns:a16="http://schemas.microsoft.com/office/drawing/2014/main" id="{7739F476-096D-8072-2941-079CBDE41218}"/>
+              </a:ext>
+            </a:extLst>
+          </p:cNvPr>
+          <p:cNvSpPr>
+            <a:spLocks noGrp="1"/>
+          </p:cNvSpPr>
+          <p:nvPr>
+            <p:ph idx="1"/>
+          </p:nvPr>
+        </p:nvSpPr>
+        <p:spPr>
+          <a:xfrm>
+            <a:off x="1066800" y="2561378"/>
+            <a:ext cx="10058400" cy="1735244"/>
+          </a:xfrm>
+        </p:spPr>
+        <p:txBody>
+          <a:bodyPr>
+            <a:normAutofit/>
+          </a:bodyPr>
+          <a:lstStyle/>
+          <a:p>
+            <a:r>
+              <a:rPr lang="pt-BR" sz="2400" dirty="0"/>
+              <a:t>O desenvolvimento do projeto do Banco de Dados “Escola” dependerá da definição das diferentes entidades: professor, alunos, turmas e disciplinas.</a:t>
+            </a:r>
+          </a:p>
+          <a:p>
+            <a:r>
+              <a:rPr lang="pt-BR" sz="2400" dirty="0"/>
+              <a:t>Cada uma dessas entidades representam o minimundo que existe de forma independente – seja ela física (o aluno), ou conceitual (departamento da escola).</a:t>
+            </a:r>
+          </a:p>
+          <a:p>
+            <a:endParaRPr lang="pt-BR" sz="2200" dirty="0"/>
+          </a:p>
+        </p:txBody>
+      </p:sp>
+    </p:spTree>
+    <p:extLst>
+      <p:ext uri="{BB962C8B-B14F-4D97-AF65-F5344CB8AC3E}">
+        <p14:creationId xmlns:p14="http://schemas.microsoft.com/office/powerpoint/2010/main" val="3405594827"/>
+      </p:ext>
+    </p:extLst>
+  </p:cSld>
+  <p:clrMapOvr>
+    <a:masterClrMapping/>
+  </p:clrMapOvr>
+</p:sld>
+</file>
+
+<file path=ppt/slides/slide23.xml><?xml version="1.0" encoding="utf-8"?>
+<p:sld xmlns:a="http://schemas.openxmlformats.org/drawingml/2006/main" xmlns:r="http://schemas.openxmlformats.org/officeDocument/2006/relationships" xmlns:p="http://schemas.openxmlformats.org/presentationml/2006/main">
+  <p:cSld>
+    <p:spTree>
+      <p:nvGrpSpPr>
+        <p:cNvPr id="1" name=""/>
+        <p:cNvGrpSpPr/>
+        <p:nvPr/>
+      </p:nvGrpSpPr>
+      <p:grpSpPr>
+        <a:xfrm>
+          <a:off x="0" y="0"/>
+          <a:ext cx="0" cy="0"/>
+          <a:chOff x="0" y="0"/>
+          <a:chExt cx="0" cy="0"/>
+        </a:xfrm>
+      </p:grpSpPr>
+      <p:sp>
+        <p:nvSpPr>
+          <p:cNvPr id="2" name="Título 1">
+            <a:extLst>
+              <a:ext uri="{FF2B5EF4-FFF2-40B4-BE49-F238E27FC236}">
+                <a16:creationId xmlns:a16="http://schemas.microsoft.com/office/drawing/2014/main" id="{9EA6D259-A816-8FE6-B466-CB883C28DDDA}"/>
+              </a:ext>
+            </a:extLst>
+          </p:cNvPr>
+          <p:cNvSpPr>
+            <a:spLocks noGrp="1"/>
+          </p:cNvSpPr>
+          <p:nvPr>
+            <p:ph type="title"/>
+          </p:nvPr>
+        </p:nvSpPr>
+        <p:spPr/>
+        <p:txBody>
+          <a:bodyPr/>
+          <a:lstStyle/>
+          <a:p>
+            <a:r>
+              <a:rPr lang="pt-BR" dirty="0"/>
+              <a:t>Projeto de banco de dados com Workbench</a:t>
+            </a:r>
+          </a:p>
+        </p:txBody>
+      </p:sp>
+      <p:sp>
+        <p:nvSpPr>
+          <p:cNvPr id="3" name="Espaço Reservado para Conteúdo 2">
+            <a:extLst>
+              <a:ext uri="{FF2B5EF4-FFF2-40B4-BE49-F238E27FC236}">
+                <a16:creationId xmlns:a16="http://schemas.microsoft.com/office/drawing/2014/main" id="{7739F476-096D-8072-2941-079CBDE41218}"/>
+              </a:ext>
+            </a:extLst>
+          </p:cNvPr>
+          <p:cNvSpPr>
+            <a:spLocks noGrp="1"/>
+          </p:cNvSpPr>
+          <p:nvPr>
+            <p:ph idx="1"/>
+          </p:nvPr>
+        </p:nvSpPr>
+        <p:spPr>
+          <a:xfrm>
+            <a:off x="1097280" y="1845734"/>
+            <a:ext cx="10058400" cy="4023360"/>
+          </a:xfrm>
+        </p:spPr>
+        <p:txBody>
+          <a:bodyPr>
+            <a:normAutofit/>
+          </a:bodyPr>
+          <a:lstStyle/>
+          <a:p>
+            <a:r>
+              <a:rPr lang="pt-BR" sz="2400" dirty="0"/>
+              <a:t>O modelo relacional trata um Banco de Dados como um conjunto de relações, onde:</a:t>
+            </a:r>
+          </a:p>
+          <a:p>
+            <a:pPr lvl="1">
+              <a:buFont typeface="Wingdings" panose="05000000000000000000" pitchFamily="2" charset="2"/>
+              <a:buChar char="Ø"/>
+            </a:pPr>
+            <a:r>
+              <a:rPr lang="pt-BR" sz="2200" dirty="0"/>
+              <a:t> as </a:t>
+            </a:r>
+            <a:r>
+              <a:rPr lang="pt-BR" sz="2200" b="1" dirty="0"/>
+              <a:t>entidades</a:t>
+            </a:r>
+            <a:r>
+              <a:rPr lang="pt-BR" sz="2200" dirty="0"/>
+              <a:t> são transformadas em </a:t>
+            </a:r>
+            <a:r>
+              <a:rPr lang="pt-BR" sz="2200" b="1" dirty="0"/>
+              <a:t>tabelas</a:t>
+            </a:r>
+            <a:r>
+              <a:rPr lang="pt-BR" sz="2200" dirty="0"/>
+              <a:t>;</a:t>
+            </a:r>
+          </a:p>
+          <a:p>
+            <a:pPr lvl="1">
+              <a:buFont typeface="Wingdings" panose="05000000000000000000" pitchFamily="2" charset="2"/>
+              <a:buChar char="Ø"/>
+            </a:pPr>
+            <a:r>
+              <a:rPr lang="pt-BR" sz="2200" dirty="0"/>
+              <a:t> os </a:t>
+            </a:r>
+            <a:r>
+              <a:rPr lang="pt-BR" sz="2200" b="1" dirty="0"/>
+              <a:t>atributos </a:t>
+            </a:r>
+            <a:r>
+              <a:rPr lang="pt-BR" sz="2200" dirty="0"/>
+              <a:t>passam a ser chamados de </a:t>
+            </a:r>
+            <a:r>
+              <a:rPr lang="pt-BR" sz="2200" b="1" dirty="0"/>
+              <a:t>colunas</a:t>
+            </a:r>
+            <a:r>
+              <a:rPr lang="pt-BR" sz="2200" dirty="0"/>
+              <a:t>;</a:t>
+            </a:r>
+          </a:p>
+          <a:p>
+            <a:pPr lvl="1">
+              <a:buFont typeface="Wingdings" panose="05000000000000000000" pitchFamily="2" charset="2"/>
+              <a:buChar char="Ø"/>
+            </a:pPr>
+            <a:r>
+              <a:rPr lang="pt-BR" sz="2200" b="1" dirty="0"/>
+              <a:t> </a:t>
+            </a:r>
+            <a:r>
+              <a:rPr lang="pt-BR" sz="2200" dirty="0"/>
+              <a:t>as </a:t>
+            </a:r>
+            <a:r>
+              <a:rPr lang="pt-BR" sz="2200" b="1" dirty="0"/>
+              <a:t>linhas</a:t>
+            </a:r>
+            <a:r>
+              <a:rPr lang="pt-BR" sz="2200" dirty="0"/>
+              <a:t> são conhecidas como </a:t>
+            </a:r>
+            <a:r>
+              <a:rPr lang="pt-BR" sz="2200" b="1" dirty="0"/>
+              <a:t>tuplas</a:t>
+            </a:r>
+            <a:r>
+              <a:rPr lang="pt-BR" sz="2200" dirty="0"/>
+              <a:t>.</a:t>
+            </a:r>
+            <a:endParaRPr lang="pt-BR" sz="2200" b="1" dirty="0"/>
+          </a:p>
+          <a:p>
+            <a:endParaRPr lang="pt-BR" sz="2200" dirty="0"/>
+          </a:p>
+        </p:txBody>
+      </p:sp>
+      <p:graphicFrame>
+        <p:nvGraphicFramePr>
+          <p:cNvPr id="4" name="Tabela 3">
+            <a:extLst>
+              <a:ext uri="{FF2B5EF4-FFF2-40B4-BE49-F238E27FC236}">
+                <a16:creationId xmlns:a16="http://schemas.microsoft.com/office/drawing/2014/main" id="{6544F961-03DC-A5FA-DDDF-EB9C043B84FB}"/>
+              </a:ext>
+            </a:extLst>
+          </p:cNvPr>
+          <p:cNvGraphicFramePr>
+            <a:graphicFrameLocks noGrp="1"/>
+          </p:cNvGraphicFramePr>
+          <p:nvPr>
+            <p:extLst>
+              <p:ext uri="{D42A27DB-BD31-4B8C-83A1-F6EECF244321}">
+                <p14:modId xmlns:p14="http://schemas.microsoft.com/office/powerpoint/2010/main" val="3833896850"/>
+              </p:ext>
+            </p:extLst>
+          </p:nvPr>
+        </p:nvGraphicFramePr>
+        <p:xfrm>
+          <a:off x="1256031" y="4738954"/>
+          <a:ext cx="10464797" cy="1483360"/>
+        </p:xfrm>
+        <a:graphic>
+          <a:graphicData uri="http://schemas.openxmlformats.org/drawingml/2006/table">
+            <a:tbl>
+              <a:tblPr firstRow="1" bandRow="1">
+                <a:tableStyleId>{5940675A-B579-460E-94D1-54222C63F5DA}</a:tableStyleId>
+              </a:tblPr>
+              <a:tblGrid>
+                <a:gridCol w="1494971">
+                  <a:extLst>
+                    <a:ext uri="{9D8B030D-6E8A-4147-A177-3AD203B41FA5}">
+                      <a16:colId xmlns:a16="http://schemas.microsoft.com/office/drawing/2014/main" val="2350385302"/>
+                    </a:ext>
+                  </a:extLst>
+                </a:gridCol>
+                <a:gridCol w="1160599">
+                  <a:extLst>
+                    <a:ext uri="{9D8B030D-6E8A-4147-A177-3AD203B41FA5}">
+                      <a16:colId xmlns:a16="http://schemas.microsoft.com/office/drawing/2014/main" val="2529074609"/>
+                    </a:ext>
+                  </a:extLst>
+                </a:gridCol>
+                <a:gridCol w="1829343">
+                  <a:extLst>
+                    <a:ext uri="{9D8B030D-6E8A-4147-A177-3AD203B41FA5}">
+                      <a16:colId xmlns:a16="http://schemas.microsoft.com/office/drawing/2014/main" val="2586414683"/>
+                    </a:ext>
+                  </a:extLst>
+                </a:gridCol>
+                <a:gridCol w="1332957">
+                  <a:extLst>
+                    <a:ext uri="{9D8B030D-6E8A-4147-A177-3AD203B41FA5}">
+                      <a16:colId xmlns:a16="http://schemas.microsoft.com/office/drawing/2014/main" val="559240505"/>
+                    </a:ext>
+                  </a:extLst>
+                </a:gridCol>
+                <a:gridCol w="1695450">
+                  <a:extLst>
+                    <a:ext uri="{9D8B030D-6E8A-4147-A177-3AD203B41FA5}">
+                      <a16:colId xmlns:a16="http://schemas.microsoft.com/office/drawing/2014/main" val="3662511364"/>
+                    </a:ext>
+                  </a:extLst>
+                </a:gridCol>
+                <a:gridCol w="1456506">
+                  <a:extLst>
+                    <a:ext uri="{9D8B030D-6E8A-4147-A177-3AD203B41FA5}">
+                      <a16:colId xmlns:a16="http://schemas.microsoft.com/office/drawing/2014/main" val="3697257524"/>
+                    </a:ext>
+                  </a:extLst>
+                </a:gridCol>
+                <a:gridCol w="1494971">
+                  <a:extLst>
+                    <a:ext uri="{9D8B030D-6E8A-4147-A177-3AD203B41FA5}">
+                      <a16:colId xmlns:a16="http://schemas.microsoft.com/office/drawing/2014/main" val="1540098217"/>
+                    </a:ext>
+                  </a:extLst>
+                </a:gridCol>
+              </a:tblGrid>
+              <a:tr h="370840">
+                <a:tc>
+                  <a:txBody>
+                    <a:bodyPr/>
+                    <a:lstStyle/>
+                    <a:p>
+                      <a:pPr algn="ctr"/>
+                      <a:r>
+                        <a:rPr lang="pt-BR" dirty="0"/>
+                        <a:t>ID_ALUNO</a:t>
+                      </a:r>
+                    </a:p>
+                  </a:txBody>
+                  <a:tcPr/>
+                </a:tc>
+                <a:tc>
+                  <a:txBody>
+                    <a:bodyPr/>
+                    <a:lstStyle/>
+                    <a:p>
+                      <a:pPr algn="ctr"/>
+                      <a:r>
+                        <a:rPr lang="pt-BR" dirty="0"/>
+                        <a:t>NOME</a:t>
+                      </a:r>
+                    </a:p>
+                  </a:txBody>
+                  <a:tcPr/>
+                </a:tc>
+                <a:tc>
+                  <a:txBody>
+                    <a:bodyPr/>
+                    <a:lstStyle/>
+                    <a:p>
+                      <a:pPr algn="ctr"/>
+                      <a:r>
+                        <a:rPr lang="pt-BR" dirty="0"/>
+                        <a:t>CPF</a:t>
+                      </a:r>
+                    </a:p>
+                  </a:txBody>
+                  <a:tcPr/>
+                </a:tc>
+                <a:tc>
+                  <a:txBody>
+                    <a:bodyPr/>
+                    <a:lstStyle/>
+                    <a:p>
+                      <a:pPr algn="ctr"/>
+                      <a:r>
+                        <a:rPr lang="pt-BR" dirty="0"/>
+                        <a:t>TELEFONE</a:t>
+                      </a:r>
+                    </a:p>
+                  </a:txBody>
+                  <a:tcPr/>
+                </a:tc>
+                <a:tc>
+                  <a:txBody>
+                    <a:bodyPr/>
+                    <a:lstStyle/>
+                    <a:p>
+                      <a:pPr algn="ctr"/>
+                      <a:r>
+                        <a:rPr lang="pt-BR" dirty="0"/>
+                        <a:t>ENDEREÇO</a:t>
+                      </a:r>
+                    </a:p>
+                  </a:txBody>
+                  <a:tcPr/>
+                </a:tc>
+                <a:tc>
+                  <a:txBody>
+                    <a:bodyPr/>
+                    <a:lstStyle/>
+                    <a:p>
+                      <a:pPr algn="ctr"/>
+                      <a:r>
+                        <a:rPr lang="pt-BR" dirty="0"/>
+                        <a:t>NASCIMENTO</a:t>
+                      </a:r>
+                    </a:p>
+                  </a:txBody>
+                  <a:tcPr/>
+                </a:tc>
+                <a:tc>
+                  <a:txBody>
+                    <a:bodyPr/>
+                    <a:lstStyle/>
+                    <a:p>
+                      <a:pPr algn="ctr"/>
+                      <a:r>
+                        <a:rPr lang="pt-BR" dirty="0"/>
+                        <a:t>MEDIA</a:t>
+                      </a:r>
+                    </a:p>
+                  </a:txBody>
+                  <a:tcPr/>
+                </a:tc>
+                <a:extLst>
+                  <a:ext uri="{0D108BD9-81ED-4DB2-BD59-A6C34878D82A}">
+                    <a16:rowId xmlns:a16="http://schemas.microsoft.com/office/drawing/2014/main" val="3569760708"/>
+                  </a:ext>
+                </a:extLst>
+              </a:tr>
+              <a:tr h="370840">
+                <a:tc>
+                  <a:txBody>
+                    <a:bodyPr/>
+                    <a:lstStyle/>
+                    <a:p>
+                      <a:pPr algn="ctr"/>
+                      <a:r>
+                        <a:rPr lang="pt-BR" dirty="0"/>
+                        <a:t>1</a:t>
+                      </a:r>
+                    </a:p>
+                  </a:txBody>
+                  <a:tcPr/>
+                </a:tc>
+                <a:tc>
+                  <a:txBody>
+                    <a:bodyPr/>
+                    <a:lstStyle/>
+                    <a:p>
+                      <a:pPr algn="ctr"/>
+                      <a:r>
+                        <a:rPr lang="pt-BR" dirty="0"/>
+                        <a:t>ANDREY</a:t>
+                      </a:r>
+                    </a:p>
+                  </a:txBody>
+                  <a:tcPr/>
+                </a:tc>
+                <a:tc>
+                  <a:txBody>
+                    <a:bodyPr/>
+                    <a:lstStyle/>
+                    <a:p>
+                      <a:pPr algn="ctr"/>
+                      <a:r>
+                        <a:rPr lang="pt-BR" dirty="0"/>
+                        <a:t>111.222.333-44</a:t>
+                      </a:r>
+                    </a:p>
+                  </a:txBody>
+                  <a:tcPr/>
+                </a:tc>
+                <a:tc>
+                  <a:txBody>
+                    <a:bodyPr/>
+                    <a:lstStyle/>
+                    <a:p>
+                      <a:pPr algn="ctr"/>
+                      <a:r>
+                        <a:rPr lang="pt-BR" dirty="0"/>
+                        <a:t>XXXX-XXX1</a:t>
+                      </a:r>
+                    </a:p>
+                  </a:txBody>
+                  <a:tcPr/>
+                </a:tc>
+                <a:tc>
+                  <a:txBody>
+                    <a:bodyPr/>
+                    <a:lstStyle/>
+                    <a:p>
+                      <a:pPr algn="ctr"/>
+                      <a:r>
+                        <a:rPr lang="pt-BR" dirty="0"/>
+                        <a:t>RUA TRICOLO</a:t>
+                      </a:r>
+                    </a:p>
+                  </a:txBody>
+                  <a:tcPr/>
+                </a:tc>
+                <a:tc>
+                  <a:txBody>
+                    <a:bodyPr/>
+                    <a:lstStyle/>
+                    <a:p>
+                      <a:pPr algn="ctr"/>
+                      <a:r>
+                        <a:rPr lang="pt-BR" dirty="0"/>
+                        <a:t>XX/XX/2010</a:t>
+                      </a:r>
+                    </a:p>
+                  </a:txBody>
+                  <a:tcPr/>
+                </a:tc>
+                <a:tc>
+                  <a:txBody>
+                    <a:bodyPr/>
+                    <a:lstStyle/>
+                    <a:p>
+                      <a:pPr algn="ctr"/>
+                      <a:r>
+                        <a:rPr lang="pt-BR" dirty="0"/>
+                        <a:t>4,00</a:t>
+                      </a:r>
+                    </a:p>
+                  </a:txBody>
+                  <a:tcPr/>
+                </a:tc>
+                <a:extLst>
+                  <a:ext uri="{0D108BD9-81ED-4DB2-BD59-A6C34878D82A}">
+                    <a16:rowId xmlns:a16="http://schemas.microsoft.com/office/drawing/2014/main" val="2771087934"/>
+                  </a:ext>
+                </a:extLst>
+              </a:tr>
+              <a:tr h="370840">
+                <a:tc>
+                  <a:txBody>
+                    <a:bodyPr/>
+                    <a:lstStyle/>
+                    <a:p>
+                      <a:pPr algn="ctr"/>
+                      <a:r>
+                        <a:rPr lang="pt-BR" dirty="0"/>
+                        <a:t>2</a:t>
+                      </a:r>
+                    </a:p>
+                  </a:txBody>
+                  <a:tcPr/>
+                </a:tc>
+                <a:tc>
+                  <a:txBody>
+                    <a:bodyPr/>
+                    <a:lstStyle/>
+                    <a:p>
+                      <a:pPr algn="ctr"/>
+                      <a:r>
+                        <a:rPr lang="pt-BR" dirty="0"/>
+                        <a:t>NIKOLAS</a:t>
+                      </a:r>
+                    </a:p>
+                  </a:txBody>
+                  <a:tcPr/>
+                </a:tc>
+                <a:tc>
+                  <a:txBody>
+                    <a:bodyPr/>
+                    <a:lstStyle/>
+                    <a:p>
+                      <a:pPr algn="ctr"/>
+                      <a:r>
+                        <a:rPr lang="pt-BR" dirty="0"/>
+                        <a:t>222.333.444-55</a:t>
+                      </a:r>
+                    </a:p>
+                  </a:txBody>
+                  <a:tcPr/>
+                </a:tc>
+                <a:tc>
+                  <a:txBody>
+                    <a:bodyPr/>
+                    <a:lstStyle/>
+                    <a:p>
+                      <a:pPr algn="ctr"/>
+                      <a:r>
+                        <a:rPr lang="pt-BR" dirty="0"/>
+                        <a:t>XXXX-XXX2</a:t>
+                      </a:r>
+                    </a:p>
+                  </a:txBody>
+                  <a:tcPr/>
+                </a:tc>
+                <a:tc>
+                  <a:txBody>
+                    <a:bodyPr/>
+                    <a:lstStyle/>
+                    <a:p>
+                      <a:pPr algn="ctr"/>
+                      <a:r>
+                        <a:rPr lang="pt-BR" dirty="0"/>
+                        <a:t>RUA CALVO</a:t>
+                      </a:r>
+                    </a:p>
+                  </a:txBody>
+                  <a:tcPr/>
+                </a:tc>
+                <a:tc>
+                  <a:txBody>
+                    <a:bodyPr/>
+                    <a:lstStyle/>
+                    <a:p>
+                      <a:pPr algn="ctr"/>
+                      <a:r>
+                        <a:rPr lang="pt-BR" dirty="0"/>
+                        <a:t>XX/XX/2009</a:t>
+                      </a:r>
+                    </a:p>
+                  </a:txBody>
+                  <a:tcPr/>
+                </a:tc>
+                <a:tc>
+                  <a:txBody>
+                    <a:bodyPr/>
+                    <a:lstStyle/>
+                    <a:p>
+                      <a:pPr algn="ctr"/>
+                      <a:r>
+                        <a:rPr lang="pt-BR" dirty="0"/>
+                        <a:t>3,8</a:t>
+                      </a:r>
+                    </a:p>
+                  </a:txBody>
+                  <a:tcPr/>
+                </a:tc>
+                <a:extLst>
+                  <a:ext uri="{0D108BD9-81ED-4DB2-BD59-A6C34878D82A}">
+                    <a16:rowId xmlns:a16="http://schemas.microsoft.com/office/drawing/2014/main" val="2002037932"/>
+                  </a:ext>
+                </a:extLst>
+              </a:tr>
+              <a:tr h="370840">
+                <a:tc>
+                  <a:txBody>
+                    <a:bodyPr/>
+                    <a:lstStyle/>
+                    <a:p>
+                      <a:pPr algn="ctr"/>
+                      <a:r>
+                        <a:rPr lang="pt-BR" dirty="0"/>
+                        <a:t>3</a:t>
+                      </a:r>
+                    </a:p>
+                  </a:txBody>
+                  <a:tcPr/>
+                </a:tc>
+                <a:tc>
+                  <a:txBody>
+                    <a:bodyPr/>
+                    <a:lstStyle/>
+                    <a:p>
+                      <a:pPr algn="ctr"/>
+                      <a:r>
+                        <a:rPr lang="pt-BR" dirty="0"/>
+                        <a:t>TAIUMY</a:t>
+                      </a:r>
+                    </a:p>
+                  </a:txBody>
+                  <a:tcPr/>
+                </a:tc>
+                <a:tc>
+                  <a:txBody>
+                    <a:bodyPr/>
+                    <a:lstStyle/>
+                    <a:p>
+                      <a:pPr algn="ctr"/>
+                      <a:r>
+                        <a:rPr lang="pt-BR" dirty="0"/>
+                        <a:t>333.444.555-66</a:t>
+                      </a:r>
+                    </a:p>
+                  </a:txBody>
+                  <a:tcPr/>
+                </a:tc>
+                <a:tc>
+                  <a:txBody>
+                    <a:bodyPr/>
+                    <a:lstStyle/>
+                    <a:p>
+                      <a:pPr algn="ctr"/>
+                      <a:r>
+                        <a:rPr lang="pt-BR" dirty="0"/>
+                        <a:t>XXXX-XXX3</a:t>
+                      </a:r>
+                    </a:p>
+                  </a:txBody>
+                  <a:tcPr/>
+                </a:tc>
+                <a:tc>
+                  <a:txBody>
+                    <a:bodyPr/>
+                    <a:lstStyle/>
+                    <a:p>
+                      <a:pPr algn="ctr"/>
+                      <a:r>
+                        <a:rPr lang="pt-BR" dirty="0"/>
+                        <a:t>RUA VASCAÍNA</a:t>
+                      </a:r>
+                    </a:p>
+                  </a:txBody>
+                  <a:tcPr/>
+                </a:tc>
+                <a:tc>
+                  <a:txBody>
+                    <a:bodyPr/>
+                    <a:lstStyle/>
+                    <a:p>
+                      <a:pPr algn="ctr"/>
+                      <a:r>
+                        <a:rPr lang="pt-BR" dirty="0"/>
+                        <a:t>XX/XX/2011</a:t>
+                      </a:r>
+                    </a:p>
+                  </a:txBody>
+                  <a:tcPr/>
+                </a:tc>
+                <a:tc>
+                  <a:txBody>
+                    <a:bodyPr/>
+                    <a:lstStyle/>
+                    <a:p>
+                      <a:pPr algn="ctr"/>
+                      <a:r>
+                        <a:rPr lang="pt-BR" dirty="0"/>
+                        <a:t>5,4</a:t>
+                      </a:r>
+                    </a:p>
+                  </a:txBody>
+                  <a:tcPr/>
+                </a:tc>
+                <a:extLst>
+                  <a:ext uri="{0D108BD9-81ED-4DB2-BD59-A6C34878D82A}">
+                    <a16:rowId xmlns:a16="http://schemas.microsoft.com/office/drawing/2014/main" val="1511216699"/>
+                  </a:ext>
+                </a:extLst>
+              </a:tr>
+            </a:tbl>
+          </a:graphicData>
+        </a:graphic>
+      </p:graphicFrame>
+      <p:cxnSp>
+        <p:nvCxnSpPr>
+          <p:cNvPr id="10" name="Conector reto 9">
+            <a:extLst>
+              <a:ext uri="{FF2B5EF4-FFF2-40B4-BE49-F238E27FC236}">
+                <a16:creationId xmlns:a16="http://schemas.microsoft.com/office/drawing/2014/main" id="{DEFEFD86-331B-8683-1FC6-D395A521CE18}"/>
+              </a:ext>
+            </a:extLst>
+          </p:cNvPr>
+          <p:cNvCxnSpPr>
+            <a:cxnSpLocks/>
+          </p:cNvCxnSpPr>
+          <p:nvPr/>
+        </p:nvCxnSpPr>
+        <p:spPr>
+          <a:xfrm>
+            <a:off x="2068193" y="4226746"/>
+            <a:ext cx="8985886" cy="21166"/>
+          </a:xfrm>
+          <a:prstGeom prst="line">
+            <a:avLst/>
+          </a:prstGeom>
+          <a:ln>
+            <a:solidFill>
+              <a:srgbClr val="0070C0"/>
+            </a:solidFill>
+          </a:ln>
+        </p:spPr>
+        <p:style>
+          <a:lnRef idx="1">
+            <a:schemeClr val="accent1"/>
+          </a:lnRef>
+          <a:fillRef idx="0">
+            <a:schemeClr val="accent1"/>
+          </a:fillRef>
+          <a:effectRef idx="0">
+            <a:schemeClr val="accent1"/>
+          </a:effectRef>
+          <a:fontRef idx="minor">
+            <a:schemeClr val="tx1"/>
+          </a:fontRef>
+        </p:style>
+      </p:cxnSp>
+      <p:cxnSp>
+        <p:nvCxnSpPr>
+          <p:cNvPr id="17" name="Conector de Seta Reta 16">
+            <a:extLst>
+              <a:ext uri="{FF2B5EF4-FFF2-40B4-BE49-F238E27FC236}">
+                <a16:creationId xmlns:a16="http://schemas.microsoft.com/office/drawing/2014/main" id="{3C8363DB-4D43-2EBD-752E-5AE778521D04}"/>
+              </a:ext>
+            </a:extLst>
+          </p:cNvPr>
+          <p:cNvCxnSpPr>
+            <a:cxnSpLocks/>
+          </p:cNvCxnSpPr>
+          <p:nvPr/>
+        </p:nvCxnSpPr>
+        <p:spPr>
+          <a:xfrm>
+            <a:off x="9498329" y="4226746"/>
+            <a:ext cx="0" cy="433916"/>
+          </a:xfrm>
+          <a:prstGeom prst="straightConnector1">
+            <a:avLst/>
+          </a:prstGeom>
+          <a:ln>
+            <a:solidFill>
+              <a:srgbClr val="0070C0"/>
+            </a:solidFill>
+            <a:tailEnd type="triangle"/>
+          </a:ln>
+        </p:spPr>
+        <p:style>
+          <a:lnRef idx="1">
+            <a:schemeClr val="accent1"/>
+          </a:lnRef>
+          <a:fillRef idx="0">
+            <a:schemeClr val="accent1"/>
+          </a:fillRef>
+          <a:effectRef idx="0">
+            <a:schemeClr val="accent1"/>
+          </a:effectRef>
+          <a:fontRef idx="minor">
+            <a:schemeClr val="tx1"/>
+          </a:fontRef>
+        </p:style>
+      </p:cxnSp>
+      <p:cxnSp>
+        <p:nvCxnSpPr>
+          <p:cNvPr id="19" name="Conector de Seta Reta 18">
+            <a:extLst>
+              <a:ext uri="{FF2B5EF4-FFF2-40B4-BE49-F238E27FC236}">
+                <a16:creationId xmlns:a16="http://schemas.microsoft.com/office/drawing/2014/main" id="{1FCCF961-DDCB-C63D-5E92-F91857E2D2B3}"/>
+              </a:ext>
+            </a:extLst>
+          </p:cNvPr>
+          <p:cNvCxnSpPr>
+            <a:cxnSpLocks/>
+          </p:cNvCxnSpPr>
+          <p:nvPr/>
+        </p:nvCxnSpPr>
+        <p:spPr>
+          <a:xfrm>
+            <a:off x="11054079" y="4226746"/>
+            <a:ext cx="0" cy="433916"/>
+          </a:xfrm>
+          <a:prstGeom prst="straightConnector1">
+            <a:avLst/>
+          </a:prstGeom>
+          <a:ln>
+            <a:solidFill>
+              <a:srgbClr val="0070C0"/>
+            </a:solidFill>
+            <a:tailEnd type="triangle"/>
+          </a:ln>
+        </p:spPr>
+        <p:style>
+          <a:lnRef idx="1">
+            <a:schemeClr val="accent1"/>
+          </a:lnRef>
+          <a:fillRef idx="0">
+            <a:schemeClr val="accent1"/>
+          </a:fillRef>
+          <a:effectRef idx="0">
+            <a:schemeClr val="accent1"/>
+          </a:effectRef>
+          <a:fontRef idx="minor">
+            <a:schemeClr val="tx1"/>
+          </a:fontRef>
+        </p:style>
+      </p:cxnSp>
+      <p:cxnSp>
+        <p:nvCxnSpPr>
+          <p:cNvPr id="20" name="Conector de Seta Reta 19">
+            <a:extLst>
+              <a:ext uri="{FF2B5EF4-FFF2-40B4-BE49-F238E27FC236}">
+                <a16:creationId xmlns:a16="http://schemas.microsoft.com/office/drawing/2014/main" id="{C81970CF-8198-EFB8-D6AE-5972170C8184}"/>
+              </a:ext>
+            </a:extLst>
+          </p:cNvPr>
+          <p:cNvCxnSpPr>
+            <a:cxnSpLocks/>
+          </p:cNvCxnSpPr>
+          <p:nvPr/>
+        </p:nvCxnSpPr>
+        <p:spPr>
+          <a:xfrm>
+            <a:off x="7942579" y="4247912"/>
+            <a:ext cx="0" cy="433916"/>
+          </a:xfrm>
+          <a:prstGeom prst="straightConnector1">
+            <a:avLst/>
+          </a:prstGeom>
+          <a:ln>
+            <a:solidFill>
+              <a:srgbClr val="0070C0"/>
+            </a:solidFill>
+            <a:tailEnd type="triangle"/>
+          </a:ln>
+        </p:spPr>
+        <p:style>
+          <a:lnRef idx="1">
+            <a:schemeClr val="accent1"/>
+          </a:lnRef>
+          <a:fillRef idx="0">
+            <a:schemeClr val="accent1"/>
+          </a:fillRef>
+          <a:effectRef idx="0">
+            <a:schemeClr val="accent1"/>
+          </a:effectRef>
+          <a:fontRef idx="minor">
+            <a:schemeClr val="tx1"/>
+          </a:fontRef>
+        </p:style>
+      </p:cxnSp>
+      <p:cxnSp>
+        <p:nvCxnSpPr>
+          <p:cNvPr id="21" name="Conector de Seta Reta 20">
+            <a:extLst>
+              <a:ext uri="{FF2B5EF4-FFF2-40B4-BE49-F238E27FC236}">
+                <a16:creationId xmlns:a16="http://schemas.microsoft.com/office/drawing/2014/main" id="{B5949B92-A7EE-4098-42F3-19BB1AC94A59}"/>
+              </a:ext>
+            </a:extLst>
+          </p:cNvPr>
+          <p:cNvCxnSpPr>
+            <a:cxnSpLocks/>
+          </p:cNvCxnSpPr>
+          <p:nvPr/>
+        </p:nvCxnSpPr>
+        <p:spPr>
+          <a:xfrm>
+            <a:off x="6488429" y="4247912"/>
+            <a:ext cx="0" cy="433916"/>
+          </a:xfrm>
+          <a:prstGeom prst="straightConnector1">
+            <a:avLst/>
+          </a:prstGeom>
+          <a:ln>
+            <a:solidFill>
+              <a:srgbClr val="0070C0"/>
+            </a:solidFill>
+            <a:tailEnd type="triangle"/>
+          </a:ln>
+        </p:spPr>
+        <p:style>
+          <a:lnRef idx="1">
+            <a:schemeClr val="accent1"/>
+          </a:lnRef>
+          <a:fillRef idx="0">
+            <a:schemeClr val="accent1"/>
+          </a:fillRef>
+          <a:effectRef idx="0">
+            <a:schemeClr val="accent1"/>
+          </a:effectRef>
+          <a:fontRef idx="minor">
+            <a:schemeClr val="tx1"/>
+          </a:fontRef>
+        </p:style>
+      </p:cxnSp>
+      <p:cxnSp>
+        <p:nvCxnSpPr>
+          <p:cNvPr id="22" name="Conector de Seta Reta 21">
+            <a:extLst>
+              <a:ext uri="{FF2B5EF4-FFF2-40B4-BE49-F238E27FC236}">
+                <a16:creationId xmlns:a16="http://schemas.microsoft.com/office/drawing/2014/main" id="{6930E1A2-C99D-EB8E-2847-BFE79C738272}"/>
+              </a:ext>
+            </a:extLst>
+          </p:cNvPr>
+          <p:cNvCxnSpPr>
+            <a:cxnSpLocks/>
+          </p:cNvCxnSpPr>
+          <p:nvPr/>
+        </p:nvCxnSpPr>
+        <p:spPr>
+          <a:xfrm>
+            <a:off x="4831078" y="4226746"/>
+            <a:ext cx="0" cy="433916"/>
+          </a:xfrm>
+          <a:prstGeom prst="straightConnector1">
+            <a:avLst/>
+          </a:prstGeom>
+          <a:ln>
+            <a:solidFill>
+              <a:srgbClr val="0070C0"/>
+            </a:solidFill>
+            <a:tailEnd type="triangle"/>
+          </a:ln>
+        </p:spPr>
+        <p:style>
+          <a:lnRef idx="1">
+            <a:schemeClr val="accent1"/>
+          </a:lnRef>
+          <a:fillRef idx="0">
+            <a:schemeClr val="accent1"/>
+          </a:fillRef>
+          <a:effectRef idx="0">
+            <a:schemeClr val="accent1"/>
+          </a:effectRef>
+          <a:fontRef idx="minor">
+            <a:schemeClr val="tx1"/>
+          </a:fontRef>
+        </p:style>
+      </p:cxnSp>
+      <p:cxnSp>
+        <p:nvCxnSpPr>
+          <p:cNvPr id="23" name="Conector de Seta Reta 22">
+            <a:extLst>
+              <a:ext uri="{FF2B5EF4-FFF2-40B4-BE49-F238E27FC236}">
+                <a16:creationId xmlns:a16="http://schemas.microsoft.com/office/drawing/2014/main" id="{4E386376-C2CB-25CA-3168-16B4A83AEDE5}"/>
+              </a:ext>
+            </a:extLst>
+          </p:cNvPr>
+          <p:cNvCxnSpPr>
+            <a:cxnSpLocks/>
+          </p:cNvCxnSpPr>
+          <p:nvPr/>
+        </p:nvCxnSpPr>
+        <p:spPr>
+          <a:xfrm>
+            <a:off x="3402328" y="4226746"/>
+            <a:ext cx="0" cy="433916"/>
+          </a:xfrm>
+          <a:prstGeom prst="straightConnector1">
+            <a:avLst/>
+          </a:prstGeom>
+          <a:ln>
+            <a:solidFill>
+              <a:srgbClr val="0070C0"/>
+            </a:solidFill>
+            <a:tailEnd type="triangle"/>
+          </a:ln>
+        </p:spPr>
+        <p:style>
+          <a:lnRef idx="1">
+            <a:schemeClr val="accent1"/>
+          </a:lnRef>
+          <a:fillRef idx="0">
+            <a:schemeClr val="accent1"/>
+          </a:fillRef>
+          <a:effectRef idx="0">
+            <a:schemeClr val="accent1"/>
+          </a:effectRef>
+          <a:fontRef idx="minor">
+            <a:schemeClr val="tx1"/>
+          </a:fontRef>
+        </p:style>
+      </p:cxnSp>
+      <p:cxnSp>
+        <p:nvCxnSpPr>
+          <p:cNvPr id="24" name="Conector de Seta Reta 23">
+            <a:extLst>
+              <a:ext uri="{FF2B5EF4-FFF2-40B4-BE49-F238E27FC236}">
+                <a16:creationId xmlns:a16="http://schemas.microsoft.com/office/drawing/2014/main" id="{CB317743-D5ED-D146-74AD-415279B51F2D}"/>
+              </a:ext>
+            </a:extLst>
+          </p:cNvPr>
+          <p:cNvCxnSpPr>
+            <a:cxnSpLocks/>
+          </p:cNvCxnSpPr>
+          <p:nvPr/>
+        </p:nvCxnSpPr>
+        <p:spPr>
+          <a:xfrm>
+            <a:off x="2073271" y="4226746"/>
+            <a:ext cx="0" cy="433916"/>
+          </a:xfrm>
+          <a:prstGeom prst="straightConnector1">
+            <a:avLst/>
+          </a:prstGeom>
+          <a:ln>
+            <a:solidFill>
+              <a:srgbClr val="0070C0"/>
+            </a:solidFill>
+            <a:tailEnd type="triangle"/>
+          </a:ln>
+        </p:spPr>
+        <p:style>
+          <a:lnRef idx="1">
+            <a:schemeClr val="accent1"/>
+          </a:lnRef>
+          <a:fillRef idx="0">
+            <a:schemeClr val="accent1"/>
+          </a:fillRef>
+          <a:effectRef idx="0">
+            <a:schemeClr val="accent1"/>
+          </a:effectRef>
+          <a:fontRef idx="minor">
+            <a:schemeClr val="tx1"/>
+          </a:fontRef>
+        </p:style>
+      </p:cxnSp>
+      <p:cxnSp>
+        <p:nvCxnSpPr>
+          <p:cNvPr id="25" name="Conector de Seta Reta 24">
+            <a:extLst>
+              <a:ext uri="{FF2B5EF4-FFF2-40B4-BE49-F238E27FC236}">
+                <a16:creationId xmlns:a16="http://schemas.microsoft.com/office/drawing/2014/main" id="{FABFDF0E-B248-A179-0492-9122D575DEAF}"/>
+              </a:ext>
+            </a:extLst>
+          </p:cNvPr>
+          <p:cNvCxnSpPr>
+            <a:cxnSpLocks/>
+          </p:cNvCxnSpPr>
+          <p:nvPr/>
+        </p:nvCxnSpPr>
+        <p:spPr>
+          <a:xfrm>
+            <a:off x="657219" y="5293546"/>
+            <a:ext cx="454031" cy="0"/>
+          </a:xfrm>
+          <a:prstGeom prst="straightConnector1">
+            <a:avLst/>
+          </a:prstGeom>
+          <a:ln>
+            <a:solidFill>
+              <a:srgbClr val="FF0000"/>
+            </a:solidFill>
+            <a:tailEnd type="triangle"/>
+          </a:ln>
+        </p:spPr>
+        <p:style>
+          <a:lnRef idx="1">
+            <a:schemeClr val="accent1"/>
+          </a:lnRef>
+          <a:fillRef idx="0">
+            <a:schemeClr val="accent1"/>
+          </a:fillRef>
+          <a:effectRef idx="0">
+            <a:schemeClr val="accent1"/>
+          </a:effectRef>
+          <a:fontRef idx="minor">
+            <a:schemeClr val="tx1"/>
+          </a:fontRef>
+        </p:style>
+      </p:cxnSp>
+      <p:cxnSp>
+        <p:nvCxnSpPr>
+          <p:cNvPr id="27" name="Conector de Seta Reta 26">
+            <a:extLst>
+              <a:ext uri="{FF2B5EF4-FFF2-40B4-BE49-F238E27FC236}">
+                <a16:creationId xmlns:a16="http://schemas.microsoft.com/office/drawing/2014/main" id="{FE4436F9-4C9E-0682-328F-772E8413EA4E}"/>
+              </a:ext>
+            </a:extLst>
+          </p:cNvPr>
+          <p:cNvCxnSpPr>
+            <a:cxnSpLocks/>
+          </p:cNvCxnSpPr>
+          <p:nvPr/>
+        </p:nvCxnSpPr>
+        <p:spPr>
+          <a:xfrm>
+            <a:off x="657220" y="5680896"/>
+            <a:ext cx="454029" cy="0"/>
+          </a:xfrm>
+          <a:prstGeom prst="straightConnector1">
+            <a:avLst/>
+          </a:prstGeom>
+          <a:ln>
+            <a:solidFill>
+              <a:srgbClr val="FF0000"/>
+            </a:solidFill>
+            <a:tailEnd type="triangle"/>
+          </a:ln>
+        </p:spPr>
+        <p:style>
+          <a:lnRef idx="1">
+            <a:schemeClr val="accent1"/>
+          </a:lnRef>
+          <a:fillRef idx="0">
+            <a:schemeClr val="accent1"/>
+          </a:fillRef>
+          <a:effectRef idx="0">
+            <a:schemeClr val="accent1"/>
+          </a:effectRef>
+          <a:fontRef idx="minor">
+            <a:schemeClr val="tx1"/>
+          </a:fontRef>
+        </p:style>
+      </p:cxnSp>
+      <p:cxnSp>
+        <p:nvCxnSpPr>
+          <p:cNvPr id="28" name="Conector de Seta Reta 27">
+            <a:extLst>
+              <a:ext uri="{FF2B5EF4-FFF2-40B4-BE49-F238E27FC236}">
+                <a16:creationId xmlns:a16="http://schemas.microsoft.com/office/drawing/2014/main" id="{0D6FE910-6A28-207F-FE67-EE1D7E6CDEBF}"/>
+              </a:ext>
+            </a:extLst>
+          </p:cNvPr>
+          <p:cNvCxnSpPr>
+            <a:cxnSpLocks/>
+          </p:cNvCxnSpPr>
+          <p:nvPr/>
+        </p:nvCxnSpPr>
+        <p:spPr>
+          <a:xfrm>
+            <a:off x="657219" y="6068246"/>
+            <a:ext cx="454029" cy="0"/>
+          </a:xfrm>
+          <a:prstGeom prst="straightConnector1">
+            <a:avLst/>
+          </a:prstGeom>
+          <a:ln>
+            <a:solidFill>
+              <a:srgbClr val="FF0000"/>
+            </a:solidFill>
+            <a:tailEnd type="triangle"/>
+          </a:ln>
+        </p:spPr>
+        <p:style>
+          <a:lnRef idx="1">
+            <a:schemeClr val="accent1"/>
+          </a:lnRef>
+          <a:fillRef idx="0">
+            <a:schemeClr val="accent1"/>
+          </a:fillRef>
+          <a:effectRef idx="0">
+            <a:schemeClr val="accent1"/>
+          </a:effectRef>
+          <a:fontRef idx="minor">
+            <a:schemeClr val="tx1"/>
+          </a:fontRef>
+        </p:style>
+      </p:cxnSp>
+      <p:cxnSp>
+        <p:nvCxnSpPr>
+          <p:cNvPr id="30" name="Conector reto 29">
+            <a:extLst>
+              <a:ext uri="{FF2B5EF4-FFF2-40B4-BE49-F238E27FC236}">
+                <a16:creationId xmlns:a16="http://schemas.microsoft.com/office/drawing/2014/main" id="{FDB3EDD2-6B27-280D-F8F2-11D47028F014}"/>
+              </a:ext>
+            </a:extLst>
+          </p:cNvPr>
+          <p:cNvCxnSpPr>
+            <a:cxnSpLocks/>
+          </p:cNvCxnSpPr>
+          <p:nvPr/>
+        </p:nvCxnSpPr>
+        <p:spPr>
+          <a:xfrm>
+            <a:off x="657220" y="5293546"/>
+            <a:ext cx="0" cy="779992"/>
+          </a:xfrm>
+          <a:prstGeom prst="line">
+            <a:avLst/>
+          </a:prstGeom>
+          <a:ln>
+            <a:solidFill>
+              <a:srgbClr val="FF0000"/>
+            </a:solidFill>
+          </a:ln>
+        </p:spPr>
+        <p:style>
+          <a:lnRef idx="1">
+            <a:schemeClr val="accent1"/>
+          </a:lnRef>
+          <a:fillRef idx="0">
+            <a:schemeClr val="accent1"/>
+          </a:fillRef>
+          <a:effectRef idx="0">
+            <a:schemeClr val="accent1"/>
+          </a:effectRef>
+          <a:fontRef idx="minor">
+            <a:schemeClr val="tx1"/>
+          </a:fontRef>
+        </p:style>
+      </p:cxnSp>
+      <p:sp>
+        <p:nvSpPr>
+          <p:cNvPr id="34" name="CaixaDeTexto 33">
+            <a:extLst>
+              <a:ext uri="{FF2B5EF4-FFF2-40B4-BE49-F238E27FC236}">
+                <a16:creationId xmlns:a16="http://schemas.microsoft.com/office/drawing/2014/main" id="{A94D0E9F-56B8-230D-1C66-6C3664FCA6DC}"/>
+              </a:ext>
+            </a:extLst>
+          </p:cNvPr>
+          <p:cNvSpPr txBox="1"/>
+          <p:nvPr/>
+        </p:nvSpPr>
+        <p:spPr>
+          <a:xfrm>
+            <a:off x="5872973" y="3857414"/>
+            <a:ext cx="1230914" cy="369332"/>
+          </a:xfrm>
+          <a:prstGeom prst="rect">
+            <a:avLst/>
+          </a:prstGeom>
+          <a:noFill/>
+        </p:spPr>
+        <p:txBody>
+          <a:bodyPr wrap="none" rtlCol="0">
+            <a:spAutoFit/>
+          </a:bodyPr>
+          <a:lstStyle/>
+          <a:p>
+            <a:r>
+              <a:rPr lang="pt-BR" dirty="0"/>
+              <a:t>ATRIBUTOS</a:t>
+            </a:r>
+          </a:p>
+        </p:txBody>
+      </p:sp>
+      <p:sp>
+        <p:nvSpPr>
+          <p:cNvPr id="40" name="CaixaDeTexto 39">
+            <a:extLst>
+              <a:ext uri="{FF2B5EF4-FFF2-40B4-BE49-F238E27FC236}">
+                <a16:creationId xmlns:a16="http://schemas.microsoft.com/office/drawing/2014/main" id="{8FE5F85B-EC0B-4B3B-0121-23785ABF2D79}"/>
+              </a:ext>
+            </a:extLst>
+          </p:cNvPr>
+          <p:cNvSpPr txBox="1"/>
+          <p:nvPr/>
+        </p:nvSpPr>
+        <p:spPr>
+          <a:xfrm>
+            <a:off x="57021" y="5027322"/>
+            <a:ext cx="899605" cy="369332"/>
+          </a:xfrm>
+          <a:prstGeom prst="rect">
+            <a:avLst/>
+          </a:prstGeom>
+          <a:noFill/>
+        </p:spPr>
+        <p:txBody>
+          <a:bodyPr wrap="none" rtlCol="0">
+            <a:spAutoFit/>
+          </a:bodyPr>
+          <a:lstStyle/>
+          <a:p>
+            <a:r>
+              <a:rPr lang="pt-BR" dirty="0"/>
+              <a:t>TUPLAS</a:t>
+            </a:r>
+          </a:p>
+        </p:txBody>
+      </p:sp>
+      <p:sp>
+        <p:nvSpPr>
+          <p:cNvPr id="41" name="CaixaDeTexto 40">
+            <a:extLst>
+              <a:ext uri="{FF2B5EF4-FFF2-40B4-BE49-F238E27FC236}">
+                <a16:creationId xmlns:a16="http://schemas.microsoft.com/office/drawing/2014/main" id="{2CB17454-797F-687B-836F-CFC7276BA79C}"/>
+              </a:ext>
+            </a:extLst>
+          </p:cNvPr>
+          <p:cNvSpPr txBox="1"/>
+          <p:nvPr/>
+        </p:nvSpPr>
+        <p:spPr>
+          <a:xfrm>
+            <a:off x="57021" y="4053477"/>
+            <a:ext cx="1840440" cy="646331"/>
+          </a:xfrm>
+          <a:prstGeom prst="rect">
+            <a:avLst/>
+          </a:prstGeom>
+          <a:noFill/>
+        </p:spPr>
+        <p:txBody>
+          <a:bodyPr wrap="none" rtlCol="0">
+            <a:spAutoFit/>
+          </a:bodyPr>
+          <a:lstStyle/>
+          <a:p>
+            <a:r>
+              <a:rPr lang="pt-BR" dirty="0"/>
+              <a:t>Nome da relação:</a:t>
+            </a:r>
+          </a:p>
+          <a:p>
+            <a:r>
+              <a:rPr lang="pt-BR" dirty="0"/>
+              <a:t>ALUNOS</a:t>
+            </a:r>
+          </a:p>
+        </p:txBody>
+      </p:sp>
+    </p:spTree>
+    <p:extLst>
+      <p:ext uri="{BB962C8B-B14F-4D97-AF65-F5344CB8AC3E}">
+        <p14:creationId xmlns:p14="http://schemas.microsoft.com/office/powerpoint/2010/main" val="1305847619"/>
+      </p:ext>
+    </p:extLst>
+  </p:cSld>
+  <p:clrMapOvr>
+    <a:masterClrMapping/>
+  </p:clrMapOvr>
+</p:sld>
+</file>
+
+<file path=ppt/slides/slide24.xml><?xml version="1.0" encoding="utf-8"?>
+<p:sld xmlns:a="http://schemas.openxmlformats.org/drawingml/2006/main" xmlns:r="http://schemas.openxmlformats.org/officeDocument/2006/relationships" xmlns:p="http://schemas.openxmlformats.org/presentationml/2006/main">
+  <p:cSld>
+    <p:spTree>
+      <p:nvGrpSpPr>
+        <p:cNvPr id="1" name=""/>
+        <p:cNvGrpSpPr/>
+        <p:nvPr/>
+      </p:nvGrpSpPr>
+      <p:grpSpPr>
+        <a:xfrm>
+          <a:off x="0" y="0"/>
+          <a:ext cx="0" cy="0"/>
+          <a:chOff x="0" y="0"/>
+          <a:chExt cx="0" cy="0"/>
+        </a:xfrm>
+      </p:grpSpPr>
+      <p:sp>
+        <p:nvSpPr>
+          <p:cNvPr id="2" name="Título 1">
+            <a:extLst>
+              <a:ext uri="{FF2B5EF4-FFF2-40B4-BE49-F238E27FC236}">
+                <a16:creationId xmlns:a16="http://schemas.microsoft.com/office/drawing/2014/main" id="{9EA6D259-A816-8FE6-B466-CB883C28DDDA}"/>
+              </a:ext>
+            </a:extLst>
+          </p:cNvPr>
+          <p:cNvSpPr>
+            <a:spLocks noGrp="1"/>
+          </p:cNvSpPr>
+          <p:nvPr>
+            <p:ph type="title"/>
+          </p:nvPr>
+        </p:nvSpPr>
+        <p:spPr/>
+        <p:txBody>
+          <a:bodyPr/>
+          <a:lstStyle/>
+          <a:p>
+            <a:r>
+              <a:rPr lang="pt-BR" dirty="0"/>
+              <a:t>Projeto de banco de dados com Workbench</a:t>
+            </a:r>
+          </a:p>
+        </p:txBody>
+      </p:sp>
+      <p:sp>
+        <p:nvSpPr>
+          <p:cNvPr id="3" name="Espaço Reservado para Conteúdo 2">
+            <a:extLst>
+              <a:ext uri="{FF2B5EF4-FFF2-40B4-BE49-F238E27FC236}">
+                <a16:creationId xmlns:a16="http://schemas.microsoft.com/office/drawing/2014/main" id="{7739F476-096D-8072-2941-079CBDE41218}"/>
+              </a:ext>
+            </a:extLst>
+          </p:cNvPr>
+          <p:cNvSpPr>
+            <a:spLocks noGrp="1"/>
+          </p:cNvSpPr>
+          <p:nvPr>
+            <p:ph idx="1"/>
+          </p:nvPr>
+        </p:nvSpPr>
+        <p:spPr>
+          <a:xfrm>
+            <a:off x="1097280" y="1845734"/>
+            <a:ext cx="10058400" cy="4023360"/>
+          </a:xfrm>
+        </p:spPr>
+        <p:txBody>
+          <a:bodyPr>
+            <a:normAutofit/>
+          </a:bodyPr>
+          <a:lstStyle/>
+          <a:p>
+            <a:r>
+              <a:rPr lang="pt-BR" sz="2400" dirty="0"/>
+              <a:t>Entre os atributos da entidade, são escolhidos no mínimo um para ser a chave primária e a chave estrangeira de cada entidade. Essas chaves são a identificação da tabela, usadas em futuras consultas e relações.</a:t>
+            </a:r>
+          </a:p>
+          <a:p>
+            <a:r>
+              <a:rPr lang="pt-BR" sz="2400" dirty="0"/>
+              <a:t>Além disso, é decidido qual é o </a:t>
+            </a:r>
+            <a:r>
+              <a:rPr lang="pt-BR" sz="2400" b="1" dirty="0"/>
+              <a:t>tipo </a:t>
+            </a:r>
+            <a:r>
+              <a:rPr lang="pt-BR" sz="2400" dirty="0"/>
+              <a:t>de dados que será representado por um </a:t>
+            </a:r>
+            <a:r>
+              <a:rPr lang="pt-BR" sz="2400" b="1" dirty="0"/>
+              <a:t>domínio </a:t>
+            </a:r>
+            <a:r>
+              <a:rPr lang="pt-BR" sz="2400" dirty="0"/>
+              <a:t>de possíveis valores.</a:t>
+            </a:r>
+          </a:p>
+        </p:txBody>
+      </p:sp>
+    </p:spTree>
+    <p:extLst>
+      <p:ext uri="{BB962C8B-B14F-4D97-AF65-F5344CB8AC3E}">
+        <p14:creationId xmlns:p14="http://schemas.microsoft.com/office/powerpoint/2010/main" val="363485758"/>
+      </p:ext>
+    </p:extLst>
+  </p:cSld>
+  <p:clrMapOvr>
+    <a:masterClrMapping/>
+  </p:clrMapOvr>
+</p:sld>
+</file>
+
+<file path=ppt/slides/slide25.xml><?xml version="1.0" encoding="utf-8"?>
+<p:sld xmlns:a="http://schemas.openxmlformats.org/drawingml/2006/main" xmlns:r="http://schemas.openxmlformats.org/officeDocument/2006/relationships" xmlns:p="http://schemas.openxmlformats.org/presentationml/2006/main">
+  <p:cSld>
+    <p:spTree>
+      <p:nvGrpSpPr>
+        <p:cNvPr id="1" name=""/>
+        <p:cNvGrpSpPr/>
+        <p:nvPr/>
+      </p:nvGrpSpPr>
+      <p:grpSpPr>
+        <a:xfrm>
+          <a:off x="0" y="0"/>
+          <a:ext cx="0" cy="0"/>
+          <a:chOff x="0" y="0"/>
+          <a:chExt cx="0" cy="0"/>
+        </a:xfrm>
+      </p:grpSpPr>
+      <p:sp>
+        <p:nvSpPr>
+          <p:cNvPr id="2" name="Título 1">
+            <a:extLst>
+              <a:ext uri="{FF2B5EF4-FFF2-40B4-BE49-F238E27FC236}">
+                <a16:creationId xmlns:a16="http://schemas.microsoft.com/office/drawing/2014/main" id="{9EA6D259-A816-8FE6-B466-CB883C28DDDA}"/>
+              </a:ext>
+            </a:extLst>
+          </p:cNvPr>
+          <p:cNvSpPr>
+            <a:spLocks noGrp="1"/>
+          </p:cNvSpPr>
+          <p:nvPr>
+            <p:ph type="title"/>
+          </p:nvPr>
+        </p:nvSpPr>
+        <p:spPr/>
+        <p:txBody>
+          <a:bodyPr/>
+          <a:lstStyle/>
+          <a:p>
+            <a:r>
+              <a:rPr lang="pt-BR" dirty="0"/>
+              <a:t>Projeto de banco de dados com Workbench</a:t>
+            </a:r>
+          </a:p>
+        </p:txBody>
+      </p:sp>
+      <p:sp>
+        <p:nvSpPr>
+          <p:cNvPr id="3" name="Espaço Reservado para Conteúdo 2">
+            <a:extLst>
+              <a:ext uri="{FF2B5EF4-FFF2-40B4-BE49-F238E27FC236}">
+                <a16:creationId xmlns:a16="http://schemas.microsoft.com/office/drawing/2014/main" id="{7739F476-096D-8072-2941-079CBDE41218}"/>
+              </a:ext>
+            </a:extLst>
+          </p:cNvPr>
+          <p:cNvSpPr>
+            <a:spLocks noGrp="1"/>
+          </p:cNvSpPr>
+          <p:nvPr>
+            <p:ph idx="1"/>
+          </p:nvPr>
+        </p:nvSpPr>
+        <p:spPr>
+          <a:xfrm>
+            <a:off x="1097280" y="1845734"/>
+            <a:ext cx="10058400" cy="4023360"/>
+          </a:xfrm>
+        </p:spPr>
+        <p:txBody>
+          <a:bodyPr>
+            <a:normAutofit/>
+          </a:bodyPr>
+          <a:lstStyle/>
+          <a:p>
+            <a:r>
+              <a:rPr lang="pt-BR" sz="2400" dirty="0"/>
+              <a:t>Na entidade </a:t>
+            </a:r>
+            <a:r>
+              <a:rPr lang="pt-BR" sz="2400" b="1" dirty="0"/>
+              <a:t>Professor</a:t>
+            </a:r>
+            <a:r>
+              <a:rPr lang="pt-BR" sz="2400" dirty="0"/>
+              <a:t>, seus atributos são: ID, CPF, nome, endereço, sexo, salário e o código da disciplina. Então, as suas colunas serão nomeadas como:</a:t>
+            </a:r>
+          </a:p>
+          <a:p>
+            <a:pPr lvl="1">
+              <a:buFont typeface="Wingdings" panose="05000000000000000000" pitchFamily="2" charset="2"/>
+              <a:buChar char="Ø"/>
+            </a:pPr>
+            <a:r>
+              <a:rPr lang="pt-BR" sz="2200" dirty="0"/>
+              <a:t> ID_PROFESSOR (</a:t>
+            </a:r>
+            <a:r>
+              <a:rPr lang="pt-BR" sz="2200" b="1" dirty="0"/>
+              <a:t>Primary Key</a:t>
+            </a:r>
+            <a:r>
+              <a:rPr lang="pt-BR" sz="2200" dirty="0"/>
+              <a:t>);</a:t>
+            </a:r>
+          </a:p>
+          <a:p>
+            <a:pPr lvl="1">
+              <a:buFont typeface="Wingdings" panose="05000000000000000000" pitchFamily="2" charset="2"/>
+              <a:buChar char="Ø"/>
+            </a:pPr>
+            <a:r>
+              <a:rPr lang="pt-BR" sz="2200" dirty="0"/>
+              <a:t> NOME_PROFESSOR;</a:t>
+            </a:r>
+          </a:p>
+          <a:p>
+            <a:pPr lvl="1">
+              <a:buFont typeface="Wingdings" panose="05000000000000000000" pitchFamily="2" charset="2"/>
+              <a:buChar char="Ø"/>
+            </a:pPr>
+            <a:r>
+              <a:rPr lang="pt-BR" sz="2200" dirty="0"/>
+              <a:t> ENDERECO_PROFESSOR;</a:t>
+            </a:r>
+          </a:p>
+          <a:p>
+            <a:pPr lvl="1">
+              <a:buFont typeface="Wingdings" panose="05000000000000000000" pitchFamily="2" charset="2"/>
+              <a:buChar char="Ø"/>
+            </a:pPr>
+            <a:r>
+              <a:rPr lang="pt-BR" sz="2200" dirty="0"/>
+              <a:t> SEXO;</a:t>
+            </a:r>
+          </a:p>
+          <a:p>
+            <a:pPr lvl="1">
+              <a:buFont typeface="Wingdings" panose="05000000000000000000" pitchFamily="2" charset="2"/>
+              <a:buChar char="Ø"/>
+            </a:pPr>
+            <a:r>
+              <a:rPr lang="pt-BR" sz="2200" dirty="0"/>
+              <a:t> SALARIO;</a:t>
+            </a:r>
+          </a:p>
+          <a:p>
+            <a:pPr lvl="1">
+              <a:buFont typeface="Wingdings" panose="05000000000000000000" pitchFamily="2" charset="2"/>
+              <a:buChar char="Ø"/>
+            </a:pPr>
+            <a:r>
+              <a:rPr lang="pt-BR" sz="2200" dirty="0"/>
+              <a:t> ID_DISCIPLINA </a:t>
+            </a:r>
+          </a:p>
+        </p:txBody>
+      </p:sp>
+    </p:spTree>
+    <p:extLst>
+      <p:ext uri="{BB962C8B-B14F-4D97-AF65-F5344CB8AC3E}">
+        <p14:creationId xmlns:p14="http://schemas.microsoft.com/office/powerpoint/2010/main" val="1717794549"/>
+      </p:ext>
+    </p:extLst>
+  </p:cSld>
+  <p:clrMapOvr>
+    <a:masterClrMapping/>
+  </p:clrMapOvr>
+</p:sld>
+</file>
+
+<file path=ppt/slides/slide26.xml><?xml version="1.0" encoding="utf-8"?>
+<p:sld xmlns:a="http://schemas.openxmlformats.org/drawingml/2006/main" xmlns:r="http://schemas.openxmlformats.org/officeDocument/2006/relationships" xmlns:p="http://schemas.openxmlformats.org/presentationml/2006/main">
+  <p:cSld>
+    <p:spTree>
+      <p:nvGrpSpPr>
+        <p:cNvPr id="1" name=""/>
+        <p:cNvGrpSpPr/>
+        <p:nvPr/>
+      </p:nvGrpSpPr>
+      <p:grpSpPr>
+        <a:xfrm>
+          <a:off x="0" y="0"/>
+          <a:ext cx="0" cy="0"/>
+          <a:chOff x="0" y="0"/>
+          <a:chExt cx="0" cy="0"/>
+        </a:xfrm>
+      </p:grpSpPr>
+      <p:sp>
+        <p:nvSpPr>
+          <p:cNvPr id="2" name="Título 1">
+            <a:extLst>
+              <a:ext uri="{FF2B5EF4-FFF2-40B4-BE49-F238E27FC236}">
+                <a16:creationId xmlns:a16="http://schemas.microsoft.com/office/drawing/2014/main" id="{9EA6D259-A816-8FE6-B466-CB883C28DDDA}"/>
+              </a:ext>
+            </a:extLst>
+          </p:cNvPr>
+          <p:cNvSpPr>
+            <a:spLocks noGrp="1"/>
+          </p:cNvSpPr>
+          <p:nvPr>
+            <p:ph type="title"/>
+          </p:nvPr>
+        </p:nvSpPr>
+        <p:spPr/>
+        <p:txBody>
+          <a:bodyPr/>
+          <a:lstStyle/>
+          <a:p>
+            <a:r>
+              <a:rPr lang="pt-BR" dirty="0"/>
+              <a:t>Projeto de banco de dados com Workbench</a:t>
+            </a:r>
+          </a:p>
+        </p:txBody>
+      </p:sp>
+      <p:sp>
+        <p:nvSpPr>
+          <p:cNvPr id="3" name="Espaço Reservado para Conteúdo 2">
+            <a:extLst>
+              <a:ext uri="{FF2B5EF4-FFF2-40B4-BE49-F238E27FC236}">
+                <a16:creationId xmlns:a16="http://schemas.microsoft.com/office/drawing/2014/main" id="{7739F476-096D-8072-2941-079CBDE41218}"/>
+              </a:ext>
+            </a:extLst>
+          </p:cNvPr>
+          <p:cNvSpPr>
+            <a:spLocks noGrp="1"/>
+          </p:cNvSpPr>
+          <p:nvPr>
+            <p:ph idx="1"/>
+          </p:nvPr>
+        </p:nvSpPr>
+        <p:spPr>
+          <a:xfrm>
+            <a:off x="1097280" y="1845734"/>
+            <a:ext cx="10058400" cy="4023360"/>
+          </a:xfrm>
+        </p:spPr>
+        <p:txBody>
+          <a:bodyPr>
+            <a:normAutofit/>
+          </a:bodyPr>
+          <a:lstStyle/>
+          <a:p>
+            <a:r>
+              <a:rPr lang="pt-BR" sz="2400" dirty="0"/>
+              <a:t>Na entidade </a:t>
+            </a:r>
+            <a:r>
+              <a:rPr lang="pt-BR" sz="2400" b="1" dirty="0"/>
+              <a:t>Disciplina</a:t>
+            </a:r>
+            <a:r>
+              <a:rPr lang="pt-BR" sz="2400" dirty="0"/>
+              <a:t>, seus atributos são: ID, CPF, nome, endereço, sexo, salário, CPF do coordenador e o código da disciplina. Então, as suas colunas serão nomeadas como:</a:t>
+            </a:r>
+          </a:p>
+          <a:p>
+            <a:pPr lvl="1">
+              <a:buFont typeface="Wingdings" panose="05000000000000000000" pitchFamily="2" charset="2"/>
+              <a:buChar char="Ø"/>
+            </a:pPr>
+            <a:r>
+              <a:rPr lang="pt-BR" sz="2200" dirty="0"/>
+              <a:t> ID_PROFESSOR (</a:t>
+            </a:r>
+            <a:r>
+              <a:rPr lang="pt-BR" sz="2200" b="1" dirty="0"/>
+              <a:t>Primary Key</a:t>
+            </a:r>
+            <a:r>
+              <a:rPr lang="pt-BR" sz="2200" dirty="0"/>
+              <a:t>);</a:t>
+            </a:r>
+          </a:p>
+          <a:p>
+            <a:pPr lvl="1">
+              <a:buFont typeface="Wingdings" panose="05000000000000000000" pitchFamily="2" charset="2"/>
+              <a:buChar char="Ø"/>
+            </a:pPr>
+            <a:r>
+              <a:rPr lang="pt-BR" sz="2200" dirty="0"/>
+              <a:t> NOME_PROFESSOR;</a:t>
+            </a:r>
+          </a:p>
+          <a:p>
+            <a:pPr lvl="1">
+              <a:buFont typeface="Wingdings" panose="05000000000000000000" pitchFamily="2" charset="2"/>
+              <a:buChar char="Ø"/>
+            </a:pPr>
+            <a:r>
+              <a:rPr lang="pt-BR" sz="2200" dirty="0"/>
+              <a:t> ENDEREÇO_PROFESSOR;</a:t>
+            </a:r>
+          </a:p>
+          <a:p>
+            <a:pPr lvl="1">
+              <a:buFont typeface="Wingdings" panose="05000000000000000000" pitchFamily="2" charset="2"/>
+              <a:buChar char="Ø"/>
+            </a:pPr>
+            <a:r>
+              <a:rPr lang="pt-BR" sz="2200" dirty="0"/>
+              <a:t> SEXO;</a:t>
+            </a:r>
+          </a:p>
+          <a:p>
+            <a:pPr lvl="1">
+              <a:buFont typeface="Wingdings" panose="05000000000000000000" pitchFamily="2" charset="2"/>
+              <a:buChar char="Ø"/>
+            </a:pPr>
+            <a:r>
+              <a:rPr lang="pt-BR" sz="2200" dirty="0"/>
+              <a:t> SALARIO;</a:t>
+            </a:r>
+          </a:p>
+          <a:p>
+            <a:pPr lvl="1">
+              <a:buFont typeface="Wingdings" panose="05000000000000000000" pitchFamily="2" charset="2"/>
+              <a:buChar char="Ø"/>
+            </a:pPr>
+            <a:r>
+              <a:rPr lang="pt-BR" sz="2200" dirty="0"/>
+              <a:t> ID_DISCIPLINA </a:t>
+            </a:r>
+          </a:p>
+        </p:txBody>
+      </p:sp>
+    </p:spTree>
+    <p:extLst>
+      <p:ext uri="{BB962C8B-B14F-4D97-AF65-F5344CB8AC3E}">
+        <p14:creationId xmlns:p14="http://schemas.microsoft.com/office/powerpoint/2010/main" val="874785585"/>
       </p:ext>
     </p:extLst>
   </p:cSld>

</xml_diff>

<commit_message>
Terminando o penultimo tema da aula 9 de Banco de dados
</commit_message>
<xml_diff>
--- a/Euripedes Simões de Paula/Banco de Dados/Aula 9/Projeto de Banco de Dados.pptx
+++ b/Euripedes Simões de Paula/Banco de Dados/Aula 9/Projeto de Banco de Dados.pptx
@@ -31,6 +31,10 @@
     <p:sldId id="280" r:id="rId25"/>
     <p:sldId id="281" r:id="rId26"/>
     <p:sldId id="282" r:id="rId27"/>
+    <p:sldId id="283" r:id="rId28"/>
+    <p:sldId id="284" r:id="rId29"/>
+    <p:sldId id="285" r:id="rId30"/>
+    <p:sldId id="286" r:id="rId31"/>
   </p:sldIdLst>
   <p:sldSz cx="12192000" cy="6858000"/>
   <p:notesSz cx="6858000" cy="9144000"/>
@@ -13849,7 +13853,7 @@
         </p:spPr>
         <p:txBody>
           <a:bodyPr>
-            <a:normAutofit/>
+            <a:normAutofit lnSpcReduction="10000"/>
           </a:bodyPr>
           <a:lstStyle/>
           <a:p>
@@ -13863,7 +13867,7 @@
             </a:r>
             <a:r>
               <a:rPr lang="pt-BR" sz="2400" dirty="0"/>
-              <a:t>, seus atributos são: ID, CPF, nome, endereço, sexo, salário e o código da disciplina. Então, as suas colunas serão nomeadas como:</a:t>
+              <a:t>, seus atributos são: ID, CPF, nome, endereço, sexo, salário CPF do coordenador, ID da disciplina e o ID da turma. Então, as suas colunas serão nomeadas como:</a:t>
             </a:r>
           </a:p>
           <a:p>
@@ -13931,7 +13935,27 @@
             </a:pPr>
             <a:r>
               <a:rPr lang="pt-BR" sz="2200" dirty="0"/>
-              <a:t> ID_DISCIPLINA </a:t>
+              <a:t> CPF_COORDENADOR;</a:t>
+            </a:r>
+          </a:p>
+          <a:p>
+            <a:pPr lvl="1">
+              <a:buFont typeface="Wingdings" panose="05000000000000000000" pitchFamily="2" charset="2"/>
+              <a:buChar char="Ø"/>
+            </a:pPr>
+            <a:r>
+              <a:rPr lang="pt-BR" sz="2200" dirty="0"/>
+              <a:t> ID_DISCIPLINA.</a:t>
+            </a:r>
+          </a:p>
+          <a:p>
+            <a:pPr lvl="1">
+              <a:buFont typeface="Wingdings" panose="05000000000000000000" pitchFamily="2" charset="2"/>
+              <a:buChar char="Ø"/>
+            </a:pPr>
+            <a:r>
+              <a:rPr lang="pt-BR" sz="2200" dirty="0"/>
+              <a:t> ID_TURMA</a:t>
             </a:r>
           </a:p>
         </p:txBody>
@@ -14032,7 +14056,7 @@
             </a:r>
             <a:r>
               <a:rPr lang="pt-BR" sz="2400" dirty="0"/>
-              <a:t>, seus atributos são: ID, CPF, nome, endereço, sexo, salário, CPF do coordenador e o código da disciplina. Então, as suas colunas serão nomeadas como:</a:t>
+              <a:t>, seus atributos são: ID, nome da disciplina, CPF do coordenador. Então, as suas colunas serão nomeadas como:</a:t>
             </a:r>
           </a:p>
           <a:p>
@@ -14042,7 +14066,7 @@
             </a:pPr>
             <a:r>
               <a:rPr lang="pt-BR" sz="2200" dirty="0"/>
-              <a:t> ID_PROFESSOR (</a:t>
+              <a:t> ID_DISCIPLINA (</a:t>
             </a:r>
             <a:r>
               <a:rPr lang="pt-BR" sz="2200" b="1" dirty="0"/>
@@ -14060,7 +14084,7 @@
             </a:pPr>
             <a:r>
               <a:rPr lang="pt-BR" sz="2200" dirty="0"/>
-              <a:t> NOME_PROFESSOR;</a:t>
+              <a:t> NOME_DISCIPLINA;</a:t>
             </a:r>
           </a:p>
           <a:p>
@@ -14070,37 +14094,7 @@
             </a:pPr>
             <a:r>
               <a:rPr lang="pt-BR" sz="2200" dirty="0"/>
-              <a:t> ENDEREÇO_PROFESSOR;</a:t>
-            </a:r>
-          </a:p>
-          <a:p>
-            <a:pPr lvl="1">
-              <a:buFont typeface="Wingdings" panose="05000000000000000000" pitchFamily="2" charset="2"/>
-              <a:buChar char="Ø"/>
-            </a:pPr>
-            <a:r>
-              <a:rPr lang="pt-BR" sz="2200" dirty="0"/>
-              <a:t> SEXO;</a:t>
-            </a:r>
-          </a:p>
-          <a:p>
-            <a:pPr lvl="1">
-              <a:buFont typeface="Wingdings" panose="05000000000000000000" pitchFamily="2" charset="2"/>
-              <a:buChar char="Ø"/>
-            </a:pPr>
-            <a:r>
-              <a:rPr lang="pt-BR" sz="2200" dirty="0"/>
-              <a:t> SALARIO;</a:t>
-            </a:r>
-          </a:p>
-          <a:p>
-            <a:pPr lvl="1">
-              <a:buFont typeface="Wingdings" panose="05000000000000000000" pitchFamily="2" charset="2"/>
-              <a:buChar char="Ø"/>
-            </a:pPr>
-            <a:r>
-              <a:rPr lang="pt-BR" sz="2200" dirty="0"/>
-              <a:t> ID_DISCIPLINA </a:t>
+              <a:t> CPF_COORDENADOR.</a:t>
             </a:r>
           </a:p>
         </p:txBody>
@@ -14109,6 +14103,395 @@
     <p:extLst>
       <p:ext uri="{BB962C8B-B14F-4D97-AF65-F5344CB8AC3E}">
         <p14:creationId xmlns:p14="http://schemas.microsoft.com/office/powerpoint/2010/main" val="874785585"/>
+      </p:ext>
+    </p:extLst>
+  </p:cSld>
+  <p:clrMapOvr>
+    <a:masterClrMapping/>
+  </p:clrMapOvr>
+</p:sld>
+</file>
+
+<file path=ppt/slides/slide27.xml><?xml version="1.0" encoding="utf-8"?>
+<p:sld xmlns:a="http://schemas.openxmlformats.org/drawingml/2006/main" xmlns:r="http://schemas.openxmlformats.org/officeDocument/2006/relationships" xmlns:p="http://schemas.openxmlformats.org/presentationml/2006/main">
+  <p:cSld>
+    <p:spTree>
+      <p:nvGrpSpPr>
+        <p:cNvPr id="1" name=""/>
+        <p:cNvGrpSpPr/>
+        <p:nvPr/>
+      </p:nvGrpSpPr>
+      <p:grpSpPr>
+        <a:xfrm>
+          <a:off x="0" y="0"/>
+          <a:ext cx="0" cy="0"/>
+          <a:chOff x="0" y="0"/>
+          <a:chExt cx="0" cy="0"/>
+        </a:xfrm>
+      </p:grpSpPr>
+      <p:sp>
+        <p:nvSpPr>
+          <p:cNvPr id="2" name="Título 1">
+            <a:extLst>
+              <a:ext uri="{FF2B5EF4-FFF2-40B4-BE49-F238E27FC236}">
+                <a16:creationId xmlns:a16="http://schemas.microsoft.com/office/drawing/2014/main" id="{9EA6D259-A816-8FE6-B466-CB883C28DDDA}"/>
+              </a:ext>
+            </a:extLst>
+          </p:cNvPr>
+          <p:cNvSpPr>
+            <a:spLocks noGrp="1"/>
+          </p:cNvSpPr>
+          <p:nvPr>
+            <p:ph type="title"/>
+          </p:nvPr>
+        </p:nvSpPr>
+        <p:spPr/>
+        <p:txBody>
+          <a:bodyPr/>
+          <a:lstStyle/>
+          <a:p>
+            <a:r>
+              <a:rPr lang="pt-BR" dirty="0"/>
+              <a:t>Projeto de banco de dados com Workbench</a:t>
+            </a:r>
+          </a:p>
+        </p:txBody>
+      </p:sp>
+      <p:sp>
+        <p:nvSpPr>
+          <p:cNvPr id="3" name="Espaço Reservado para Conteúdo 2">
+            <a:extLst>
+              <a:ext uri="{FF2B5EF4-FFF2-40B4-BE49-F238E27FC236}">
+                <a16:creationId xmlns:a16="http://schemas.microsoft.com/office/drawing/2014/main" id="{7739F476-096D-8072-2941-079CBDE41218}"/>
+              </a:ext>
+            </a:extLst>
+          </p:cNvPr>
+          <p:cNvSpPr>
+            <a:spLocks noGrp="1"/>
+          </p:cNvSpPr>
+          <p:nvPr>
+            <p:ph idx="1"/>
+          </p:nvPr>
+        </p:nvSpPr>
+        <p:spPr>
+          <a:xfrm>
+            <a:off x="1097280" y="1845734"/>
+            <a:ext cx="10058400" cy="4023360"/>
+          </a:xfrm>
+        </p:spPr>
+        <p:txBody>
+          <a:bodyPr>
+            <a:normAutofit/>
+          </a:bodyPr>
+          <a:lstStyle/>
+          <a:p>
+            <a:r>
+              <a:rPr lang="pt-BR" sz="2400" dirty="0"/>
+              <a:t>Na entidade </a:t>
+            </a:r>
+            <a:r>
+              <a:rPr lang="pt-BR" sz="2400" b="1" dirty="0"/>
+              <a:t>Turma</a:t>
+            </a:r>
+            <a:r>
+              <a:rPr lang="pt-BR" sz="2400" dirty="0"/>
+              <a:t>, seus atributos são: ID, nome da turma e a sala da turma. Então, as suas colunas serão nomeadas como:</a:t>
+            </a:r>
+          </a:p>
+          <a:p>
+            <a:pPr lvl="1">
+              <a:buFont typeface="Wingdings" panose="05000000000000000000" pitchFamily="2" charset="2"/>
+              <a:buChar char="Ø"/>
+            </a:pPr>
+            <a:r>
+              <a:rPr lang="pt-BR" sz="2200" dirty="0"/>
+              <a:t> ID_TURMA (</a:t>
+            </a:r>
+            <a:r>
+              <a:rPr lang="pt-BR" sz="2200" b="1" dirty="0"/>
+              <a:t>Primary Key</a:t>
+            </a:r>
+            <a:r>
+              <a:rPr lang="pt-BR" sz="2200" dirty="0"/>
+              <a:t>);</a:t>
+            </a:r>
+          </a:p>
+          <a:p>
+            <a:pPr lvl="1">
+              <a:buFont typeface="Wingdings" panose="05000000000000000000" pitchFamily="2" charset="2"/>
+              <a:buChar char="Ø"/>
+            </a:pPr>
+            <a:r>
+              <a:rPr lang="pt-BR" sz="2200" dirty="0"/>
+              <a:t> NOME_TURMA;</a:t>
+            </a:r>
+          </a:p>
+          <a:p>
+            <a:pPr lvl="1">
+              <a:buFont typeface="Wingdings" panose="05000000000000000000" pitchFamily="2" charset="2"/>
+              <a:buChar char="Ø"/>
+            </a:pPr>
+            <a:r>
+              <a:rPr lang="pt-BR" sz="2200" dirty="0"/>
+              <a:t> SALA_TURMA.</a:t>
+            </a:r>
+          </a:p>
+        </p:txBody>
+      </p:sp>
+    </p:spTree>
+    <p:extLst>
+      <p:ext uri="{BB962C8B-B14F-4D97-AF65-F5344CB8AC3E}">
+        <p14:creationId xmlns:p14="http://schemas.microsoft.com/office/powerpoint/2010/main" val="1428761238"/>
+      </p:ext>
+    </p:extLst>
+  </p:cSld>
+  <p:clrMapOvr>
+    <a:masterClrMapping/>
+  </p:clrMapOvr>
+</p:sld>
+</file>
+
+<file path=ppt/slides/slide28.xml><?xml version="1.0" encoding="utf-8"?>
+<p:sld xmlns:a="http://schemas.openxmlformats.org/drawingml/2006/main" xmlns:r="http://schemas.openxmlformats.org/officeDocument/2006/relationships" xmlns:p="http://schemas.openxmlformats.org/presentationml/2006/main">
+  <p:cSld>
+    <p:spTree>
+      <p:nvGrpSpPr>
+        <p:cNvPr id="1" name=""/>
+        <p:cNvGrpSpPr/>
+        <p:nvPr/>
+      </p:nvGrpSpPr>
+      <p:grpSpPr>
+        <a:xfrm>
+          <a:off x="0" y="0"/>
+          <a:ext cx="0" cy="0"/>
+          <a:chOff x="0" y="0"/>
+          <a:chExt cx="0" cy="0"/>
+        </a:xfrm>
+      </p:grpSpPr>
+      <p:sp>
+        <p:nvSpPr>
+          <p:cNvPr id="2" name="Título 1">
+            <a:extLst>
+              <a:ext uri="{FF2B5EF4-FFF2-40B4-BE49-F238E27FC236}">
+                <a16:creationId xmlns:a16="http://schemas.microsoft.com/office/drawing/2014/main" id="{9EA6D259-A816-8FE6-B466-CB883C28DDDA}"/>
+              </a:ext>
+            </a:extLst>
+          </p:cNvPr>
+          <p:cNvSpPr>
+            <a:spLocks noGrp="1"/>
+          </p:cNvSpPr>
+          <p:nvPr>
+            <p:ph type="title"/>
+          </p:nvPr>
+        </p:nvSpPr>
+        <p:spPr/>
+        <p:txBody>
+          <a:bodyPr/>
+          <a:lstStyle/>
+          <a:p>
+            <a:r>
+              <a:rPr lang="pt-BR" dirty="0"/>
+              <a:t>Projeto de banco de dados com Workbench</a:t>
+            </a:r>
+          </a:p>
+        </p:txBody>
+      </p:sp>
+      <p:sp>
+        <p:nvSpPr>
+          <p:cNvPr id="3" name="Espaço Reservado para Conteúdo 2">
+            <a:extLst>
+              <a:ext uri="{FF2B5EF4-FFF2-40B4-BE49-F238E27FC236}">
+                <a16:creationId xmlns:a16="http://schemas.microsoft.com/office/drawing/2014/main" id="{7739F476-096D-8072-2941-079CBDE41218}"/>
+              </a:ext>
+            </a:extLst>
+          </p:cNvPr>
+          <p:cNvSpPr>
+            <a:spLocks noGrp="1"/>
+          </p:cNvSpPr>
+          <p:nvPr>
+            <p:ph idx="1"/>
+          </p:nvPr>
+        </p:nvSpPr>
+        <p:spPr>
+          <a:xfrm>
+            <a:off x="1097280" y="1737360"/>
+            <a:ext cx="10058400" cy="4023360"/>
+          </a:xfrm>
+        </p:spPr>
+        <p:txBody>
+          <a:bodyPr>
+            <a:normAutofit/>
+          </a:bodyPr>
+          <a:lstStyle/>
+          <a:p>
+            <a:r>
+              <a:rPr lang="pt-BR" sz="2400" dirty="0"/>
+              <a:t>Por fim, o esquema relacional das tabelas Professor, Disciplina e Turma poderá ser descrito desta maneira.</a:t>
+            </a:r>
+          </a:p>
+          <a:p>
+            <a:r>
+              <a:rPr lang="pt-BR" sz="2400" b="1" dirty="0"/>
+              <a:t>Professor</a:t>
+            </a:r>
+            <a:r>
+              <a:rPr lang="pt-BR" sz="2400" dirty="0"/>
+              <a:t> (</a:t>
+            </a:r>
+            <a:r>
+              <a:rPr lang="pt-BR" sz="2400" u="sng" dirty="0"/>
+              <a:t>id_professor</a:t>
+            </a:r>
+            <a:r>
+              <a:rPr lang="pt-BR" sz="2400" dirty="0"/>
+              <a:t>, nome_professor, endereço, sexo, salario, cpf_coordenador, id_disciplina, id_turma)</a:t>
+            </a:r>
+          </a:p>
+          <a:p>
+            <a:pPr lvl="1">
+              <a:buFont typeface="Wingdings" panose="05000000000000000000" pitchFamily="2" charset="2"/>
+              <a:buChar char="Ø"/>
+            </a:pPr>
+            <a:r>
+              <a:rPr lang="pt-BR" sz="2400" dirty="0"/>
+              <a:t> ID_DISCIPLINA referencia a Disciplina.</a:t>
+            </a:r>
+          </a:p>
+          <a:p>
+            <a:pPr lvl="1">
+              <a:buFont typeface="Wingdings" panose="05000000000000000000" pitchFamily="2" charset="2"/>
+              <a:buChar char="Ø"/>
+            </a:pPr>
+            <a:r>
+              <a:rPr lang="pt-BR" sz="2400" dirty="0"/>
+              <a:t> ID_TURMA referencia a Turma.</a:t>
+            </a:r>
+          </a:p>
+          <a:p>
+            <a:r>
+              <a:rPr lang="pt-BR" sz="2400" b="1" dirty="0"/>
+              <a:t>Disciplina</a:t>
+            </a:r>
+            <a:r>
+              <a:rPr lang="pt-BR" sz="2400" dirty="0"/>
+              <a:t> (id_disciplina, nome_disciplina, cpf_coordenador)</a:t>
+            </a:r>
+          </a:p>
+          <a:p>
+            <a:r>
+              <a:rPr lang="pt-BR" sz="2400" b="1" dirty="0"/>
+              <a:t>Turma</a:t>
+            </a:r>
+            <a:r>
+              <a:rPr lang="pt-BR" sz="2400" dirty="0"/>
+              <a:t> (id_turma, nome_turma, turma_sala)</a:t>
+            </a:r>
+          </a:p>
+        </p:txBody>
+      </p:sp>
+    </p:spTree>
+    <p:extLst>
+      <p:ext uri="{BB962C8B-B14F-4D97-AF65-F5344CB8AC3E}">
+        <p14:creationId xmlns:p14="http://schemas.microsoft.com/office/powerpoint/2010/main" val="243166964"/>
+      </p:ext>
+    </p:extLst>
+  </p:cSld>
+  <p:clrMapOvr>
+    <a:masterClrMapping/>
+  </p:clrMapOvr>
+</p:sld>
+</file>
+
+<file path=ppt/slides/slide29.xml><?xml version="1.0" encoding="utf-8"?>
+<p:sld xmlns:a="http://schemas.openxmlformats.org/drawingml/2006/main" xmlns:r="http://schemas.openxmlformats.org/officeDocument/2006/relationships" xmlns:p="http://schemas.openxmlformats.org/presentationml/2006/main">
+  <p:cSld>
+    <p:spTree>
+      <p:nvGrpSpPr>
+        <p:cNvPr id="1" name=""/>
+        <p:cNvGrpSpPr/>
+        <p:nvPr/>
+      </p:nvGrpSpPr>
+      <p:grpSpPr>
+        <a:xfrm>
+          <a:off x="0" y="0"/>
+          <a:ext cx="0" cy="0"/>
+          <a:chOff x="0" y="0"/>
+          <a:chExt cx="0" cy="0"/>
+        </a:xfrm>
+      </p:grpSpPr>
+      <p:sp>
+        <p:nvSpPr>
+          <p:cNvPr id="2" name="Título 1">
+            <a:extLst>
+              <a:ext uri="{FF2B5EF4-FFF2-40B4-BE49-F238E27FC236}">
+                <a16:creationId xmlns:a16="http://schemas.microsoft.com/office/drawing/2014/main" id="{9EA6D259-A816-8FE6-B466-CB883C28DDDA}"/>
+              </a:ext>
+            </a:extLst>
+          </p:cNvPr>
+          <p:cNvSpPr>
+            <a:spLocks noGrp="1"/>
+          </p:cNvSpPr>
+          <p:nvPr>
+            <p:ph type="title"/>
+          </p:nvPr>
+        </p:nvSpPr>
+        <p:spPr/>
+        <p:txBody>
+          <a:bodyPr/>
+          <a:lstStyle/>
+          <a:p>
+            <a:r>
+              <a:rPr lang="pt-BR" dirty="0"/>
+              <a:t>Projeto de banco de dados com Workbench</a:t>
+            </a:r>
+          </a:p>
+        </p:txBody>
+      </p:sp>
+      <p:sp>
+        <p:nvSpPr>
+          <p:cNvPr id="3" name="Espaço Reservado para Conteúdo 2">
+            <a:extLst>
+              <a:ext uri="{FF2B5EF4-FFF2-40B4-BE49-F238E27FC236}">
+                <a16:creationId xmlns:a16="http://schemas.microsoft.com/office/drawing/2014/main" id="{7739F476-096D-8072-2941-079CBDE41218}"/>
+              </a:ext>
+            </a:extLst>
+          </p:cNvPr>
+          <p:cNvSpPr>
+            <a:spLocks noGrp="1"/>
+          </p:cNvSpPr>
+          <p:nvPr>
+            <p:ph idx="1"/>
+          </p:nvPr>
+        </p:nvSpPr>
+        <p:spPr>
+          <a:xfrm>
+            <a:off x="1097280" y="1737360"/>
+            <a:ext cx="10058400" cy="4023360"/>
+          </a:xfrm>
+        </p:spPr>
+        <p:txBody>
+          <a:bodyPr>
+            <a:normAutofit/>
+          </a:bodyPr>
+          <a:lstStyle/>
+          <a:p>
+            <a:r>
+              <a:rPr lang="pt-BR" sz="2400" dirty="0"/>
+              <a:t>Em nosso esquema, o professor tem relação com as tabelas “Disciplina” e “Turmas”, por meio das chaves primárias que pertencem a outras tabelas e remetem ao mesmo valor.</a:t>
+            </a:r>
+          </a:p>
+          <a:p>
+            <a:r>
+              <a:rPr lang="pt-BR" sz="2400" dirty="0"/>
+              <a:t>Ao utilizar nomes em suas tabelas ou colunas, procure sempre utilizar nomes curtos. Opte por usar “NOME_PROFESSOR” do que “NOME_DO_PROFESSOR”. Em alguns casos, não é permitido usar espaços em branco ou hífen, então as abreviações podem ajudar bastante ao nomear.</a:t>
+            </a:r>
+          </a:p>
+        </p:txBody>
+      </p:sp>
+    </p:spTree>
+    <p:extLst>
+      <p:ext uri="{BB962C8B-B14F-4D97-AF65-F5344CB8AC3E}">
+        <p14:creationId xmlns:p14="http://schemas.microsoft.com/office/powerpoint/2010/main" val="4175974882"/>
       </p:ext>
     </p:extLst>
   </p:cSld>
@@ -14203,6 +14586,153 @@
     <p:extLst>
       <p:ext uri="{BB962C8B-B14F-4D97-AF65-F5344CB8AC3E}">
         <p14:creationId xmlns:p14="http://schemas.microsoft.com/office/powerpoint/2010/main" val="3004494412"/>
+      </p:ext>
+    </p:extLst>
+  </p:cSld>
+  <p:clrMapOvr>
+    <a:masterClrMapping/>
+  </p:clrMapOvr>
+</p:sld>
+</file>
+
+<file path=ppt/slides/slide30.xml><?xml version="1.0" encoding="utf-8"?>
+<p:sld xmlns:a="http://schemas.openxmlformats.org/drawingml/2006/main" xmlns:r="http://schemas.openxmlformats.org/officeDocument/2006/relationships" xmlns:p="http://schemas.openxmlformats.org/presentationml/2006/main">
+  <p:cSld>
+    <p:spTree>
+      <p:nvGrpSpPr>
+        <p:cNvPr id="1" name=""/>
+        <p:cNvGrpSpPr/>
+        <p:nvPr/>
+      </p:nvGrpSpPr>
+      <p:grpSpPr>
+        <a:xfrm>
+          <a:off x="0" y="0"/>
+          <a:ext cx="0" cy="0"/>
+          <a:chOff x="0" y="0"/>
+          <a:chExt cx="0" cy="0"/>
+        </a:xfrm>
+      </p:grpSpPr>
+      <p:sp>
+        <p:nvSpPr>
+          <p:cNvPr id="2" name="Título 1">
+            <a:extLst>
+              <a:ext uri="{FF2B5EF4-FFF2-40B4-BE49-F238E27FC236}">
+                <a16:creationId xmlns:a16="http://schemas.microsoft.com/office/drawing/2014/main" id="{9EA6D259-A816-8FE6-B466-CB883C28DDDA}"/>
+              </a:ext>
+            </a:extLst>
+          </p:cNvPr>
+          <p:cNvSpPr>
+            <a:spLocks noGrp="1"/>
+          </p:cNvSpPr>
+          <p:nvPr>
+            <p:ph type="title"/>
+          </p:nvPr>
+        </p:nvSpPr>
+        <p:spPr/>
+        <p:txBody>
+          <a:bodyPr/>
+          <a:lstStyle/>
+          <a:p>
+            <a:r>
+              <a:rPr lang="pt-BR" dirty="0"/>
+              <a:t>Projeto de banco de dados com Workbench</a:t>
+            </a:r>
+          </a:p>
+        </p:txBody>
+      </p:sp>
+      <p:sp>
+        <p:nvSpPr>
+          <p:cNvPr id="3" name="Espaço Reservado para Conteúdo 2">
+            <a:extLst>
+              <a:ext uri="{FF2B5EF4-FFF2-40B4-BE49-F238E27FC236}">
+                <a16:creationId xmlns:a16="http://schemas.microsoft.com/office/drawing/2014/main" id="{7739F476-096D-8072-2941-079CBDE41218}"/>
+              </a:ext>
+            </a:extLst>
+          </p:cNvPr>
+          <p:cNvSpPr>
+            <a:spLocks noGrp="1"/>
+          </p:cNvSpPr>
+          <p:nvPr>
+            <p:ph idx="1"/>
+          </p:nvPr>
+        </p:nvSpPr>
+        <p:spPr>
+          <a:xfrm>
+            <a:off x="1097280" y="1737360"/>
+            <a:ext cx="4322950" cy="4023360"/>
+          </a:xfrm>
+        </p:spPr>
+        <p:txBody>
+          <a:bodyPr>
+            <a:normAutofit/>
+          </a:bodyPr>
+          <a:lstStyle/>
+          <a:p>
+            <a:r>
+              <a:rPr lang="pt-BR" sz="2400" dirty="0"/>
+              <a:t>Na figura temos o modelo lógico da relação entre as entidades.</a:t>
+            </a:r>
+          </a:p>
+          <a:p>
+            <a:r>
+              <a:rPr lang="pt-BR" sz="2400" dirty="0"/>
+              <a:t>Veja que foi necessário definir o tipo de dado para cada atributo.</a:t>
+            </a:r>
+          </a:p>
+          <a:p>
+            <a:r>
+              <a:rPr lang="pt-BR" sz="2400" dirty="0"/>
+              <a:t>As relações as entidades foram definidas entre chaves primárias e estrangeiras.</a:t>
+            </a:r>
+          </a:p>
+          <a:p>
+            <a:r>
+              <a:rPr lang="pt-BR" sz="2400" dirty="0"/>
+              <a:t>Cada tabela tem uma chave primária, mas apenas uma tem chaves estrangeiras.</a:t>
+            </a:r>
+          </a:p>
+        </p:txBody>
+      </p:sp>
+      <p:pic>
+        <p:nvPicPr>
+          <p:cNvPr id="5" name="Imagem 4">
+            <a:extLst>
+              <a:ext uri="{FF2B5EF4-FFF2-40B4-BE49-F238E27FC236}">
+                <a16:creationId xmlns:a16="http://schemas.microsoft.com/office/drawing/2014/main" id="{39964761-745D-0038-7C84-521E78349CBF}"/>
+              </a:ext>
+            </a:extLst>
+          </p:cNvPr>
+          <p:cNvPicPr>
+            <a:picLocks noChangeAspect="1"/>
+          </p:cNvPicPr>
+          <p:nvPr/>
+        </p:nvPicPr>
+        <p:blipFill>
+          <a:blip r:embed="rId2">
+            <a:extLst>
+              <a:ext uri="{28A0092B-C50C-407E-A947-70E740481C1C}">
+                <a14:useLocalDpi xmlns:a14="http://schemas.microsoft.com/office/drawing/2010/main" val="0"/>
+              </a:ext>
+            </a:extLst>
+          </a:blip>
+          <a:stretch>
+            <a:fillRect/>
+          </a:stretch>
+        </p:blipFill>
+        <p:spPr>
+          <a:xfrm>
+            <a:off x="5420230" y="1990524"/>
+            <a:ext cx="6411220" cy="2876951"/>
+          </a:xfrm>
+          <a:prstGeom prst="rect">
+            <a:avLst/>
+          </a:prstGeom>
+        </p:spPr>
+      </p:pic>
+    </p:spTree>
+    <p:extLst>
+      <p:ext uri="{BB962C8B-B14F-4D97-AF65-F5344CB8AC3E}">
+        <p14:creationId xmlns:p14="http://schemas.microsoft.com/office/powerpoint/2010/main" val="981379104"/>
       </p:ext>
     </p:extLst>
   </p:cSld>

</xml_diff>

<commit_message>
adicionando aula 9 completa ao curso Banco de Dados
</commit_message>
<xml_diff>
--- a/Euripedes Simões de Paula/Banco de Dados/Aula 9/Projeto de Banco de Dados.pptx
+++ b/Euripedes Simões de Paula/Banco de Dados/Aula 9/Projeto de Banco de Dados.pptx
@@ -35,6 +35,22 @@
     <p:sldId id="284" r:id="rId29"/>
     <p:sldId id="285" r:id="rId30"/>
     <p:sldId id="286" r:id="rId31"/>
+    <p:sldId id="287" r:id="rId32"/>
+    <p:sldId id="288" r:id="rId33"/>
+    <p:sldId id="289" r:id="rId34"/>
+    <p:sldId id="290" r:id="rId35"/>
+    <p:sldId id="291" r:id="rId36"/>
+    <p:sldId id="292" r:id="rId37"/>
+    <p:sldId id="293" r:id="rId38"/>
+    <p:sldId id="294" r:id="rId39"/>
+    <p:sldId id="295" r:id="rId40"/>
+    <p:sldId id="296" r:id="rId41"/>
+    <p:sldId id="297" r:id="rId42"/>
+    <p:sldId id="298" r:id="rId43"/>
+    <p:sldId id="299" r:id="rId44"/>
+    <p:sldId id="300" r:id="rId45"/>
+    <p:sldId id="301" r:id="rId46"/>
+    <p:sldId id="302" r:id="rId47"/>
   </p:sldIdLst>
   <p:sldSz cx="12192000" cy="6858000"/>
   <p:notesSz cx="6858000" cy="9144000"/>
@@ -367,7 +383,7 @@
           <a:p>
             <a:fld id="{6F04A0FC-C05E-430A-88B6-D7A9784C8B2C}" type="datetimeFigureOut">
               <a:rPr lang="pt-BR" smtClean="0"/>
-              <a:t>14/04/2024</a:t>
+              <a:t>15/04/2024</a:t>
             </a:fld>
             <a:endParaRPr lang="pt-BR"/>
           </a:p>
@@ -575,7 +591,7 @@
           <a:p>
             <a:fld id="{6F04A0FC-C05E-430A-88B6-D7A9784C8B2C}" type="datetimeFigureOut">
               <a:rPr lang="pt-BR" smtClean="0"/>
-              <a:t>14/04/2024</a:t>
+              <a:t>15/04/2024</a:t>
             </a:fld>
             <a:endParaRPr lang="pt-BR"/>
           </a:p>
@@ -831,7 +847,7 @@
           <a:p>
             <a:fld id="{6F04A0FC-C05E-430A-88B6-D7A9784C8B2C}" type="datetimeFigureOut">
               <a:rPr lang="pt-BR" smtClean="0"/>
-              <a:t>14/04/2024</a:t>
+              <a:t>15/04/2024</a:t>
             </a:fld>
             <a:endParaRPr lang="pt-BR"/>
           </a:p>
@@ -1005,7 +1021,7 @@
           <a:p>
             <a:fld id="{6F04A0FC-C05E-430A-88B6-D7A9784C8B2C}" type="datetimeFigureOut">
               <a:rPr lang="pt-BR" smtClean="0"/>
-              <a:t>14/04/2024</a:t>
+              <a:t>15/04/2024</a:t>
             </a:fld>
             <a:endParaRPr lang="pt-BR"/>
           </a:p>
@@ -1348,7 +1364,7 @@
           <a:p>
             <a:fld id="{6F04A0FC-C05E-430A-88B6-D7A9784C8B2C}" type="datetimeFigureOut">
               <a:rPr lang="pt-BR" smtClean="0"/>
-              <a:t>14/04/2024</a:t>
+              <a:t>15/04/2024</a:t>
             </a:fld>
             <a:endParaRPr lang="pt-BR"/>
           </a:p>
@@ -1623,7 +1639,7 @@
           <a:p>
             <a:fld id="{6F04A0FC-C05E-430A-88B6-D7A9784C8B2C}" type="datetimeFigureOut">
               <a:rPr lang="pt-BR" smtClean="0"/>
-              <a:t>14/04/2024</a:t>
+              <a:t>15/04/2024</a:t>
             </a:fld>
             <a:endParaRPr lang="pt-BR"/>
           </a:p>
@@ -2002,7 +2018,7 @@
           <a:p>
             <a:fld id="{6F04A0FC-C05E-430A-88B6-D7A9784C8B2C}" type="datetimeFigureOut">
               <a:rPr lang="pt-BR" smtClean="0"/>
-              <a:t>14/04/2024</a:t>
+              <a:t>15/04/2024</a:t>
             </a:fld>
             <a:endParaRPr lang="pt-BR"/>
           </a:p>
@@ -2120,7 +2136,7 @@
           <a:p>
             <a:fld id="{6F04A0FC-C05E-430A-88B6-D7A9784C8B2C}" type="datetimeFigureOut">
               <a:rPr lang="pt-BR" smtClean="0"/>
-              <a:t>14/04/2024</a:t>
+              <a:t>15/04/2024</a:t>
             </a:fld>
             <a:endParaRPr lang="pt-BR"/>
           </a:p>
@@ -2291,7 +2307,7 @@
           <a:p>
             <a:fld id="{6F04A0FC-C05E-430A-88B6-D7A9784C8B2C}" type="datetimeFigureOut">
               <a:rPr lang="pt-BR" smtClean="0"/>
-              <a:t>14/04/2024</a:t>
+              <a:t>15/04/2024</a:t>
             </a:fld>
             <a:endParaRPr lang="pt-BR"/>
           </a:p>
@@ -2645,7 +2661,7 @@
           <a:p>
             <a:fld id="{6F04A0FC-C05E-430A-88B6-D7A9784C8B2C}" type="datetimeFigureOut">
               <a:rPr lang="pt-BR" smtClean="0"/>
-              <a:t>14/04/2024</a:t>
+              <a:t>15/04/2024</a:t>
             </a:fld>
             <a:endParaRPr lang="pt-BR"/>
           </a:p>
@@ -3027,7 +3043,7 @@
           <a:p>
             <a:fld id="{6F04A0FC-C05E-430A-88B6-D7A9784C8B2C}" type="datetimeFigureOut">
               <a:rPr lang="pt-BR" smtClean="0"/>
-              <a:t>14/04/2024</a:t>
+              <a:t>15/04/2024</a:t>
             </a:fld>
             <a:endParaRPr lang="pt-BR"/>
           </a:p>
@@ -3314,7 +3330,7 @@
           <a:p>
             <a:fld id="{6F04A0FC-C05E-430A-88B6-D7A9784C8B2C}" type="datetimeFigureOut">
               <a:rPr lang="pt-BR" smtClean="0"/>
-              <a:t>14/04/2024</a:t>
+              <a:t>15/04/2024</a:t>
             </a:fld>
             <a:endParaRPr lang="pt-BR"/>
           </a:p>
@@ -14742,6 +14758,1077 @@
 </p:sld>
 </file>
 
+<file path=ppt/slides/slide31.xml><?xml version="1.0" encoding="utf-8"?>
+<p:sld xmlns:a="http://schemas.openxmlformats.org/drawingml/2006/main" xmlns:r="http://schemas.openxmlformats.org/officeDocument/2006/relationships" xmlns:p="http://schemas.openxmlformats.org/presentationml/2006/main">
+  <p:cSld>
+    <p:spTree>
+      <p:nvGrpSpPr>
+        <p:cNvPr id="1" name=""/>
+        <p:cNvGrpSpPr/>
+        <p:nvPr/>
+      </p:nvGrpSpPr>
+      <p:grpSpPr>
+        <a:xfrm>
+          <a:off x="0" y="0"/>
+          <a:ext cx="0" cy="0"/>
+          <a:chOff x="0" y="0"/>
+          <a:chExt cx="0" cy="0"/>
+        </a:xfrm>
+      </p:grpSpPr>
+      <p:sp>
+        <p:nvSpPr>
+          <p:cNvPr id="2" name="Título 1">
+            <a:extLst>
+              <a:ext uri="{FF2B5EF4-FFF2-40B4-BE49-F238E27FC236}">
+                <a16:creationId xmlns:a16="http://schemas.microsoft.com/office/drawing/2014/main" id="{9EA6D259-A816-8FE6-B466-CB883C28DDDA}"/>
+              </a:ext>
+            </a:extLst>
+          </p:cNvPr>
+          <p:cNvSpPr>
+            <a:spLocks noGrp="1"/>
+          </p:cNvSpPr>
+          <p:nvPr>
+            <p:ph type="title"/>
+          </p:nvPr>
+        </p:nvSpPr>
+        <p:spPr/>
+        <p:txBody>
+          <a:bodyPr/>
+          <a:lstStyle/>
+          <a:p>
+            <a:r>
+              <a:rPr lang="pt-BR" dirty="0"/>
+              <a:t>Modelo físico de banco de dados para MySQL</a:t>
+            </a:r>
+          </a:p>
+        </p:txBody>
+      </p:sp>
+      <p:sp>
+        <p:nvSpPr>
+          <p:cNvPr id="3" name="Espaço Reservado para Conteúdo 2">
+            <a:extLst>
+              <a:ext uri="{FF2B5EF4-FFF2-40B4-BE49-F238E27FC236}">
+                <a16:creationId xmlns:a16="http://schemas.microsoft.com/office/drawing/2014/main" id="{7739F476-096D-8072-2941-079CBDE41218}"/>
+              </a:ext>
+            </a:extLst>
+          </p:cNvPr>
+          <p:cNvSpPr>
+            <a:spLocks noGrp="1"/>
+          </p:cNvSpPr>
+          <p:nvPr>
+            <p:ph idx="1"/>
+          </p:nvPr>
+        </p:nvSpPr>
+        <p:spPr>
+          <a:xfrm>
+            <a:off x="1097280" y="1737360"/>
+            <a:ext cx="10058400" cy="4023360"/>
+          </a:xfrm>
+        </p:spPr>
+        <p:txBody>
+          <a:bodyPr>
+            <a:normAutofit/>
+          </a:bodyPr>
+          <a:lstStyle/>
+          <a:p>
+            <a:r>
+              <a:rPr lang="pt-BR" sz="2400" dirty="0"/>
+              <a:t>Em um projeto de banco de dados e o modelo físico de Banco de Dados, é necessário escolher estruturas especificas para armazenar os dados de arquivos e como realizar o acesso a esses dados, para melhor desempenho das aplicações, já que o desempenho dependerá do tamanho e do número de registros em cada arquivo.</a:t>
+            </a:r>
+          </a:p>
+          <a:p>
+            <a:r>
+              <a:rPr lang="pt-BR" sz="2400" dirty="0"/>
+              <a:t>É de responsabilidade do Administrador de Banco de Dados (DBA) elaborar os modelos de Banco de Dados e pensar em como os relacionamentos entre as entidades no Banco de Dados pode surgir com menor tempo e processo.</a:t>
+            </a:r>
+          </a:p>
+        </p:txBody>
+      </p:sp>
+    </p:spTree>
+    <p:extLst>
+      <p:ext uri="{BB962C8B-B14F-4D97-AF65-F5344CB8AC3E}">
+        <p14:creationId xmlns:p14="http://schemas.microsoft.com/office/powerpoint/2010/main" val="2014227329"/>
+      </p:ext>
+    </p:extLst>
+  </p:cSld>
+  <p:clrMapOvr>
+    <a:masterClrMapping/>
+  </p:clrMapOvr>
+</p:sld>
+</file>
+
+<file path=ppt/slides/slide32.xml><?xml version="1.0" encoding="utf-8"?>
+<p:sld xmlns:a="http://schemas.openxmlformats.org/drawingml/2006/main" xmlns:r="http://schemas.openxmlformats.org/officeDocument/2006/relationships" xmlns:p="http://schemas.openxmlformats.org/presentationml/2006/main">
+  <p:cSld>
+    <p:spTree>
+      <p:nvGrpSpPr>
+        <p:cNvPr id="1" name=""/>
+        <p:cNvGrpSpPr/>
+        <p:nvPr/>
+      </p:nvGrpSpPr>
+      <p:grpSpPr>
+        <a:xfrm>
+          <a:off x="0" y="0"/>
+          <a:ext cx="0" cy="0"/>
+          <a:chOff x="0" y="0"/>
+          <a:chExt cx="0" cy="0"/>
+        </a:xfrm>
+      </p:grpSpPr>
+      <p:sp>
+        <p:nvSpPr>
+          <p:cNvPr id="2" name="Título 1">
+            <a:extLst>
+              <a:ext uri="{FF2B5EF4-FFF2-40B4-BE49-F238E27FC236}">
+                <a16:creationId xmlns:a16="http://schemas.microsoft.com/office/drawing/2014/main" id="{9EA6D259-A816-8FE6-B466-CB883C28DDDA}"/>
+              </a:ext>
+            </a:extLst>
+          </p:cNvPr>
+          <p:cNvSpPr>
+            <a:spLocks noGrp="1"/>
+          </p:cNvSpPr>
+          <p:nvPr>
+            <p:ph type="title"/>
+          </p:nvPr>
+        </p:nvSpPr>
+        <p:spPr/>
+        <p:txBody>
+          <a:bodyPr/>
+          <a:lstStyle/>
+          <a:p>
+            <a:r>
+              <a:rPr lang="pt-BR" dirty="0"/>
+              <a:t>Modelo físico de banco de dados para MySQL</a:t>
+            </a:r>
+          </a:p>
+        </p:txBody>
+      </p:sp>
+      <p:sp>
+        <p:nvSpPr>
+          <p:cNvPr id="3" name="Espaço Reservado para Conteúdo 2">
+            <a:extLst>
+              <a:ext uri="{FF2B5EF4-FFF2-40B4-BE49-F238E27FC236}">
+                <a16:creationId xmlns:a16="http://schemas.microsoft.com/office/drawing/2014/main" id="{7739F476-096D-8072-2941-079CBDE41218}"/>
+              </a:ext>
+            </a:extLst>
+          </p:cNvPr>
+          <p:cNvSpPr>
+            <a:spLocks noGrp="1"/>
+          </p:cNvSpPr>
+          <p:nvPr>
+            <p:ph idx="1"/>
+          </p:nvPr>
+        </p:nvSpPr>
+        <p:spPr>
+          <a:xfrm>
+            <a:off x="1097280" y="1737360"/>
+            <a:ext cx="10058400" cy="4023360"/>
+          </a:xfrm>
+        </p:spPr>
+        <p:txBody>
+          <a:bodyPr>
+            <a:normAutofit/>
+          </a:bodyPr>
+          <a:lstStyle/>
+          <a:p>
+            <a:r>
+              <a:rPr lang="pt-BR" sz="2400" dirty="0"/>
+              <a:t>Em um projeto físico do Banco de Dados, também deve-se levar em consideração a estimativa de crescimento de determinado arquivo: tamanho dos registros, números de atributos ou números de registros.</a:t>
+            </a:r>
+          </a:p>
+          <a:p>
+            <a:r>
+              <a:rPr lang="pt-BR" sz="2400" dirty="0"/>
+              <a:t>Isso ajudará na determinação inicial dos caminhos de acesso e do armazenamento dos arquivos, podendo haver alterações no projeto por ser uma fase inicial e se basear no desempenho implementado no projeto.</a:t>
+            </a:r>
+          </a:p>
+        </p:txBody>
+      </p:sp>
+    </p:spTree>
+    <p:extLst>
+      <p:ext uri="{BB962C8B-B14F-4D97-AF65-F5344CB8AC3E}">
+        <p14:creationId xmlns:p14="http://schemas.microsoft.com/office/powerpoint/2010/main" val="2264575522"/>
+      </p:ext>
+    </p:extLst>
+  </p:cSld>
+  <p:clrMapOvr>
+    <a:masterClrMapping/>
+  </p:clrMapOvr>
+</p:sld>
+</file>
+
+<file path=ppt/slides/slide33.xml><?xml version="1.0" encoding="utf-8"?>
+<p:sld xmlns:a="http://schemas.openxmlformats.org/drawingml/2006/main" xmlns:r="http://schemas.openxmlformats.org/officeDocument/2006/relationships" xmlns:p="http://schemas.openxmlformats.org/presentationml/2006/main">
+  <p:cSld>
+    <p:spTree>
+      <p:nvGrpSpPr>
+        <p:cNvPr id="1" name=""/>
+        <p:cNvGrpSpPr/>
+        <p:nvPr/>
+      </p:nvGrpSpPr>
+      <p:grpSpPr>
+        <a:xfrm>
+          <a:off x="0" y="0"/>
+          <a:ext cx="0" cy="0"/>
+          <a:chOff x="0" y="0"/>
+          <a:chExt cx="0" cy="0"/>
+        </a:xfrm>
+      </p:grpSpPr>
+      <p:sp>
+        <p:nvSpPr>
+          <p:cNvPr id="2" name="Título 1">
+            <a:extLst>
+              <a:ext uri="{FF2B5EF4-FFF2-40B4-BE49-F238E27FC236}">
+                <a16:creationId xmlns:a16="http://schemas.microsoft.com/office/drawing/2014/main" id="{9EA6D259-A816-8FE6-B466-CB883C28DDDA}"/>
+              </a:ext>
+            </a:extLst>
+          </p:cNvPr>
+          <p:cNvSpPr>
+            <a:spLocks noGrp="1"/>
+          </p:cNvSpPr>
+          <p:nvPr>
+            <p:ph type="title"/>
+          </p:nvPr>
+        </p:nvSpPr>
+        <p:spPr/>
+        <p:txBody>
+          <a:bodyPr/>
+          <a:lstStyle/>
+          <a:p>
+            <a:r>
+              <a:rPr lang="pt-BR" dirty="0"/>
+              <a:t>Modelo físico de banco de dados para MySQL</a:t>
+            </a:r>
+          </a:p>
+        </p:txBody>
+      </p:sp>
+      <p:sp>
+        <p:nvSpPr>
+          <p:cNvPr id="3" name="Espaço Reservado para Conteúdo 2">
+            <a:extLst>
+              <a:ext uri="{FF2B5EF4-FFF2-40B4-BE49-F238E27FC236}">
+                <a16:creationId xmlns:a16="http://schemas.microsoft.com/office/drawing/2014/main" id="{7739F476-096D-8072-2941-079CBDE41218}"/>
+              </a:ext>
+            </a:extLst>
+          </p:cNvPr>
+          <p:cNvSpPr>
+            <a:spLocks noGrp="1"/>
+          </p:cNvSpPr>
+          <p:nvPr>
+            <p:ph idx="1"/>
+          </p:nvPr>
+        </p:nvSpPr>
+        <p:spPr>
+          <a:xfrm>
+            <a:off x="1097280" y="1737360"/>
+            <a:ext cx="10058400" cy="4023360"/>
+          </a:xfrm>
+        </p:spPr>
+        <p:txBody>
+          <a:bodyPr>
+            <a:normAutofit/>
+          </a:bodyPr>
+          <a:lstStyle/>
+          <a:p>
+            <a:r>
+              <a:rPr lang="pt-BR" sz="2400" dirty="0"/>
+              <a:t>O modelo físico é utilizado para especificar detalhes adicionais sobre o armazenamento do Banco de Dados, resumindo como as relações descritas nos modelos conceituais e lógicos serão armazenados.</a:t>
+            </a:r>
+          </a:p>
+          <a:p>
+            <a:r>
+              <a:rPr lang="pt-BR" sz="2400" dirty="0"/>
+              <a:t>Isso é utilizado para definir de que forma os arquivos serão armazenados e também para criar estruturas auxiliares que auxiliam na recuperação de dados.</a:t>
+            </a:r>
+          </a:p>
+        </p:txBody>
+      </p:sp>
+    </p:spTree>
+    <p:extLst>
+      <p:ext uri="{BB962C8B-B14F-4D97-AF65-F5344CB8AC3E}">
+        <p14:creationId xmlns:p14="http://schemas.microsoft.com/office/powerpoint/2010/main" val="640746240"/>
+      </p:ext>
+    </p:extLst>
+  </p:cSld>
+  <p:clrMapOvr>
+    <a:masterClrMapping/>
+  </p:clrMapOvr>
+</p:sld>
+</file>
+
+<file path=ppt/slides/slide34.xml><?xml version="1.0" encoding="utf-8"?>
+<p:sld xmlns:a="http://schemas.openxmlformats.org/drawingml/2006/main" xmlns:r="http://schemas.openxmlformats.org/officeDocument/2006/relationships" xmlns:p="http://schemas.openxmlformats.org/presentationml/2006/main">
+  <p:cSld>
+    <p:spTree>
+      <p:nvGrpSpPr>
+        <p:cNvPr id="1" name=""/>
+        <p:cNvGrpSpPr/>
+        <p:nvPr/>
+      </p:nvGrpSpPr>
+      <p:grpSpPr>
+        <a:xfrm>
+          <a:off x="0" y="0"/>
+          <a:ext cx="0" cy="0"/>
+          <a:chOff x="0" y="0"/>
+          <a:chExt cx="0" cy="0"/>
+        </a:xfrm>
+      </p:grpSpPr>
+      <p:sp>
+        <p:nvSpPr>
+          <p:cNvPr id="2" name="Título 1">
+            <a:extLst>
+              <a:ext uri="{FF2B5EF4-FFF2-40B4-BE49-F238E27FC236}">
+                <a16:creationId xmlns:a16="http://schemas.microsoft.com/office/drawing/2014/main" id="{9EA6D259-A816-8FE6-B466-CB883C28DDDA}"/>
+              </a:ext>
+            </a:extLst>
+          </p:cNvPr>
+          <p:cNvSpPr>
+            <a:spLocks noGrp="1"/>
+          </p:cNvSpPr>
+          <p:nvPr>
+            <p:ph type="title"/>
+          </p:nvPr>
+        </p:nvSpPr>
+        <p:spPr/>
+        <p:txBody>
+          <a:bodyPr/>
+          <a:lstStyle/>
+          <a:p>
+            <a:r>
+              <a:rPr lang="pt-BR" dirty="0"/>
+              <a:t>Modelo físico de banco de dados para MySQL</a:t>
+            </a:r>
+          </a:p>
+        </p:txBody>
+      </p:sp>
+      <p:sp>
+        <p:nvSpPr>
+          <p:cNvPr id="3" name="Espaço Reservado para Conteúdo 2">
+            <a:extLst>
+              <a:ext uri="{FF2B5EF4-FFF2-40B4-BE49-F238E27FC236}">
+                <a16:creationId xmlns:a16="http://schemas.microsoft.com/office/drawing/2014/main" id="{7739F476-096D-8072-2941-079CBDE41218}"/>
+              </a:ext>
+            </a:extLst>
+          </p:cNvPr>
+          <p:cNvSpPr>
+            <a:spLocks noGrp="1"/>
+          </p:cNvSpPr>
+          <p:nvPr>
+            <p:ph idx="1"/>
+          </p:nvPr>
+        </p:nvSpPr>
+        <p:spPr>
+          <a:xfrm>
+            <a:off x="1097280" y="1737360"/>
+            <a:ext cx="10058400" cy="4023360"/>
+          </a:xfrm>
+        </p:spPr>
+        <p:txBody>
+          <a:bodyPr>
+            <a:normAutofit/>
+          </a:bodyPr>
+          <a:lstStyle/>
+          <a:p>
+            <a:r>
+              <a:rPr lang="pt-BR" sz="2400" dirty="0"/>
+              <a:t>Voltando ao nosso projeto de Banco de Dados “Escola”, utilizamos o MySQL Workbench para construir um modelo lógico, mas podemos exportá-lo para o código, para criar a tabela, linhas e colunas.</a:t>
+            </a:r>
+          </a:p>
+          <a:p>
+            <a:r>
+              <a:rPr lang="pt-BR" sz="2400" dirty="0"/>
+              <a:t>Essa transformação acontece de acordo com o modelo conceitual criado, mas pode ser modificado, caso necessário.</a:t>
+            </a:r>
+          </a:p>
+          <a:p>
+            <a:endParaRPr lang="pt-BR" sz="2400" dirty="0"/>
+          </a:p>
+        </p:txBody>
+      </p:sp>
+    </p:spTree>
+    <p:extLst>
+      <p:ext uri="{BB962C8B-B14F-4D97-AF65-F5344CB8AC3E}">
+        <p14:creationId xmlns:p14="http://schemas.microsoft.com/office/powerpoint/2010/main" val="4073877040"/>
+      </p:ext>
+    </p:extLst>
+  </p:cSld>
+  <p:clrMapOvr>
+    <a:masterClrMapping/>
+  </p:clrMapOvr>
+</p:sld>
+</file>
+
+<file path=ppt/slides/slide35.xml><?xml version="1.0" encoding="utf-8"?>
+<p:sld xmlns:a="http://schemas.openxmlformats.org/drawingml/2006/main" xmlns:r="http://schemas.openxmlformats.org/officeDocument/2006/relationships" xmlns:p="http://schemas.openxmlformats.org/presentationml/2006/main">
+  <p:cSld>
+    <p:spTree>
+      <p:nvGrpSpPr>
+        <p:cNvPr id="1" name=""/>
+        <p:cNvGrpSpPr/>
+        <p:nvPr/>
+      </p:nvGrpSpPr>
+      <p:grpSpPr>
+        <a:xfrm>
+          <a:off x="0" y="0"/>
+          <a:ext cx="0" cy="0"/>
+          <a:chOff x="0" y="0"/>
+          <a:chExt cx="0" cy="0"/>
+        </a:xfrm>
+      </p:grpSpPr>
+      <p:sp>
+        <p:nvSpPr>
+          <p:cNvPr id="2" name="Título 1">
+            <a:extLst>
+              <a:ext uri="{FF2B5EF4-FFF2-40B4-BE49-F238E27FC236}">
+                <a16:creationId xmlns:a16="http://schemas.microsoft.com/office/drawing/2014/main" id="{9EA6D259-A816-8FE6-B466-CB883C28DDDA}"/>
+              </a:ext>
+            </a:extLst>
+          </p:cNvPr>
+          <p:cNvSpPr>
+            <a:spLocks noGrp="1"/>
+          </p:cNvSpPr>
+          <p:nvPr>
+            <p:ph type="title"/>
+          </p:nvPr>
+        </p:nvSpPr>
+        <p:spPr/>
+        <p:txBody>
+          <a:bodyPr/>
+          <a:lstStyle/>
+          <a:p>
+            <a:r>
+              <a:rPr lang="pt-BR" dirty="0"/>
+              <a:t>Modelo físico de banco de dados para MySQL</a:t>
+            </a:r>
+          </a:p>
+        </p:txBody>
+      </p:sp>
+      <p:sp>
+        <p:nvSpPr>
+          <p:cNvPr id="3" name="Espaço Reservado para Conteúdo 2">
+            <a:extLst>
+              <a:ext uri="{FF2B5EF4-FFF2-40B4-BE49-F238E27FC236}">
+                <a16:creationId xmlns:a16="http://schemas.microsoft.com/office/drawing/2014/main" id="{7739F476-096D-8072-2941-079CBDE41218}"/>
+              </a:ext>
+            </a:extLst>
+          </p:cNvPr>
+          <p:cNvSpPr>
+            <a:spLocks noGrp="1"/>
+          </p:cNvSpPr>
+          <p:nvPr>
+            <p:ph idx="1"/>
+          </p:nvPr>
+        </p:nvSpPr>
+        <p:spPr>
+          <a:xfrm>
+            <a:off x="1097280" y="1737360"/>
+            <a:ext cx="10058400" cy="4023360"/>
+          </a:xfrm>
+        </p:spPr>
+        <p:txBody>
+          <a:bodyPr>
+            <a:normAutofit/>
+          </a:bodyPr>
+          <a:lstStyle/>
+          <a:p>
+            <a:r>
+              <a:rPr lang="pt-BR" sz="2400" dirty="0"/>
+              <a:t>Agora está na hora da prática:</a:t>
+            </a:r>
+          </a:p>
+          <a:p>
+            <a:r>
+              <a:rPr lang="pt-BR" sz="2400" dirty="0"/>
+              <a:t>Criei previamente um modelo do nosso projeto de banco de dados, onde vamos extrair o script de um diagrama EER.</a:t>
+            </a:r>
+          </a:p>
+          <a:p>
+            <a:r>
+              <a:rPr lang="pt-BR" sz="2400" dirty="0"/>
+              <a:t>Poderíamos usar os comandos CREATE para realizar esse serviço, mas o objetivo dessa aula é mostrar a vocês outras maneiras de criar entidades e atributos no Banco de Dados.</a:t>
+            </a:r>
+          </a:p>
+          <a:p>
+            <a:endParaRPr lang="pt-BR" sz="2400" dirty="0"/>
+          </a:p>
+        </p:txBody>
+      </p:sp>
+    </p:spTree>
+    <p:extLst>
+      <p:ext uri="{BB962C8B-B14F-4D97-AF65-F5344CB8AC3E}">
+        <p14:creationId xmlns:p14="http://schemas.microsoft.com/office/powerpoint/2010/main" val="846149267"/>
+      </p:ext>
+    </p:extLst>
+  </p:cSld>
+  <p:clrMapOvr>
+    <a:masterClrMapping/>
+  </p:clrMapOvr>
+</p:sld>
+</file>
+
+<file path=ppt/slides/slide36.xml><?xml version="1.0" encoding="utf-8"?>
+<p:sld xmlns:a="http://schemas.openxmlformats.org/drawingml/2006/main" xmlns:r="http://schemas.openxmlformats.org/officeDocument/2006/relationships" xmlns:p="http://schemas.openxmlformats.org/presentationml/2006/main">
+  <p:cSld>
+    <p:spTree>
+      <p:nvGrpSpPr>
+        <p:cNvPr id="1" name=""/>
+        <p:cNvGrpSpPr/>
+        <p:nvPr/>
+      </p:nvGrpSpPr>
+      <p:grpSpPr>
+        <a:xfrm>
+          <a:off x="0" y="0"/>
+          <a:ext cx="0" cy="0"/>
+          <a:chOff x="0" y="0"/>
+          <a:chExt cx="0" cy="0"/>
+        </a:xfrm>
+      </p:grpSpPr>
+      <p:sp>
+        <p:nvSpPr>
+          <p:cNvPr id="2" name="Título 1">
+            <a:extLst>
+              <a:ext uri="{FF2B5EF4-FFF2-40B4-BE49-F238E27FC236}">
+                <a16:creationId xmlns:a16="http://schemas.microsoft.com/office/drawing/2014/main" id="{9EA6D259-A816-8FE6-B466-CB883C28DDDA}"/>
+              </a:ext>
+            </a:extLst>
+          </p:cNvPr>
+          <p:cNvSpPr>
+            <a:spLocks noGrp="1"/>
+          </p:cNvSpPr>
+          <p:nvPr>
+            <p:ph type="title"/>
+          </p:nvPr>
+        </p:nvSpPr>
+        <p:spPr/>
+        <p:txBody>
+          <a:bodyPr/>
+          <a:lstStyle/>
+          <a:p>
+            <a:r>
+              <a:rPr lang="pt-BR" dirty="0"/>
+              <a:t>Modelo físico de banco de dados para MySQL</a:t>
+            </a:r>
+          </a:p>
+        </p:txBody>
+      </p:sp>
+      <p:sp>
+        <p:nvSpPr>
+          <p:cNvPr id="3" name="Espaço Reservado para Conteúdo 2">
+            <a:extLst>
+              <a:ext uri="{FF2B5EF4-FFF2-40B4-BE49-F238E27FC236}">
+                <a16:creationId xmlns:a16="http://schemas.microsoft.com/office/drawing/2014/main" id="{7739F476-096D-8072-2941-079CBDE41218}"/>
+              </a:ext>
+            </a:extLst>
+          </p:cNvPr>
+          <p:cNvSpPr>
+            <a:spLocks noGrp="1"/>
+          </p:cNvSpPr>
+          <p:nvPr>
+            <p:ph idx="1"/>
+          </p:nvPr>
+        </p:nvSpPr>
+        <p:spPr>
+          <a:xfrm>
+            <a:off x="1097280" y="1737360"/>
+            <a:ext cx="10058400" cy="4023360"/>
+          </a:xfrm>
+        </p:spPr>
+        <p:txBody>
+          <a:bodyPr>
+            <a:normAutofit/>
+          </a:bodyPr>
+          <a:lstStyle/>
+          <a:p>
+            <a:r>
+              <a:rPr lang="pt-BR" sz="2400" dirty="0"/>
+              <a:t>Usaremos esse modelo criado anteriormente:</a:t>
+            </a:r>
+          </a:p>
+          <a:p>
+            <a:endParaRPr lang="pt-BR" sz="2400" dirty="0"/>
+          </a:p>
+        </p:txBody>
+      </p:sp>
+      <p:pic>
+        <p:nvPicPr>
+          <p:cNvPr id="4" name="Imagem 3">
+            <a:extLst>
+              <a:ext uri="{FF2B5EF4-FFF2-40B4-BE49-F238E27FC236}">
+                <a16:creationId xmlns:a16="http://schemas.microsoft.com/office/drawing/2014/main" id="{E19A590C-E416-2C37-F341-F6F6235531BD}"/>
+              </a:ext>
+            </a:extLst>
+          </p:cNvPr>
+          <p:cNvPicPr>
+            <a:picLocks noChangeAspect="1"/>
+          </p:cNvPicPr>
+          <p:nvPr/>
+        </p:nvPicPr>
+        <p:blipFill>
+          <a:blip r:embed="rId2">
+            <a:extLst>
+              <a:ext uri="{28A0092B-C50C-407E-A947-70E740481C1C}">
+                <a14:useLocalDpi xmlns:a14="http://schemas.microsoft.com/office/drawing/2010/main" val="0"/>
+              </a:ext>
+            </a:extLst>
+          </a:blip>
+          <a:stretch>
+            <a:fillRect/>
+          </a:stretch>
+        </p:blipFill>
+        <p:spPr>
+          <a:xfrm>
+            <a:off x="1888155" y="2202024"/>
+            <a:ext cx="8476649" cy="3803785"/>
+          </a:xfrm>
+          <a:prstGeom prst="rect">
+            <a:avLst/>
+          </a:prstGeom>
+        </p:spPr>
+      </p:pic>
+    </p:spTree>
+    <p:extLst>
+      <p:ext uri="{BB962C8B-B14F-4D97-AF65-F5344CB8AC3E}">
+        <p14:creationId xmlns:p14="http://schemas.microsoft.com/office/powerpoint/2010/main" val="4151745977"/>
+      </p:ext>
+    </p:extLst>
+  </p:cSld>
+  <p:clrMapOvr>
+    <a:masterClrMapping/>
+  </p:clrMapOvr>
+</p:sld>
+</file>
+
+<file path=ppt/slides/slide37.xml><?xml version="1.0" encoding="utf-8"?>
+<p:sld xmlns:a="http://schemas.openxmlformats.org/drawingml/2006/main" xmlns:r="http://schemas.openxmlformats.org/officeDocument/2006/relationships" xmlns:p="http://schemas.openxmlformats.org/presentationml/2006/main">
+  <p:cSld>
+    <p:spTree>
+      <p:nvGrpSpPr>
+        <p:cNvPr id="1" name=""/>
+        <p:cNvGrpSpPr/>
+        <p:nvPr/>
+      </p:nvGrpSpPr>
+      <p:grpSpPr>
+        <a:xfrm>
+          <a:off x="0" y="0"/>
+          <a:ext cx="0" cy="0"/>
+          <a:chOff x="0" y="0"/>
+          <a:chExt cx="0" cy="0"/>
+        </a:xfrm>
+      </p:grpSpPr>
+      <p:sp>
+        <p:nvSpPr>
+          <p:cNvPr id="2" name="Título 1">
+            <a:extLst>
+              <a:ext uri="{FF2B5EF4-FFF2-40B4-BE49-F238E27FC236}">
+                <a16:creationId xmlns:a16="http://schemas.microsoft.com/office/drawing/2014/main" id="{9EA6D259-A816-8FE6-B466-CB883C28DDDA}"/>
+              </a:ext>
+            </a:extLst>
+          </p:cNvPr>
+          <p:cNvSpPr>
+            <a:spLocks noGrp="1"/>
+          </p:cNvSpPr>
+          <p:nvPr>
+            <p:ph type="title"/>
+          </p:nvPr>
+        </p:nvSpPr>
+        <p:spPr/>
+        <p:txBody>
+          <a:bodyPr/>
+          <a:lstStyle/>
+          <a:p>
+            <a:r>
+              <a:rPr lang="pt-BR" dirty="0"/>
+              <a:t>Modelo físico de banco de dados para MySQL</a:t>
+            </a:r>
+          </a:p>
+        </p:txBody>
+      </p:sp>
+      <p:sp>
+        <p:nvSpPr>
+          <p:cNvPr id="3" name="Espaço Reservado para Conteúdo 2">
+            <a:extLst>
+              <a:ext uri="{FF2B5EF4-FFF2-40B4-BE49-F238E27FC236}">
+                <a16:creationId xmlns:a16="http://schemas.microsoft.com/office/drawing/2014/main" id="{7739F476-096D-8072-2941-079CBDE41218}"/>
+              </a:ext>
+            </a:extLst>
+          </p:cNvPr>
+          <p:cNvSpPr>
+            <a:spLocks noGrp="1"/>
+          </p:cNvSpPr>
+          <p:nvPr>
+            <p:ph idx="1"/>
+          </p:nvPr>
+        </p:nvSpPr>
+        <p:spPr>
+          <a:xfrm>
+            <a:off x="1097280" y="1737360"/>
+            <a:ext cx="10058400" cy="4023360"/>
+          </a:xfrm>
+        </p:spPr>
+        <p:txBody>
+          <a:bodyPr>
+            <a:normAutofit/>
+          </a:bodyPr>
+          <a:lstStyle/>
+          <a:p>
+            <a:r>
+              <a:rPr lang="pt-BR" sz="2400" dirty="0"/>
+              <a:t>No modelo EER, vá em: File &gt; </a:t>
+            </a:r>
+            <a:r>
+              <a:rPr lang="pt-BR" sz="2400" dirty="0" err="1"/>
+              <a:t>Export</a:t>
+            </a:r>
+            <a:r>
+              <a:rPr lang="pt-BR" sz="2400" dirty="0"/>
+              <a:t> &gt; </a:t>
+            </a:r>
+            <a:r>
+              <a:rPr lang="pt-BR" sz="2400" dirty="0" err="1"/>
+              <a:t>Forware</a:t>
+            </a:r>
+            <a:r>
+              <a:rPr lang="pt-BR" sz="2400" dirty="0"/>
+              <a:t> </a:t>
+            </a:r>
+            <a:r>
+              <a:rPr lang="pt-BR" sz="2400" dirty="0" err="1"/>
+              <a:t>engineer</a:t>
+            </a:r>
+            <a:r>
+              <a:rPr lang="pt-BR" sz="2400" dirty="0"/>
+              <a:t> SQL CREATE </a:t>
+            </a:r>
+            <a:r>
+              <a:rPr lang="pt-BR" sz="2400" dirty="0" err="1"/>
+              <a:t>scritp</a:t>
+            </a:r>
+            <a:r>
+              <a:rPr lang="pt-BR" sz="2400" dirty="0"/>
+              <a:t>...</a:t>
+            </a:r>
+          </a:p>
+          <a:p>
+            <a:endParaRPr lang="pt-BR" sz="2400" dirty="0"/>
+          </a:p>
+        </p:txBody>
+      </p:sp>
+      <p:pic>
+        <p:nvPicPr>
+          <p:cNvPr id="6" name="Imagem 5">
+            <a:extLst>
+              <a:ext uri="{FF2B5EF4-FFF2-40B4-BE49-F238E27FC236}">
+                <a16:creationId xmlns:a16="http://schemas.microsoft.com/office/drawing/2014/main" id="{E30FD102-A590-0277-7550-24F9E7560BC3}"/>
+              </a:ext>
+            </a:extLst>
+          </p:cNvPr>
+          <p:cNvPicPr>
+            <a:picLocks noChangeAspect="1"/>
+          </p:cNvPicPr>
+          <p:nvPr/>
+        </p:nvPicPr>
+        <p:blipFill>
+          <a:blip r:embed="rId2"/>
+          <a:stretch>
+            <a:fillRect/>
+          </a:stretch>
+        </p:blipFill>
+        <p:spPr>
+          <a:xfrm>
+            <a:off x="2562186" y="2325937"/>
+            <a:ext cx="7128588" cy="4007874"/>
+          </a:xfrm>
+          <a:prstGeom prst="rect">
+            <a:avLst/>
+          </a:prstGeom>
+        </p:spPr>
+      </p:pic>
+    </p:spTree>
+    <p:extLst>
+      <p:ext uri="{BB962C8B-B14F-4D97-AF65-F5344CB8AC3E}">
+        <p14:creationId xmlns:p14="http://schemas.microsoft.com/office/powerpoint/2010/main" val="618681772"/>
+      </p:ext>
+    </p:extLst>
+  </p:cSld>
+  <p:clrMapOvr>
+    <a:masterClrMapping/>
+  </p:clrMapOvr>
+</p:sld>
+</file>
+
+<file path=ppt/slides/slide38.xml><?xml version="1.0" encoding="utf-8"?>
+<p:sld xmlns:a="http://schemas.openxmlformats.org/drawingml/2006/main" xmlns:r="http://schemas.openxmlformats.org/officeDocument/2006/relationships" xmlns:p="http://schemas.openxmlformats.org/presentationml/2006/main">
+  <p:cSld>
+    <p:spTree>
+      <p:nvGrpSpPr>
+        <p:cNvPr id="1" name=""/>
+        <p:cNvGrpSpPr/>
+        <p:nvPr/>
+      </p:nvGrpSpPr>
+      <p:grpSpPr>
+        <a:xfrm>
+          <a:off x="0" y="0"/>
+          <a:ext cx="0" cy="0"/>
+          <a:chOff x="0" y="0"/>
+          <a:chExt cx="0" cy="0"/>
+        </a:xfrm>
+      </p:grpSpPr>
+      <p:sp>
+        <p:nvSpPr>
+          <p:cNvPr id="2" name="Título 1">
+            <a:extLst>
+              <a:ext uri="{FF2B5EF4-FFF2-40B4-BE49-F238E27FC236}">
+                <a16:creationId xmlns:a16="http://schemas.microsoft.com/office/drawing/2014/main" id="{9EA6D259-A816-8FE6-B466-CB883C28DDDA}"/>
+              </a:ext>
+            </a:extLst>
+          </p:cNvPr>
+          <p:cNvSpPr>
+            <a:spLocks noGrp="1"/>
+          </p:cNvSpPr>
+          <p:nvPr>
+            <p:ph type="title"/>
+          </p:nvPr>
+        </p:nvSpPr>
+        <p:spPr/>
+        <p:txBody>
+          <a:bodyPr/>
+          <a:lstStyle/>
+          <a:p>
+            <a:r>
+              <a:rPr lang="pt-BR" dirty="0"/>
+              <a:t>Modelo físico de banco de dados para MySQL</a:t>
+            </a:r>
+          </a:p>
+        </p:txBody>
+      </p:sp>
+      <p:sp>
+        <p:nvSpPr>
+          <p:cNvPr id="3" name="Espaço Reservado para Conteúdo 2">
+            <a:extLst>
+              <a:ext uri="{FF2B5EF4-FFF2-40B4-BE49-F238E27FC236}">
+                <a16:creationId xmlns:a16="http://schemas.microsoft.com/office/drawing/2014/main" id="{7739F476-096D-8072-2941-079CBDE41218}"/>
+              </a:ext>
+            </a:extLst>
+          </p:cNvPr>
+          <p:cNvSpPr>
+            <a:spLocks noGrp="1"/>
+          </p:cNvSpPr>
+          <p:nvPr>
+            <p:ph idx="1"/>
+          </p:nvPr>
+        </p:nvSpPr>
+        <p:spPr>
+          <a:xfrm>
+            <a:off x="1097280" y="1737360"/>
+            <a:ext cx="10058400" cy="4023360"/>
+          </a:xfrm>
+        </p:spPr>
+        <p:txBody>
+          <a:bodyPr>
+            <a:normAutofit/>
+          </a:bodyPr>
+          <a:lstStyle/>
+          <a:p>
+            <a:r>
+              <a:rPr lang="pt-BR" sz="2400" dirty="0"/>
+              <a:t>Na tela a surgir, na opção “</a:t>
+            </a:r>
+            <a:r>
+              <a:rPr lang="pt-BR" sz="2400" i="1" dirty="0"/>
+              <a:t>Output SQL Script File”</a:t>
+            </a:r>
+            <a:r>
+              <a:rPr lang="pt-BR" sz="2400" dirty="0"/>
+              <a:t> escolha o local onde deseja armazenar o seu Script, e em seguida aperte “Next”.</a:t>
+            </a:r>
+          </a:p>
+          <a:p>
+            <a:endParaRPr lang="pt-BR" sz="2400" i="1" dirty="0"/>
+          </a:p>
+          <a:p>
+            <a:endParaRPr lang="pt-BR" sz="2400" dirty="0"/>
+          </a:p>
+        </p:txBody>
+      </p:sp>
+      <p:pic>
+        <p:nvPicPr>
+          <p:cNvPr id="5" name="Imagem 4">
+            <a:extLst>
+              <a:ext uri="{FF2B5EF4-FFF2-40B4-BE49-F238E27FC236}">
+                <a16:creationId xmlns:a16="http://schemas.microsoft.com/office/drawing/2014/main" id="{2492C4E1-0461-4409-DA3C-C22BB2225680}"/>
+              </a:ext>
+            </a:extLst>
+          </p:cNvPr>
+          <p:cNvPicPr>
+            <a:picLocks noChangeAspect="1"/>
+          </p:cNvPicPr>
+          <p:nvPr/>
+        </p:nvPicPr>
+        <p:blipFill>
+          <a:blip r:embed="rId2"/>
+          <a:stretch>
+            <a:fillRect/>
+          </a:stretch>
+        </p:blipFill>
+        <p:spPr>
+          <a:xfrm>
+            <a:off x="2802495" y="2421294"/>
+            <a:ext cx="6587010" cy="3703385"/>
+          </a:xfrm>
+          <a:prstGeom prst="rect">
+            <a:avLst/>
+          </a:prstGeom>
+        </p:spPr>
+      </p:pic>
+    </p:spTree>
+    <p:extLst>
+      <p:ext uri="{BB962C8B-B14F-4D97-AF65-F5344CB8AC3E}">
+        <p14:creationId xmlns:p14="http://schemas.microsoft.com/office/powerpoint/2010/main" val="47159787"/>
+      </p:ext>
+    </p:extLst>
+  </p:cSld>
+  <p:clrMapOvr>
+    <a:masterClrMapping/>
+  </p:clrMapOvr>
+</p:sld>
+</file>
+
+<file path=ppt/slides/slide39.xml><?xml version="1.0" encoding="utf-8"?>
+<p:sld xmlns:a="http://schemas.openxmlformats.org/drawingml/2006/main" xmlns:r="http://schemas.openxmlformats.org/officeDocument/2006/relationships" xmlns:p="http://schemas.openxmlformats.org/presentationml/2006/main">
+  <p:cSld>
+    <p:spTree>
+      <p:nvGrpSpPr>
+        <p:cNvPr id="1" name=""/>
+        <p:cNvGrpSpPr/>
+        <p:nvPr/>
+      </p:nvGrpSpPr>
+      <p:grpSpPr>
+        <a:xfrm>
+          <a:off x="0" y="0"/>
+          <a:ext cx="0" cy="0"/>
+          <a:chOff x="0" y="0"/>
+          <a:chExt cx="0" cy="0"/>
+        </a:xfrm>
+      </p:grpSpPr>
+      <p:sp>
+        <p:nvSpPr>
+          <p:cNvPr id="2" name="Título 1">
+            <a:extLst>
+              <a:ext uri="{FF2B5EF4-FFF2-40B4-BE49-F238E27FC236}">
+                <a16:creationId xmlns:a16="http://schemas.microsoft.com/office/drawing/2014/main" id="{9EA6D259-A816-8FE6-B466-CB883C28DDDA}"/>
+              </a:ext>
+            </a:extLst>
+          </p:cNvPr>
+          <p:cNvSpPr>
+            <a:spLocks noGrp="1"/>
+          </p:cNvSpPr>
+          <p:nvPr>
+            <p:ph type="title"/>
+          </p:nvPr>
+        </p:nvSpPr>
+        <p:spPr/>
+        <p:txBody>
+          <a:bodyPr/>
+          <a:lstStyle/>
+          <a:p>
+            <a:r>
+              <a:rPr lang="pt-BR" dirty="0"/>
+              <a:t>Modelo físico de banco de dados para MySQL</a:t>
+            </a:r>
+          </a:p>
+        </p:txBody>
+      </p:sp>
+      <p:sp>
+        <p:nvSpPr>
+          <p:cNvPr id="3" name="Espaço Reservado para Conteúdo 2">
+            <a:extLst>
+              <a:ext uri="{FF2B5EF4-FFF2-40B4-BE49-F238E27FC236}">
+                <a16:creationId xmlns:a16="http://schemas.microsoft.com/office/drawing/2014/main" id="{7739F476-096D-8072-2941-079CBDE41218}"/>
+              </a:ext>
+            </a:extLst>
+          </p:cNvPr>
+          <p:cNvSpPr>
+            <a:spLocks noGrp="1"/>
+          </p:cNvSpPr>
+          <p:nvPr>
+            <p:ph idx="1"/>
+          </p:nvPr>
+        </p:nvSpPr>
+        <p:spPr>
+          <a:xfrm>
+            <a:off x="1097280" y="1737360"/>
+            <a:ext cx="10058400" cy="4023360"/>
+          </a:xfrm>
+        </p:spPr>
+        <p:txBody>
+          <a:bodyPr>
+            <a:normAutofit/>
+          </a:bodyPr>
+          <a:lstStyle/>
+          <a:p>
+            <a:r>
+              <a:rPr lang="pt-BR" sz="2400" dirty="0"/>
+              <a:t>Na tela a surgir, na opção “</a:t>
+            </a:r>
+            <a:r>
+              <a:rPr lang="pt-BR" sz="2400" i="1" dirty="0"/>
+              <a:t>Output SQL Script File”</a:t>
+            </a:r>
+            <a:r>
+              <a:rPr lang="pt-BR" sz="2400" dirty="0"/>
+              <a:t> escolha o local onde deseja armazenar o seu Script, e em seguida aperte “Next”.</a:t>
+            </a:r>
+          </a:p>
+          <a:p>
+            <a:endParaRPr lang="pt-BR" sz="2400" i="1" dirty="0"/>
+          </a:p>
+          <a:p>
+            <a:endParaRPr lang="pt-BR" sz="2400" dirty="0"/>
+          </a:p>
+        </p:txBody>
+      </p:sp>
+      <p:pic>
+        <p:nvPicPr>
+          <p:cNvPr id="5" name="Imagem 4">
+            <a:extLst>
+              <a:ext uri="{FF2B5EF4-FFF2-40B4-BE49-F238E27FC236}">
+                <a16:creationId xmlns:a16="http://schemas.microsoft.com/office/drawing/2014/main" id="{2492C4E1-0461-4409-DA3C-C22BB2225680}"/>
+              </a:ext>
+            </a:extLst>
+          </p:cNvPr>
+          <p:cNvPicPr>
+            <a:picLocks noChangeAspect="1"/>
+          </p:cNvPicPr>
+          <p:nvPr/>
+        </p:nvPicPr>
+        <p:blipFill>
+          <a:blip r:embed="rId2"/>
+          <a:stretch>
+            <a:fillRect/>
+          </a:stretch>
+        </p:blipFill>
+        <p:spPr>
+          <a:xfrm>
+            <a:off x="2802495" y="2421294"/>
+            <a:ext cx="6587010" cy="3703385"/>
+          </a:xfrm>
+          <a:prstGeom prst="rect">
+            <a:avLst/>
+          </a:prstGeom>
+        </p:spPr>
+      </p:pic>
+    </p:spTree>
+    <p:extLst>
+      <p:ext uri="{BB962C8B-B14F-4D97-AF65-F5344CB8AC3E}">
+        <p14:creationId xmlns:p14="http://schemas.microsoft.com/office/powerpoint/2010/main" val="4181420350"/>
+      </p:ext>
+    </p:extLst>
+  </p:cSld>
+  <p:clrMapOvr>
+    <a:masterClrMapping/>
+  </p:clrMapOvr>
+</p:sld>
+</file>
+
 <file path=ppt/slides/slide4.xml><?xml version="1.0" encoding="utf-8"?>
 <p:sld xmlns:a="http://schemas.openxmlformats.org/drawingml/2006/main" xmlns:r="http://schemas.openxmlformats.org/officeDocument/2006/relationships" xmlns:p="http://schemas.openxmlformats.org/presentationml/2006/main">
   <p:cSld>
@@ -14857,6 +15944,899 @@
     <p:extLst>
       <p:ext uri="{BB962C8B-B14F-4D97-AF65-F5344CB8AC3E}">
         <p14:creationId xmlns:p14="http://schemas.microsoft.com/office/powerpoint/2010/main" val="1898096720"/>
+      </p:ext>
+    </p:extLst>
+  </p:cSld>
+  <p:clrMapOvr>
+    <a:masterClrMapping/>
+  </p:clrMapOvr>
+</p:sld>
+</file>
+
+<file path=ppt/slides/slide40.xml><?xml version="1.0" encoding="utf-8"?>
+<p:sld xmlns:a="http://schemas.openxmlformats.org/drawingml/2006/main" xmlns:r="http://schemas.openxmlformats.org/officeDocument/2006/relationships" xmlns:p="http://schemas.openxmlformats.org/presentationml/2006/main">
+  <p:cSld>
+    <p:spTree>
+      <p:nvGrpSpPr>
+        <p:cNvPr id="1" name=""/>
+        <p:cNvGrpSpPr/>
+        <p:nvPr/>
+      </p:nvGrpSpPr>
+      <p:grpSpPr>
+        <a:xfrm>
+          <a:off x="0" y="0"/>
+          <a:ext cx="0" cy="0"/>
+          <a:chOff x="0" y="0"/>
+          <a:chExt cx="0" cy="0"/>
+        </a:xfrm>
+      </p:grpSpPr>
+      <p:sp>
+        <p:nvSpPr>
+          <p:cNvPr id="2" name="Título 1">
+            <a:extLst>
+              <a:ext uri="{FF2B5EF4-FFF2-40B4-BE49-F238E27FC236}">
+                <a16:creationId xmlns:a16="http://schemas.microsoft.com/office/drawing/2014/main" id="{9EA6D259-A816-8FE6-B466-CB883C28DDDA}"/>
+              </a:ext>
+            </a:extLst>
+          </p:cNvPr>
+          <p:cNvSpPr>
+            <a:spLocks noGrp="1"/>
+          </p:cNvSpPr>
+          <p:nvPr>
+            <p:ph type="title"/>
+          </p:nvPr>
+        </p:nvSpPr>
+        <p:spPr/>
+        <p:txBody>
+          <a:bodyPr/>
+          <a:lstStyle/>
+          <a:p>
+            <a:r>
+              <a:rPr lang="pt-BR" dirty="0"/>
+              <a:t>Modelo físico de banco de dados para MySQL</a:t>
+            </a:r>
+          </a:p>
+        </p:txBody>
+      </p:sp>
+      <p:sp>
+        <p:nvSpPr>
+          <p:cNvPr id="3" name="Espaço Reservado para Conteúdo 2">
+            <a:extLst>
+              <a:ext uri="{FF2B5EF4-FFF2-40B4-BE49-F238E27FC236}">
+                <a16:creationId xmlns:a16="http://schemas.microsoft.com/office/drawing/2014/main" id="{7739F476-096D-8072-2941-079CBDE41218}"/>
+              </a:ext>
+            </a:extLst>
+          </p:cNvPr>
+          <p:cNvSpPr>
+            <a:spLocks noGrp="1"/>
+          </p:cNvSpPr>
+          <p:nvPr>
+            <p:ph idx="1"/>
+          </p:nvPr>
+        </p:nvSpPr>
+        <p:spPr>
+          <a:xfrm>
+            <a:off x="1097280" y="1737360"/>
+            <a:ext cx="10058400" cy="4023360"/>
+          </a:xfrm>
+        </p:spPr>
+        <p:txBody>
+          <a:bodyPr>
+            <a:normAutofit/>
+          </a:bodyPr>
+          <a:lstStyle/>
+          <a:p>
+            <a:r>
+              <a:rPr lang="pt-BR" sz="2400" dirty="0"/>
+              <a:t>Em seguida aperte “Next” novamente...</a:t>
+            </a:r>
+          </a:p>
+          <a:p>
+            <a:endParaRPr lang="pt-BR" sz="2400" i="1" dirty="0"/>
+          </a:p>
+          <a:p>
+            <a:endParaRPr lang="pt-BR" sz="2400" dirty="0"/>
+          </a:p>
+        </p:txBody>
+      </p:sp>
+      <p:pic>
+        <p:nvPicPr>
+          <p:cNvPr id="6" name="Imagem 5">
+            <a:extLst>
+              <a:ext uri="{FF2B5EF4-FFF2-40B4-BE49-F238E27FC236}">
+                <a16:creationId xmlns:a16="http://schemas.microsoft.com/office/drawing/2014/main" id="{AEACA7A7-5BA9-2350-205C-D3E09DB1ECD2}"/>
+              </a:ext>
+            </a:extLst>
+          </p:cNvPr>
+          <p:cNvPicPr>
+            <a:picLocks noChangeAspect="1"/>
+          </p:cNvPicPr>
+          <p:nvPr/>
+        </p:nvPicPr>
+        <p:blipFill>
+          <a:blip r:embed="rId2"/>
+          <a:stretch>
+            <a:fillRect/>
+          </a:stretch>
+        </p:blipFill>
+        <p:spPr>
+          <a:xfrm>
+            <a:off x="2517933" y="2161162"/>
+            <a:ext cx="7156133" cy="4023360"/>
+          </a:xfrm>
+          <a:prstGeom prst="rect">
+            <a:avLst/>
+          </a:prstGeom>
+        </p:spPr>
+      </p:pic>
+    </p:spTree>
+    <p:extLst>
+      <p:ext uri="{BB962C8B-B14F-4D97-AF65-F5344CB8AC3E}">
+        <p14:creationId xmlns:p14="http://schemas.microsoft.com/office/powerpoint/2010/main" val="1305812505"/>
+      </p:ext>
+    </p:extLst>
+  </p:cSld>
+  <p:clrMapOvr>
+    <a:masterClrMapping/>
+  </p:clrMapOvr>
+</p:sld>
+</file>
+
+<file path=ppt/slides/slide41.xml><?xml version="1.0" encoding="utf-8"?>
+<p:sld xmlns:a="http://schemas.openxmlformats.org/drawingml/2006/main" xmlns:r="http://schemas.openxmlformats.org/officeDocument/2006/relationships" xmlns:p="http://schemas.openxmlformats.org/presentationml/2006/main">
+  <p:cSld>
+    <p:spTree>
+      <p:nvGrpSpPr>
+        <p:cNvPr id="1" name=""/>
+        <p:cNvGrpSpPr/>
+        <p:nvPr/>
+      </p:nvGrpSpPr>
+      <p:grpSpPr>
+        <a:xfrm>
+          <a:off x="0" y="0"/>
+          <a:ext cx="0" cy="0"/>
+          <a:chOff x="0" y="0"/>
+          <a:chExt cx="0" cy="0"/>
+        </a:xfrm>
+      </p:grpSpPr>
+      <p:sp>
+        <p:nvSpPr>
+          <p:cNvPr id="2" name="Título 1">
+            <a:extLst>
+              <a:ext uri="{FF2B5EF4-FFF2-40B4-BE49-F238E27FC236}">
+                <a16:creationId xmlns:a16="http://schemas.microsoft.com/office/drawing/2014/main" id="{9EA6D259-A816-8FE6-B466-CB883C28DDDA}"/>
+              </a:ext>
+            </a:extLst>
+          </p:cNvPr>
+          <p:cNvSpPr>
+            <a:spLocks noGrp="1"/>
+          </p:cNvSpPr>
+          <p:nvPr>
+            <p:ph type="title"/>
+          </p:nvPr>
+        </p:nvSpPr>
+        <p:spPr/>
+        <p:txBody>
+          <a:bodyPr/>
+          <a:lstStyle/>
+          <a:p>
+            <a:r>
+              <a:rPr lang="pt-BR" dirty="0"/>
+              <a:t>Modelo físico de banco de dados para MySQL</a:t>
+            </a:r>
+          </a:p>
+        </p:txBody>
+      </p:sp>
+      <p:sp>
+        <p:nvSpPr>
+          <p:cNvPr id="3" name="Espaço Reservado para Conteúdo 2">
+            <a:extLst>
+              <a:ext uri="{FF2B5EF4-FFF2-40B4-BE49-F238E27FC236}">
+                <a16:creationId xmlns:a16="http://schemas.microsoft.com/office/drawing/2014/main" id="{7739F476-096D-8072-2941-079CBDE41218}"/>
+              </a:ext>
+            </a:extLst>
+          </p:cNvPr>
+          <p:cNvSpPr>
+            <a:spLocks noGrp="1"/>
+          </p:cNvSpPr>
+          <p:nvPr>
+            <p:ph idx="1"/>
+          </p:nvPr>
+        </p:nvSpPr>
+        <p:spPr>
+          <a:xfrm>
+            <a:off x="1097280" y="1737360"/>
+            <a:ext cx="4221169" cy="4023360"/>
+          </a:xfrm>
+        </p:spPr>
+        <p:txBody>
+          <a:bodyPr>
+            <a:normAutofit/>
+          </a:bodyPr>
+          <a:lstStyle/>
+          <a:p>
+            <a:r>
+              <a:rPr lang="pt-BR" sz="2400" dirty="0"/>
+              <a:t>E finalmente veremos o script que será gerado a parir do nosso Diagrama.</a:t>
+            </a:r>
+          </a:p>
+          <a:p>
+            <a:r>
+              <a:rPr lang="pt-BR" sz="2400" dirty="0"/>
+              <a:t>Clique em “</a:t>
+            </a:r>
+            <a:r>
+              <a:rPr lang="pt-BR" sz="2400" dirty="0" err="1"/>
+              <a:t>Finish</a:t>
+            </a:r>
+            <a:r>
+              <a:rPr lang="pt-BR" sz="2400" dirty="0"/>
+              <a:t>”.</a:t>
+            </a:r>
+          </a:p>
+          <a:p>
+            <a:endParaRPr lang="pt-BR" sz="2400" i="1" dirty="0"/>
+          </a:p>
+          <a:p>
+            <a:endParaRPr lang="pt-BR" sz="2400" dirty="0"/>
+          </a:p>
+        </p:txBody>
+      </p:sp>
+      <p:pic>
+        <p:nvPicPr>
+          <p:cNvPr id="5" name="Imagem 4">
+            <a:extLst>
+              <a:ext uri="{FF2B5EF4-FFF2-40B4-BE49-F238E27FC236}">
+                <a16:creationId xmlns:a16="http://schemas.microsoft.com/office/drawing/2014/main" id="{D1D7FC20-646A-C86F-8F93-C13B592BC2BC}"/>
+              </a:ext>
+            </a:extLst>
+          </p:cNvPr>
+          <p:cNvPicPr>
+            <a:picLocks noChangeAspect="1"/>
+          </p:cNvPicPr>
+          <p:nvPr/>
+        </p:nvPicPr>
+        <p:blipFill rotWithShape="1">
+          <a:blip r:embed="rId2"/>
+          <a:srcRect l="21582" t="8960" r="21020" b="13996"/>
+          <a:stretch/>
+        </p:blipFill>
+        <p:spPr>
+          <a:xfrm>
+            <a:off x="5468983" y="1826001"/>
+            <a:ext cx="5686697" cy="4291560"/>
+          </a:xfrm>
+          <a:prstGeom prst="rect">
+            <a:avLst/>
+          </a:prstGeom>
+        </p:spPr>
+      </p:pic>
+    </p:spTree>
+    <p:extLst>
+      <p:ext uri="{BB962C8B-B14F-4D97-AF65-F5344CB8AC3E}">
+        <p14:creationId xmlns:p14="http://schemas.microsoft.com/office/powerpoint/2010/main" val="3072662630"/>
+      </p:ext>
+    </p:extLst>
+  </p:cSld>
+  <p:clrMapOvr>
+    <a:masterClrMapping/>
+  </p:clrMapOvr>
+</p:sld>
+</file>
+
+<file path=ppt/slides/slide42.xml><?xml version="1.0" encoding="utf-8"?>
+<p:sld xmlns:a="http://schemas.openxmlformats.org/drawingml/2006/main" xmlns:r="http://schemas.openxmlformats.org/officeDocument/2006/relationships" xmlns:p="http://schemas.openxmlformats.org/presentationml/2006/main">
+  <p:cSld>
+    <p:spTree>
+      <p:nvGrpSpPr>
+        <p:cNvPr id="1" name=""/>
+        <p:cNvGrpSpPr/>
+        <p:nvPr/>
+      </p:nvGrpSpPr>
+      <p:grpSpPr>
+        <a:xfrm>
+          <a:off x="0" y="0"/>
+          <a:ext cx="0" cy="0"/>
+          <a:chOff x="0" y="0"/>
+          <a:chExt cx="0" cy="0"/>
+        </a:xfrm>
+      </p:grpSpPr>
+      <p:sp>
+        <p:nvSpPr>
+          <p:cNvPr id="2" name="Título 1">
+            <a:extLst>
+              <a:ext uri="{FF2B5EF4-FFF2-40B4-BE49-F238E27FC236}">
+                <a16:creationId xmlns:a16="http://schemas.microsoft.com/office/drawing/2014/main" id="{9EA6D259-A816-8FE6-B466-CB883C28DDDA}"/>
+              </a:ext>
+            </a:extLst>
+          </p:cNvPr>
+          <p:cNvSpPr>
+            <a:spLocks noGrp="1"/>
+          </p:cNvSpPr>
+          <p:nvPr>
+            <p:ph type="title"/>
+          </p:nvPr>
+        </p:nvSpPr>
+        <p:spPr/>
+        <p:txBody>
+          <a:bodyPr/>
+          <a:lstStyle/>
+          <a:p>
+            <a:r>
+              <a:rPr lang="pt-BR" dirty="0"/>
+              <a:t>Modelo físico de banco de dados para MySQL</a:t>
+            </a:r>
+          </a:p>
+        </p:txBody>
+      </p:sp>
+      <p:sp>
+        <p:nvSpPr>
+          <p:cNvPr id="3" name="Espaço Reservado para Conteúdo 2">
+            <a:extLst>
+              <a:ext uri="{FF2B5EF4-FFF2-40B4-BE49-F238E27FC236}">
+                <a16:creationId xmlns:a16="http://schemas.microsoft.com/office/drawing/2014/main" id="{7739F476-096D-8072-2941-079CBDE41218}"/>
+              </a:ext>
+            </a:extLst>
+          </p:cNvPr>
+          <p:cNvSpPr>
+            <a:spLocks noGrp="1"/>
+          </p:cNvSpPr>
+          <p:nvPr>
+            <p:ph idx="1"/>
+          </p:nvPr>
+        </p:nvSpPr>
+        <p:spPr>
+          <a:xfrm>
+            <a:off x="1097280" y="1737360"/>
+            <a:ext cx="10058400" cy="4023360"/>
+          </a:xfrm>
+        </p:spPr>
+        <p:txBody>
+          <a:bodyPr>
+            <a:normAutofit/>
+          </a:bodyPr>
+          <a:lstStyle/>
+          <a:p>
+            <a:r>
+              <a:rPr lang="pt-BR" sz="2400" dirty="0"/>
+              <a:t>Vá até o local do arquivo salvo e abra ele.</a:t>
+            </a:r>
+          </a:p>
+          <a:p>
+            <a:endParaRPr lang="pt-BR" sz="2400" dirty="0"/>
+          </a:p>
+          <a:p>
+            <a:endParaRPr lang="pt-BR" sz="2400" i="1" dirty="0"/>
+          </a:p>
+          <a:p>
+            <a:endParaRPr lang="pt-BR" sz="2400" dirty="0"/>
+          </a:p>
+        </p:txBody>
+      </p:sp>
+      <p:pic>
+        <p:nvPicPr>
+          <p:cNvPr id="6" name="Imagem 5">
+            <a:extLst>
+              <a:ext uri="{FF2B5EF4-FFF2-40B4-BE49-F238E27FC236}">
+                <a16:creationId xmlns:a16="http://schemas.microsoft.com/office/drawing/2014/main" id="{07DF6E0E-E994-0CE0-F195-FCDE5102605C}"/>
+              </a:ext>
+            </a:extLst>
+          </p:cNvPr>
+          <p:cNvPicPr>
+            <a:picLocks noChangeAspect="1"/>
+          </p:cNvPicPr>
+          <p:nvPr/>
+        </p:nvPicPr>
+        <p:blipFill rotWithShape="1">
+          <a:blip r:embed="rId2"/>
+          <a:srcRect r="32347" b="50000"/>
+          <a:stretch/>
+        </p:blipFill>
+        <p:spPr>
+          <a:xfrm>
+            <a:off x="1586204" y="2333393"/>
+            <a:ext cx="8248261" cy="3427327"/>
+          </a:xfrm>
+          <a:prstGeom prst="rect">
+            <a:avLst/>
+          </a:prstGeom>
+        </p:spPr>
+      </p:pic>
+    </p:spTree>
+    <p:extLst>
+      <p:ext uri="{BB962C8B-B14F-4D97-AF65-F5344CB8AC3E}">
+        <p14:creationId xmlns:p14="http://schemas.microsoft.com/office/powerpoint/2010/main" val="3220218934"/>
+      </p:ext>
+    </p:extLst>
+  </p:cSld>
+  <p:clrMapOvr>
+    <a:masterClrMapping/>
+  </p:clrMapOvr>
+</p:sld>
+</file>
+
+<file path=ppt/slides/slide43.xml><?xml version="1.0" encoding="utf-8"?>
+<p:sld xmlns:a="http://schemas.openxmlformats.org/drawingml/2006/main" xmlns:r="http://schemas.openxmlformats.org/officeDocument/2006/relationships" xmlns:p="http://schemas.openxmlformats.org/presentationml/2006/main">
+  <p:cSld>
+    <p:spTree>
+      <p:nvGrpSpPr>
+        <p:cNvPr id="1" name=""/>
+        <p:cNvGrpSpPr/>
+        <p:nvPr/>
+      </p:nvGrpSpPr>
+      <p:grpSpPr>
+        <a:xfrm>
+          <a:off x="0" y="0"/>
+          <a:ext cx="0" cy="0"/>
+          <a:chOff x="0" y="0"/>
+          <a:chExt cx="0" cy="0"/>
+        </a:xfrm>
+      </p:grpSpPr>
+      <p:sp>
+        <p:nvSpPr>
+          <p:cNvPr id="2" name="Título 1">
+            <a:extLst>
+              <a:ext uri="{FF2B5EF4-FFF2-40B4-BE49-F238E27FC236}">
+                <a16:creationId xmlns:a16="http://schemas.microsoft.com/office/drawing/2014/main" id="{9EA6D259-A816-8FE6-B466-CB883C28DDDA}"/>
+              </a:ext>
+            </a:extLst>
+          </p:cNvPr>
+          <p:cNvSpPr>
+            <a:spLocks noGrp="1"/>
+          </p:cNvSpPr>
+          <p:nvPr>
+            <p:ph type="title"/>
+          </p:nvPr>
+        </p:nvSpPr>
+        <p:spPr/>
+        <p:txBody>
+          <a:bodyPr/>
+          <a:lstStyle/>
+          <a:p>
+            <a:r>
+              <a:rPr lang="pt-BR" dirty="0"/>
+              <a:t>Modelo físico de banco de dados para MySQL</a:t>
+            </a:r>
+          </a:p>
+        </p:txBody>
+      </p:sp>
+      <p:sp>
+        <p:nvSpPr>
+          <p:cNvPr id="3" name="Espaço Reservado para Conteúdo 2">
+            <a:extLst>
+              <a:ext uri="{FF2B5EF4-FFF2-40B4-BE49-F238E27FC236}">
+                <a16:creationId xmlns:a16="http://schemas.microsoft.com/office/drawing/2014/main" id="{7739F476-096D-8072-2941-079CBDE41218}"/>
+              </a:ext>
+            </a:extLst>
+          </p:cNvPr>
+          <p:cNvSpPr>
+            <a:spLocks noGrp="1"/>
+          </p:cNvSpPr>
+          <p:nvPr>
+            <p:ph idx="1"/>
+          </p:nvPr>
+        </p:nvSpPr>
+        <p:spPr>
+          <a:xfrm>
+            <a:off x="1097280" y="1737360"/>
+            <a:ext cx="10058400" cy="4023360"/>
+          </a:xfrm>
+        </p:spPr>
+        <p:txBody>
+          <a:bodyPr>
+            <a:normAutofit/>
+          </a:bodyPr>
+          <a:lstStyle/>
+          <a:p>
+            <a:r>
+              <a:rPr lang="pt-BR" sz="2400" dirty="0"/>
+              <a:t>Em caso do arquivo não estiver executável, basta copiá-lo e colá-lo no seu espaço de trabalho.</a:t>
+            </a:r>
+          </a:p>
+          <a:p>
+            <a:endParaRPr lang="pt-BR" sz="2400" dirty="0"/>
+          </a:p>
+          <a:p>
+            <a:endParaRPr lang="pt-BR" sz="2400" i="1" dirty="0"/>
+          </a:p>
+          <a:p>
+            <a:endParaRPr lang="pt-BR" sz="2400" dirty="0"/>
+          </a:p>
+        </p:txBody>
+      </p:sp>
+      <p:pic>
+        <p:nvPicPr>
+          <p:cNvPr id="5" name="Imagem 4">
+            <a:extLst>
+              <a:ext uri="{FF2B5EF4-FFF2-40B4-BE49-F238E27FC236}">
+                <a16:creationId xmlns:a16="http://schemas.microsoft.com/office/drawing/2014/main" id="{01281308-BF6A-77A3-7318-D1DE3FA51E6A}"/>
+              </a:ext>
+            </a:extLst>
+          </p:cNvPr>
+          <p:cNvPicPr>
+            <a:picLocks noChangeAspect="1"/>
+          </p:cNvPicPr>
+          <p:nvPr/>
+        </p:nvPicPr>
+        <p:blipFill rotWithShape="1">
+          <a:blip r:embed="rId2"/>
+          <a:srcRect r="17500" b="28697"/>
+          <a:stretch/>
+        </p:blipFill>
+        <p:spPr>
+          <a:xfrm>
+            <a:off x="2124463" y="2436070"/>
+            <a:ext cx="7943074" cy="3859691"/>
+          </a:xfrm>
+          <a:prstGeom prst="rect">
+            <a:avLst/>
+          </a:prstGeom>
+        </p:spPr>
+      </p:pic>
+    </p:spTree>
+    <p:extLst>
+      <p:ext uri="{BB962C8B-B14F-4D97-AF65-F5344CB8AC3E}">
+        <p14:creationId xmlns:p14="http://schemas.microsoft.com/office/powerpoint/2010/main" val="3521277433"/>
+      </p:ext>
+    </p:extLst>
+  </p:cSld>
+  <p:clrMapOvr>
+    <a:masterClrMapping/>
+  </p:clrMapOvr>
+</p:sld>
+</file>
+
+<file path=ppt/slides/slide44.xml><?xml version="1.0" encoding="utf-8"?>
+<p:sld xmlns:a="http://schemas.openxmlformats.org/drawingml/2006/main" xmlns:r="http://schemas.openxmlformats.org/officeDocument/2006/relationships" xmlns:p="http://schemas.openxmlformats.org/presentationml/2006/main">
+  <p:cSld>
+    <p:spTree>
+      <p:nvGrpSpPr>
+        <p:cNvPr id="1" name=""/>
+        <p:cNvGrpSpPr/>
+        <p:nvPr/>
+      </p:nvGrpSpPr>
+      <p:grpSpPr>
+        <a:xfrm>
+          <a:off x="0" y="0"/>
+          <a:ext cx="0" cy="0"/>
+          <a:chOff x="0" y="0"/>
+          <a:chExt cx="0" cy="0"/>
+        </a:xfrm>
+      </p:grpSpPr>
+      <p:sp>
+        <p:nvSpPr>
+          <p:cNvPr id="2" name="Título 1">
+            <a:extLst>
+              <a:ext uri="{FF2B5EF4-FFF2-40B4-BE49-F238E27FC236}">
+                <a16:creationId xmlns:a16="http://schemas.microsoft.com/office/drawing/2014/main" id="{9EA6D259-A816-8FE6-B466-CB883C28DDDA}"/>
+              </a:ext>
+            </a:extLst>
+          </p:cNvPr>
+          <p:cNvSpPr>
+            <a:spLocks noGrp="1"/>
+          </p:cNvSpPr>
+          <p:nvPr>
+            <p:ph type="title"/>
+          </p:nvPr>
+        </p:nvSpPr>
+        <p:spPr/>
+        <p:txBody>
+          <a:bodyPr/>
+          <a:lstStyle/>
+          <a:p>
+            <a:r>
+              <a:rPr lang="pt-BR" dirty="0"/>
+              <a:t>Modelo físico de banco de dados para MySQL</a:t>
+            </a:r>
+          </a:p>
+        </p:txBody>
+      </p:sp>
+      <p:sp>
+        <p:nvSpPr>
+          <p:cNvPr id="3" name="Espaço Reservado para Conteúdo 2">
+            <a:extLst>
+              <a:ext uri="{FF2B5EF4-FFF2-40B4-BE49-F238E27FC236}">
+                <a16:creationId xmlns:a16="http://schemas.microsoft.com/office/drawing/2014/main" id="{7739F476-096D-8072-2941-079CBDE41218}"/>
+              </a:ext>
+            </a:extLst>
+          </p:cNvPr>
+          <p:cNvSpPr>
+            <a:spLocks noGrp="1"/>
+          </p:cNvSpPr>
+          <p:nvPr>
+            <p:ph idx="1"/>
+          </p:nvPr>
+        </p:nvSpPr>
+        <p:spPr>
+          <a:xfrm>
+            <a:off x="1097280" y="1737360"/>
+            <a:ext cx="10058400" cy="4023360"/>
+          </a:xfrm>
+        </p:spPr>
+        <p:txBody>
+          <a:bodyPr>
+            <a:normAutofit/>
+          </a:bodyPr>
+          <a:lstStyle/>
+          <a:p>
+            <a:r>
+              <a:rPr lang="pt-BR" sz="2400" dirty="0"/>
+              <a:t>Ao executar no script, as nossas tabelas serão criadas conforme observamos na imagem abaixo.</a:t>
+            </a:r>
+          </a:p>
+          <a:p>
+            <a:endParaRPr lang="pt-BR" sz="2400" dirty="0"/>
+          </a:p>
+          <a:p>
+            <a:endParaRPr lang="pt-BR" sz="2400" i="1" dirty="0"/>
+          </a:p>
+          <a:p>
+            <a:endParaRPr lang="pt-BR" sz="2400" dirty="0"/>
+          </a:p>
+        </p:txBody>
+      </p:sp>
+      <p:pic>
+        <p:nvPicPr>
+          <p:cNvPr id="6" name="Imagem 5">
+            <a:extLst>
+              <a:ext uri="{FF2B5EF4-FFF2-40B4-BE49-F238E27FC236}">
+                <a16:creationId xmlns:a16="http://schemas.microsoft.com/office/drawing/2014/main" id="{CDA38C45-0046-C3C2-7030-05533075E2EF}"/>
+              </a:ext>
+            </a:extLst>
+          </p:cNvPr>
+          <p:cNvPicPr>
+            <a:picLocks noChangeAspect="1"/>
+          </p:cNvPicPr>
+          <p:nvPr/>
+        </p:nvPicPr>
+        <p:blipFill rotWithShape="1">
+          <a:blip r:embed="rId2"/>
+          <a:srcRect r="-156"/>
+          <a:stretch/>
+        </p:blipFill>
+        <p:spPr>
+          <a:xfrm>
+            <a:off x="2686883" y="2433399"/>
+            <a:ext cx="6818234" cy="3827442"/>
+          </a:xfrm>
+          <a:prstGeom prst="rect">
+            <a:avLst/>
+          </a:prstGeom>
+        </p:spPr>
+      </p:pic>
+    </p:spTree>
+    <p:extLst>
+      <p:ext uri="{BB962C8B-B14F-4D97-AF65-F5344CB8AC3E}">
+        <p14:creationId xmlns:p14="http://schemas.microsoft.com/office/powerpoint/2010/main" val="2839301952"/>
+      </p:ext>
+    </p:extLst>
+  </p:cSld>
+  <p:clrMapOvr>
+    <a:masterClrMapping/>
+  </p:clrMapOvr>
+</p:sld>
+</file>
+
+<file path=ppt/slides/slide45.xml><?xml version="1.0" encoding="utf-8"?>
+<p:sld xmlns:a="http://schemas.openxmlformats.org/drawingml/2006/main" xmlns:r="http://schemas.openxmlformats.org/officeDocument/2006/relationships" xmlns:p="http://schemas.openxmlformats.org/presentationml/2006/main">
+  <p:cSld>
+    <p:spTree>
+      <p:nvGrpSpPr>
+        <p:cNvPr id="1" name=""/>
+        <p:cNvGrpSpPr/>
+        <p:nvPr/>
+      </p:nvGrpSpPr>
+      <p:grpSpPr>
+        <a:xfrm>
+          <a:off x="0" y="0"/>
+          <a:ext cx="0" cy="0"/>
+          <a:chOff x="0" y="0"/>
+          <a:chExt cx="0" cy="0"/>
+        </a:xfrm>
+      </p:grpSpPr>
+      <p:sp>
+        <p:nvSpPr>
+          <p:cNvPr id="2" name="Título 1">
+            <a:extLst>
+              <a:ext uri="{FF2B5EF4-FFF2-40B4-BE49-F238E27FC236}">
+                <a16:creationId xmlns:a16="http://schemas.microsoft.com/office/drawing/2014/main" id="{9EA6D259-A816-8FE6-B466-CB883C28DDDA}"/>
+              </a:ext>
+            </a:extLst>
+          </p:cNvPr>
+          <p:cNvSpPr>
+            <a:spLocks noGrp="1"/>
+          </p:cNvSpPr>
+          <p:nvPr>
+            <p:ph type="title"/>
+          </p:nvPr>
+        </p:nvSpPr>
+        <p:spPr/>
+        <p:txBody>
+          <a:bodyPr/>
+          <a:lstStyle/>
+          <a:p>
+            <a:r>
+              <a:rPr lang="pt-BR" dirty="0"/>
+              <a:t>Modelo físico de banco de dados para MySQL</a:t>
+            </a:r>
+          </a:p>
+        </p:txBody>
+      </p:sp>
+      <p:sp>
+        <p:nvSpPr>
+          <p:cNvPr id="3" name="Espaço Reservado para Conteúdo 2">
+            <a:extLst>
+              <a:ext uri="{FF2B5EF4-FFF2-40B4-BE49-F238E27FC236}">
+                <a16:creationId xmlns:a16="http://schemas.microsoft.com/office/drawing/2014/main" id="{7739F476-096D-8072-2941-079CBDE41218}"/>
+              </a:ext>
+            </a:extLst>
+          </p:cNvPr>
+          <p:cNvSpPr>
+            <a:spLocks noGrp="1"/>
+          </p:cNvSpPr>
+          <p:nvPr>
+            <p:ph idx="1"/>
+          </p:nvPr>
+        </p:nvSpPr>
+        <p:spPr>
+          <a:xfrm>
+            <a:off x="1097280" y="1737360"/>
+            <a:ext cx="10058400" cy="4023360"/>
+          </a:xfrm>
+        </p:spPr>
+        <p:txBody>
+          <a:bodyPr>
+            <a:normAutofit/>
+          </a:bodyPr>
+          <a:lstStyle/>
+          <a:p>
+            <a:r>
+              <a:rPr lang="pt-BR" sz="2400" dirty="0"/>
+              <a:t>Agora preste muita atenção, vou demonstrar novamente na prática.</a:t>
+            </a:r>
+          </a:p>
+          <a:p>
+            <a:endParaRPr lang="pt-BR" sz="2400" dirty="0"/>
+          </a:p>
+          <a:p>
+            <a:endParaRPr lang="pt-BR" sz="2400" dirty="0"/>
+          </a:p>
+          <a:p>
+            <a:endParaRPr lang="pt-BR" sz="2400" i="1" dirty="0"/>
+          </a:p>
+          <a:p>
+            <a:endParaRPr lang="pt-BR" sz="2400" dirty="0"/>
+          </a:p>
+        </p:txBody>
+      </p:sp>
+    </p:spTree>
+    <p:extLst>
+      <p:ext uri="{BB962C8B-B14F-4D97-AF65-F5344CB8AC3E}">
+        <p14:creationId xmlns:p14="http://schemas.microsoft.com/office/powerpoint/2010/main" val="2147415658"/>
+      </p:ext>
+    </p:extLst>
+  </p:cSld>
+  <p:clrMapOvr>
+    <a:masterClrMapping/>
+  </p:clrMapOvr>
+</p:sld>
+</file>
+
+<file path=ppt/slides/slide46.xml><?xml version="1.0" encoding="utf-8"?>
+<p:sld xmlns:a="http://schemas.openxmlformats.org/drawingml/2006/main" xmlns:r="http://schemas.openxmlformats.org/officeDocument/2006/relationships" xmlns:p="http://schemas.openxmlformats.org/presentationml/2006/main">
+  <p:cSld>
+    <p:spTree>
+      <p:nvGrpSpPr>
+        <p:cNvPr id="1" name=""/>
+        <p:cNvGrpSpPr/>
+        <p:nvPr/>
+      </p:nvGrpSpPr>
+      <p:grpSpPr>
+        <a:xfrm>
+          <a:off x="0" y="0"/>
+          <a:ext cx="0" cy="0"/>
+          <a:chOff x="0" y="0"/>
+          <a:chExt cx="0" cy="0"/>
+        </a:xfrm>
+      </p:grpSpPr>
+      <p:sp>
+        <p:nvSpPr>
+          <p:cNvPr id="2" name="Título 1">
+            <a:extLst>
+              <a:ext uri="{FF2B5EF4-FFF2-40B4-BE49-F238E27FC236}">
+                <a16:creationId xmlns:a16="http://schemas.microsoft.com/office/drawing/2014/main" id="{9EA6D259-A816-8FE6-B466-CB883C28DDDA}"/>
+              </a:ext>
+            </a:extLst>
+          </p:cNvPr>
+          <p:cNvSpPr>
+            <a:spLocks noGrp="1"/>
+          </p:cNvSpPr>
+          <p:nvPr>
+            <p:ph type="title"/>
+          </p:nvPr>
+        </p:nvSpPr>
+        <p:spPr/>
+        <p:txBody>
+          <a:bodyPr/>
+          <a:lstStyle/>
+          <a:p>
+            <a:r>
+              <a:rPr lang="pt-BR" dirty="0"/>
+              <a:t>Exercícios</a:t>
+            </a:r>
+          </a:p>
+        </p:txBody>
+      </p:sp>
+      <p:sp>
+        <p:nvSpPr>
+          <p:cNvPr id="3" name="Espaço Reservado para Conteúdo 2">
+            <a:extLst>
+              <a:ext uri="{FF2B5EF4-FFF2-40B4-BE49-F238E27FC236}">
+                <a16:creationId xmlns:a16="http://schemas.microsoft.com/office/drawing/2014/main" id="{7739F476-096D-8072-2941-079CBDE41218}"/>
+              </a:ext>
+            </a:extLst>
+          </p:cNvPr>
+          <p:cNvSpPr>
+            <a:spLocks noGrp="1"/>
+          </p:cNvSpPr>
+          <p:nvPr>
+            <p:ph idx="1"/>
+          </p:nvPr>
+        </p:nvSpPr>
+        <p:spPr>
+          <a:xfrm>
+            <a:off x="1097280" y="1737360"/>
+            <a:ext cx="10058400" cy="4023360"/>
+          </a:xfrm>
+        </p:spPr>
+        <p:txBody>
+          <a:bodyPr>
+            <a:normAutofit/>
+          </a:bodyPr>
+          <a:lstStyle/>
+          <a:p>
+            <a:r>
+              <a:rPr lang="pt-BR" sz="2400" dirty="0"/>
+              <a:t>Agora é com vocês!</a:t>
+            </a:r>
+          </a:p>
+          <a:p>
+            <a:r>
+              <a:rPr lang="pt-BR" sz="2400" dirty="0"/>
+              <a:t>A atividade para hoje será criar um modelo EER, e seguindo os passos explicados em aula você ou seu grupo criarão um banco de dados, com tabelas e colunas, onde testaremos juntos.</a:t>
+            </a:r>
+          </a:p>
+          <a:p>
+            <a:r>
+              <a:rPr lang="pt-BR" sz="2400" dirty="0"/>
+              <a:t>Você pode fazer com exemplos diferentes, criando o modelo conceitual e lógico, o modelo físico será criado com </a:t>
+            </a:r>
+            <a:r>
+              <a:rPr lang="pt-BR" sz="2400"/>
+              <a:t>o professor.</a:t>
+            </a:r>
+          </a:p>
+          <a:p>
+            <a:endParaRPr lang="pt-BR" sz="2400" dirty="0"/>
+          </a:p>
+          <a:p>
+            <a:endParaRPr lang="pt-BR" sz="2400" dirty="0"/>
+          </a:p>
+          <a:p>
+            <a:endParaRPr lang="pt-BR" sz="2400" dirty="0"/>
+          </a:p>
+          <a:p>
+            <a:endParaRPr lang="pt-BR" sz="2400" i="1" dirty="0"/>
+          </a:p>
+          <a:p>
+            <a:endParaRPr lang="pt-BR" sz="2400" dirty="0"/>
+          </a:p>
+        </p:txBody>
+      </p:sp>
+    </p:spTree>
+    <p:extLst>
+      <p:ext uri="{BB962C8B-B14F-4D97-AF65-F5344CB8AC3E}">
+        <p14:creationId xmlns:p14="http://schemas.microsoft.com/office/powerpoint/2010/main" val="2955939623"/>
       </p:ext>
     </p:extLst>
   </p:cSld>

</xml_diff>